<commit_message>
excel file saved and corelation result added into powerpoint
</commit_message>
<xml_diff>
--- a/Project_1_Team_7_Presentation.pptx
+++ b/Project_1_Team_7_Presentation.pptx
@@ -14,8 +14,9 @@
     <p:sldId id="262" r:id="rId8"/>
     <p:sldId id="266" r:id="rId9"/>
     <p:sldId id="265" r:id="rId10"/>
-    <p:sldId id="264" r:id="rId11"/>
-    <p:sldId id="263" r:id="rId12"/>
+    <p:sldId id="267" r:id="rId11"/>
+    <p:sldId id="264" r:id="rId12"/>
+    <p:sldId id="263" r:id="rId13"/>
   </p:sldIdLst>
   <p:sldSz cx="12192000" cy="6858000"/>
   <p:notesSz cx="6858000" cy="9144000"/>
@@ -114,6 +115,11 @@
       </a:defRPr>
     </a:lvl9pPr>
   </p:defaultTextStyle>
+  <p:extLst>
+    <p:ext uri="{EFAFB233-063F-42B5-8137-9DF3F51BA10A}">
+      <p15:sldGuideLst xmlns:p15="http://schemas.microsoft.com/office/powerpoint/2012/main"/>
+    </p:ext>
+  </p:extLst>
 </p:presentation>
 </file>
 
@@ -307,7 +313,7 @@
           <a:p>
             <a:fld id="{EB5372E6-5C80-43C9-AA4A-63A6D2675B67}" type="datetimeFigureOut">
               <a:rPr lang="en-US" smtClean="0"/>
-              <a:t>4/10/2018</a:t>
+              <a:t>4/11/2018</a:t>
             </a:fld>
             <a:endParaRPr lang="en-US"/>
           </a:p>
@@ -582,7 +588,7 @@
           <a:p>
             <a:fld id="{EB5372E6-5C80-43C9-AA4A-63A6D2675B67}" type="datetimeFigureOut">
               <a:rPr lang="en-US" smtClean="0"/>
-              <a:t>4/10/2018</a:t>
+              <a:t>4/11/2018</a:t>
             </a:fld>
             <a:endParaRPr lang="en-US"/>
           </a:p>
@@ -776,7 +782,7 @@
           <a:p>
             <a:fld id="{EB5372E6-5C80-43C9-AA4A-63A6D2675B67}" type="datetimeFigureOut">
               <a:rPr lang="en-US" smtClean="0"/>
-              <a:t>4/10/2018</a:t>
+              <a:t>4/11/2018</a:t>
             </a:fld>
             <a:endParaRPr lang="en-US"/>
           </a:p>
@@ -1049,7 +1055,7 @@
           <a:p>
             <a:fld id="{EB5372E6-5C80-43C9-AA4A-63A6D2675B67}" type="datetimeFigureOut">
               <a:rPr lang="en-US" smtClean="0"/>
-              <a:t>4/10/2018</a:t>
+              <a:t>4/11/2018</a:t>
             </a:fld>
             <a:endParaRPr lang="en-US"/>
           </a:p>
@@ -1390,7 +1396,7 @@
           <a:p>
             <a:fld id="{EB5372E6-5C80-43C9-AA4A-63A6D2675B67}" type="datetimeFigureOut">
               <a:rPr lang="en-US" smtClean="0"/>
-              <a:t>4/10/2018</a:t>
+              <a:t>4/11/2018</a:t>
             </a:fld>
             <a:endParaRPr lang="en-US"/>
           </a:p>
@@ -2013,7 +2019,7 @@
           <a:p>
             <a:fld id="{EB5372E6-5C80-43C9-AA4A-63A6D2675B67}" type="datetimeFigureOut">
               <a:rPr lang="en-US" smtClean="0"/>
-              <a:t>4/10/2018</a:t>
+              <a:t>4/11/2018</a:t>
             </a:fld>
             <a:endParaRPr lang="en-US"/>
           </a:p>
@@ -2873,7 +2879,7 @@
           <a:p>
             <a:fld id="{EB5372E6-5C80-43C9-AA4A-63A6D2675B67}" type="datetimeFigureOut">
               <a:rPr lang="en-US" smtClean="0"/>
-              <a:t>4/10/2018</a:t>
+              <a:t>4/11/2018</a:t>
             </a:fld>
             <a:endParaRPr lang="en-US"/>
           </a:p>
@@ -3043,7 +3049,7 @@
           <a:p>
             <a:fld id="{EB5372E6-5C80-43C9-AA4A-63A6D2675B67}" type="datetimeFigureOut">
               <a:rPr lang="en-US" smtClean="0"/>
-              <a:t>4/10/2018</a:t>
+              <a:t>4/11/2018</a:t>
             </a:fld>
             <a:endParaRPr lang="en-US"/>
           </a:p>
@@ -3223,7 +3229,7 @@
           <a:p>
             <a:fld id="{EB5372E6-5C80-43C9-AA4A-63A6D2675B67}" type="datetimeFigureOut">
               <a:rPr lang="en-US" smtClean="0"/>
-              <a:t>4/10/2018</a:t>
+              <a:t>4/11/2018</a:t>
             </a:fld>
             <a:endParaRPr lang="en-US"/>
           </a:p>
@@ -3393,7 +3399,7 @@
           <a:p>
             <a:fld id="{EB5372E6-5C80-43C9-AA4A-63A6D2675B67}" type="datetimeFigureOut">
               <a:rPr lang="en-US" smtClean="0"/>
-              <a:t>4/10/2018</a:t>
+              <a:t>4/11/2018</a:t>
             </a:fld>
             <a:endParaRPr lang="en-US"/>
           </a:p>
@@ -3640,7 +3646,7 @@
           <a:p>
             <a:fld id="{EB5372E6-5C80-43C9-AA4A-63A6D2675B67}" type="datetimeFigureOut">
               <a:rPr lang="en-US" smtClean="0"/>
-              <a:t>4/10/2018</a:t>
+              <a:t>4/11/2018</a:t>
             </a:fld>
             <a:endParaRPr lang="en-US"/>
           </a:p>
@@ -3932,7 +3938,7 @@
           <a:p>
             <a:fld id="{EB5372E6-5C80-43C9-AA4A-63A6D2675B67}" type="datetimeFigureOut">
               <a:rPr lang="en-US" smtClean="0"/>
-              <a:t>4/10/2018</a:t>
+              <a:t>4/11/2018</a:t>
             </a:fld>
             <a:endParaRPr lang="en-US"/>
           </a:p>
@@ -4376,7 +4382,7 @@
           <a:p>
             <a:fld id="{EB5372E6-5C80-43C9-AA4A-63A6D2675B67}" type="datetimeFigureOut">
               <a:rPr lang="en-US" smtClean="0"/>
-              <a:t>4/10/2018</a:t>
+              <a:t>4/11/2018</a:t>
             </a:fld>
             <a:endParaRPr lang="en-US"/>
           </a:p>
@@ -4494,7 +4500,7 @@
           <a:p>
             <a:fld id="{EB5372E6-5C80-43C9-AA4A-63A6D2675B67}" type="datetimeFigureOut">
               <a:rPr lang="en-US" smtClean="0"/>
-              <a:t>4/10/2018</a:t>
+              <a:t>4/11/2018</a:t>
             </a:fld>
             <a:endParaRPr lang="en-US"/>
           </a:p>
@@ -4589,7 +4595,7 @@
           <a:p>
             <a:fld id="{EB5372E6-5C80-43C9-AA4A-63A6D2675B67}" type="datetimeFigureOut">
               <a:rPr lang="en-US" smtClean="0"/>
-              <a:t>4/10/2018</a:t>
+              <a:t>4/11/2018</a:t>
             </a:fld>
             <a:endParaRPr lang="en-US"/>
           </a:p>
@@ -4868,7 +4874,7 @@
           <a:p>
             <a:fld id="{EB5372E6-5C80-43C9-AA4A-63A6D2675B67}" type="datetimeFigureOut">
               <a:rPr lang="en-US" smtClean="0"/>
-              <a:t>4/10/2018</a:t>
+              <a:t>4/11/2018</a:t>
             </a:fld>
             <a:endParaRPr lang="en-US"/>
           </a:p>
@@ -5143,7 +5149,7 @@
           <a:p>
             <a:fld id="{EB5372E6-5C80-43C9-AA4A-63A6D2675B67}" type="datetimeFigureOut">
               <a:rPr lang="en-US" smtClean="0"/>
-              <a:t>4/10/2018</a:t>
+              <a:t>4/11/2018</a:t>
             </a:fld>
             <a:endParaRPr lang="en-US"/>
           </a:p>
@@ -5572,7 +5578,7 @@
           <a:p>
             <a:fld id="{EB5372E6-5C80-43C9-AA4A-63A6D2675B67}" type="datetimeFigureOut">
               <a:rPr lang="en-US" smtClean="0"/>
-              <a:t>4/10/2018</a:t>
+              <a:t>4/11/2018</a:t>
             </a:fld>
             <a:endParaRPr lang="en-US"/>
           </a:p>
@@ -6239,7 +6245,7 @@
           <p:cNvPr id="2" name="Title 1">
             <a:extLst>
               <a:ext uri="{FF2B5EF4-FFF2-40B4-BE49-F238E27FC236}">
-                <a16:creationId xmlns:a16="http://schemas.microsoft.com/office/drawing/2014/main" id="{3FA549DD-F4D4-473D-B798-C3DDEC97BB0E}"/>
+                <a16:creationId xmlns:a16="http://schemas.microsoft.com/office/drawing/2014/main" id="{52D8E120-84A6-4AA7-8B39-5A660C266F05}"/>
               </a:ext>
             </a:extLst>
           </p:cNvPr>
@@ -6255,39 +6261,146 @@
           <a:bodyPr/>
           <a:lstStyle/>
           <a:p>
-            <a:endParaRPr lang="en-US"/>
-          </a:p>
-        </p:txBody>
-      </p:sp>
-      <p:sp>
-        <p:nvSpPr>
-          <p:cNvPr id="3" name="Content Placeholder 2">
+            <a:pPr algn="ctr"/>
+            <a:r>
+              <a:rPr lang="en-US" dirty="0"/>
+              <a:t>Correlation Test</a:t>
+            </a:r>
+          </a:p>
+        </p:txBody>
+      </p:sp>
+      <p:sp>
+        <p:nvSpPr>
+          <p:cNvPr id="4" name="Content Placeholder 3">
             <a:extLst>
               <a:ext uri="{FF2B5EF4-FFF2-40B4-BE49-F238E27FC236}">
-                <a16:creationId xmlns:a16="http://schemas.microsoft.com/office/drawing/2014/main" id="{8D22D664-6D38-48E0-929F-BAF61FBF4C46}"/>
+                <a16:creationId xmlns:a16="http://schemas.microsoft.com/office/drawing/2014/main" id="{E7B5DD4C-760C-4B19-AF25-337D315BCF07}"/>
               </a:ext>
             </a:extLst>
           </p:cNvPr>
-          <p:cNvSpPr>
+          <p:cNvSpPr txBox="1">
             <a:spLocks noGrp="1"/>
           </p:cNvSpPr>
           <p:nvPr>
             <p:ph idx="1"/>
           </p:nvPr>
         </p:nvSpPr>
-        <p:spPr/>
-        <p:txBody>
-          <a:bodyPr/>
-          <a:lstStyle/>
-          <a:p>
-            <a:endParaRPr lang="en-US"/>
+        <p:spPr>
+          <a:xfrm>
+            <a:off x="1104293" y="1532414"/>
+            <a:ext cx="8946541" cy="4298613"/>
+          </a:xfrm>
+          <a:prstGeom prst="rect">
+            <a:avLst/>
+          </a:prstGeom>
+          <a:noFill/>
+        </p:spPr>
+        <p:txBody>
+          <a:bodyPr wrap="square" rtlCol="0">
+            <a:spAutoFit/>
+          </a:bodyPr>
+          <a:lstStyle/>
+          <a:p>
+            <a:pPr marL="0" indent="0">
+              <a:buNone/>
+            </a:pPr>
+            <a:r>
+              <a:rPr lang="en-US" b="1" i="1" dirty="0"/>
+              <a:t>	Pearson r correlation:</a:t>
+            </a:r>
+            <a:r>
+              <a:rPr lang="en-US" dirty="0"/>
+              <a:t> Pearson </a:t>
+            </a:r>
+            <a:r>
+              <a:rPr lang="en-US" i="1" dirty="0"/>
+              <a:t>r</a:t>
+            </a:r>
+            <a:r>
+              <a:rPr lang="en-US" dirty="0"/>
+              <a:t> correlation is the most widely used correlation statistic to measure the degree of the relationship.  For example, in the stock market, if we want to measure how two stocks are related to each other, Pearson </a:t>
+            </a:r>
+            <a:r>
+              <a:rPr lang="en-US" i="1" dirty="0"/>
+              <a:t>r</a:t>
+            </a:r>
+            <a:r>
+              <a:rPr lang="en-US" dirty="0"/>
+              <a:t> correlation is used to measure the degree of relationship between the two. </a:t>
+            </a:r>
+          </a:p>
+          <a:p>
+            <a:endParaRPr lang="en-US" dirty="0"/>
+          </a:p>
+          <a:p>
+            <a:pPr marL="0" indent="0">
+              <a:buNone/>
+            </a:pPr>
+            <a:r>
+              <a:rPr lang="en-US" dirty="0"/>
+              <a:t>	Correlation coefficients between </a:t>
+            </a:r>
+            <a:r>
+              <a:rPr lang="en-US" dirty="0">
+                <a:solidFill>
+                  <a:srgbClr val="FF0000"/>
+                </a:solidFill>
+              </a:rPr>
+              <a:t>0.10 and 0.29 </a:t>
+            </a:r>
+            <a:r>
+              <a:rPr lang="en-US" dirty="0"/>
+              <a:t>represent a small association or relationship, </a:t>
+            </a:r>
+          </a:p>
+          <a:p>
+            <a:pPr marL="0" indent="0">
+              <a:buNone/>
+            </a:pPr>
+            <a:r>
+              <a:rPr lang="en-US" dirty="0"/>
+              <a:t>	Correlation coefficients between </a:t>
+            </a:r>
+            <a:r>
+              <a:rPr lang="en-US" dirty="0">
+                <a:solidFill>
+                  <a:srgbClr val="FF0000"/>
+                </a:solidFill>
+              </a:rPr>
+              <a:t>0.30 and 0.49 </a:t>
+            </a:r>
+            <a:r>
+              <a:rPr lang="en-US" dirty="0"/>
+              <a:t>represent a medium association or relationship,</a:t>
+            </a:r>
+          </a:p>
+          <a:p>
+            <a:pPr marL="0" indent="0">
+              <a:buNone/>
+            </a:pPr>
+            <a:r>
+              <a:rPr lang="en-US" dirty="0"/>
+              <a:t>	Correlation coefficients of </a:t>
+            </a:r>
+            <a:r>
+              <a:rPr lang="en-US" dirty="0">
+                <a:solidFill>
+                  <a:srgbClr val="FF0000"/>
+                </a:solidFill>
+              </a:rPr>
+              <a:t>0.50 and above </a:t>
+            </a:r>
+            <a:r>
+              <a:rPr lang="en-US" dirty="0"/>
+              <a:t>represent a large association or relationship.</a:t>
+            </a:r>
           </a:p>
         </p:txBody>
       </p:sp>
     </p:spTree>
     <p:extLst>
       <p:ext uri="{BB962C8B-B14F-4D97-AF65-F5344CB8AC3E}">
-        <p14:creationId xmlns:p14="http://schemas.microsoft.com/office/powerpoint/2010/main" val="1060732054"/>
+        <p14:creationId xmlns:p14="http://schemas.microsoft.com/office/powerpoint/2010/main" val="2588135083"/>
       </p:ext>
     </p:extLst>
   </p:cSld>
@@ -6319,6 +6432,241 @@
           <p:cNvPr id="2" name="Title 1">
             <a:extLst>
               <a:ext uri="{FF2B5EF4-FFF2-40B4-BE49-F238E27FC236}">
+                <a16:creationId xmlns:a16="http://schemas.microsoft.com/office/drawing/2014/main" id="{3FA549DD-F4D4-473D-B798-C3DDEC97BB0E}"/>
+              </a:ext>
+            </a:extLst>
+          </p:cNvPr>
+          <p:cNvSpPr>
+            <a:spLocks noGrp="1"/>
+          </p:cNvSpPr>
+          <p:nvPr>
+            <p:ph type="title"/>
+          </p:nvPr>
+        </p:nvSpPr>
+        <p:spPr/>
+        <p:txBody>
+          <a:bodyPr/>
+          <a:lstStyle/>
+          <a:p>
+            <a:pPr algn="ctr"/>
+            <a:r>
+              <a:rPr lang="en-US" dirty="0"/>
+              <a:t>Correlation Test Result for</a:t>
+            </a:r>
+            <a:br>
+              <a:rPr lang="en-US" dirty="0"/>
+            </a:br>
+            <a:r>
+              <a:rPr lang="en-US" dirty="0"/>
+              <a:t> Happiness – GDP Per Capita</a:t>
+            </a:r>
+          </a:p>
+        </p:txBody>
+      </p:sp>
+      <p:sp>
+        <p:nvSpPr>
+          <p:cNvPr id="20" name="Rectangle 19">
+            <a:extLst>
+              <a:ext uri="{FF2B5EF4-FFF2-40B4-BE49-F238E27FC236}">
+                <a16:creationId xmlns:a16="http://schemas.microsoft.com/office/drawing/2014/main" id="{EFDB967E-1F4D-4AE0-AF65-7EEE17F48A91}"/>
+              </a:ext>
+            </a:extLst>
+          </p:cNvPr>
+          <p:cNvSpPr/>
+          <p:nvPr/>
+        </p:nvSpPr>
+        <p:spPr>
+          <a:xfrm>
+            <a:off x="964334" y="3095339"/>
+            <a:ext cx="5793574" cy="461665"/>
+          </a:xfrm>
+          <a:prstGeom prst="rect">
+            <a:avLst/>
+          </a:prstGeom>
+        </p:spPr>
+        <p:txBody>
+          <a:bodyPr wrap="none">
+            <a:spAutoFit/>
+          </a:bodyPr>
+          <a:lstStyle/>
+          <a:p>
+            <a:r>
+              <a:rPr lang="en-US" sz="2400" i="1" dirty="0"/>
+              <a:t>r</a:t>
+            </a:r>
+            <a:r>
+              <a:rPr lang="en-US" sz="2400" dirty="0"/>
+              <a:t>  (Pearson r correlation coefficient) = </a:t>
+            </a:r>
+          </a:p>
+        </p:txBody>
+      </p:sp>
+      <p:sp>
+        <p:nvSpPr>
+          <p:cNvPr id="21" name="Rectangle 20">
+            <a:extLst>
+              <a:ext uri="{FF2B5EF4-FFF2-40B4-BE49-F238E27FC236}">
+                <a16:creationId xmlns:a16="http://schemas.microsoft.com/office/drawing/2014/main" id="{4E00E77B-C062-481C-9CBB-0CCA1DFEAF6C}"/>
+              </a:ext>
+            </a:extLst>
+          </p:cNvPr>
+          <p:cNvSpPr/>
+          <p:nvPr/>
+        </p:nvSpPr>
+        <p:spPr>
+          <a:xfrm>
+            <a:off x="7092339" y="3095339"/>
+            <a:ext cx="1009650" cy="368300"/>
+          </a:xfrm>
+          <a:prstGeom prst="rect">
+            <a:avLst/>
+          </a:prstGeom>
+        </p:spPr>
+        <p:txBody>
+          <a:bodyPr wrap="none">
+            <a:spAutoFit/>
+          </a:bodyPr>
+          <a:lstStyle/>
+          <a:p>
+            <a:r>
+              <a:rPr lang="en-US" dirty="0">
+                <a:solidFill>
+                  <a:schemeClr val="tx1">
+                    <a:lumMod val="95000"/>
+                  </a:schemeClr>
+                </a:solidFill>
+                <a:latin typeface="Calibri" panose="020F0502020204030204" pitchFamily="34" charset="0"/>
+              </a:rPr>
+              <a:t>0.73372</a:t>
+            </a:r>
+            <a:r>
+              <a:rPr lang="en-US" dirty="0"/>
+              <a:t> </a:t>
+            </a:r>
+          </a:p>
+        </p:txBody>
+      </p:sp>
+      <p:sp>
+        <p:nvSpPr>
+          <p:cNvPr id="22" name="Rectangle 21">
+            <a:extLst>
+              <a:ext uri="{FF2B5EF4-FFF2-40B4-BE49-F238E27FC236}">
+                <a16:creationId xmlns:a16="http://schemas.microsoft.com/office/drawing/2014/main" id="{D851582D-8B61-4E38-B056-6EF32C85D29E}"/>
+              </a:ext>
+            </a:extLst>
+          </p:cNvPr>
+          <p:cNvSpPr/>
+          <p:nvPr/>
+        </p:nvSpPr>
+        <p:spPr>
+          <a:xfrm>
+            <a:off x="5254496" y="2243461"/>
+            <a:ext cx="3675686" cy="461665"/>
+          </a:xfrm>
+          <a:prstGeom prst="rect">
+            <a:avLst/>
+          </a:prstGeom>
+        </p:spPr>
+        <p:txBody>
+          <a:bodyPr wrap="none">
+            <a:spAutoFit/>
+          </a:bodyPr>
+          <a:lstStyle/>
+          <a:p>
+            <a:r>
+              <a:rPr lang="en-US" sz="2400" dirty="0">
+                <a:solidFill>
+                  <a:schemeClr val="tx1">
+                    <a:lumMod val="95000"/>
+                  </a:schemeClr>
+                </a:solidFill>
+                <a:latin typeface="Calibri" panose="020F0502020204030204" pitchFamily="34" charset="0"/>
+              </a:rPr>
+              <a:t>Happiness - GDP Per Capita</a:t>
+            </a:r>
+            <a:r>
+              <a:rPr lang="en-US" sz="2400" dirty="0">
+                <a:solidFill>
+                  <a:schemeClr val="tx1">
+                    <a:lumMod val="95000"/>
+                  </a:schemeClr>
+                </a:solidFill>
+              </a:rPr>
+              <a:t> </a:t>
+            </a:r>
+          </a:p>
+        </p:txBody>
+      </p:sp>
+      <p:sp>
+        <p:nvSpPr>
+          <p:cNvPr id="24" name="TextBox 23">
+            <a:extLst>
+              <a:ext uri="{FF2B5EF4-FFF2-40B4-BE49-F238E27FC236}">
+                <a16:creationId xmlns:a16="http://schemas.microsoft.com/office/drawing/2014/main" id="{83C146C3-04AD-4FB2-8C47-33B17327843E}"/>
+              </a:ext>
+            </a:extLst>
+          </p:cNvPr>
+          <p:cNvSpPr txBox="1"/>
+          <p:nvPr/>
+        </p:nvSpPr>
+        <p:spPr>
+          <a:xfrm>
+            <a:off x="1083212" y="4318782"/>
+            <a:ext cx="8328074" cy="923330"/>
+          </a:xfrm>
+          <a:prstGeom prst="rect">
+            <a:avLst/>
+          </a:prstGeom>
+          <a:noFill/>
+        </p:spPr>
+        <p:txBody>
+          <a:bodyPr wrap="square" rtlCol="0">
+            <a:spAutoFit/>
+          </a:bodyPr>
+          <a:lstStyle/>
+          <a:p>
+            <a:r>
+              <a:rPr lang="en-US" dirty="0"/>
+              <a:t>According to results of our analysis we can state that there is a strong positive relationship between GDP Per Capita and Happiness Score of a country</a:t>
+            </a:r>
+          </a:p>
+        </p:txBody>
+      </p:sp>
+    </p:spTree>
+    <p:extLst>
+      <p:ext uri="{BB962C8B-B14F-4D97-AF65-F5344CB8AC3E}">
+        <p14:creationId xmlns:p14="http://schemas.microsoft.com/office/powerpoint/2010/main" val="1060732054"/>
+      </p:ext>
+    </p:extLst>
+  </p:cSld>
+  <p:clrMapOvr>
+    <a:masterClrMapping/>
+  </p:clrMapOvr>
+</p:sld>
+</file>
+
+<file path=ppt/slides/slide12.xml><?xml version="1.0" encoding="utf-8"?>
+<p:sld xmlns:a="http://schemas.openxmlformats.org/drawingml/2006/main" xmlns:r="http://schemas.openxmlformats.org/officeDocument/2006/relationships" xmlns:p="http://schemas.openxmlformats.org/presentationml/2006/main">
+  <p:cSld>
+    <p:spTree>
+      <p:nvGrpSpPr>
+        <p:cNvPr id="1" name=""/>
+        <p:cNvGrpSpPr/>
+        <p:nvPr/>
+      </p:nvGrpSpPr>
+      <p:grpSpPr>
+        <a:xfrm>
+          <a:off x="0" y="0"/>
+          <a:ext cx="0" cy="0"/>
+          <a:chOff x="0" y="0"/>
+          <a:chExt cx="0" cy="0"/>
+        </a:xfrm>
+      </p:grpSpPr>
+      <p:sp>
+        <p:nvSpPr>
+          <p:cNvPr id="2" name="Title 1">
+            <a:extLst>
+              <a:ext uri="{FF2B5EF4-FFF2-40B4-BE49-F238E27FC236}">
                 <a16:creationId xmlns:a16="http://schemas.microsoft.com/office/drawing/2014/main" id="{332B1BDD-506F-4787-A390-70C70EE71B8D}"/>
               </a:ext>
             </a:extLst>
@@ -6335,32 +6683,202 @@
           <a:bodyPr/>
           <a:lstStyle/>
           <a:p>
-            <a:endParaRPr lang="en-US"/>
-          </a:p>
-        </p:txBody>
-      </p:sp>
-      <p:sp>
-        <p:nvSpPr>
-          <p:cNvPr id="3" name="Content Placeholder 2">
+            <a:pPr algn="ctr"/>
+            <a:r>
+              <a:rPr lang="en-US" dirty="0"/>
+              <a:t>Correlation Test Result for</a:t>
+            </a:r>
+            <a:br>
+              <a:rPr lang="en-US" dirty="0"/>
+            </a:br>
+            <a:r>
+              <a:rPr lang="en-US" dirty="0"/>
+              <a:t> Happiness – Birth Rate</a:t>
+            </a:r>
+          </a:p>
+        </p:txBody>
+      </p:sp>
+      <p:sp>
+        <p:nvSpPr>
+          <p:cNvPr id="11" name="Rectangle 10">
             <a:extLst>
               <a:ext uri="{FF2B5EF4-FFF2-40B4-BE49-F238E27FC236}">
-                <a16:creationId xmlns:a16="http://schemas.microsoft.com/office/drawing/2014/main" id="{329EE895-7880-480A-9764-B81363D63B7A}"/>
+                <a16:creationId xmlns:a16="http://schemas.microsoft.com/office/drawing/2014/main" id="{7985DDFE-34DB-4964-BEE2-40C9C6DFDBF7}"/>
               </a:ext>
             </a:extLst>
           </p:cNvPr>
-          <p:cNvSpPr>
-            <a:spLocks noGrp="1"/>
-          </p:cNvSpPr>
-          <p:nvPr>
-            <p:ph idx="1"/>
-          </p:nvPr>
-        </p:nvSpPr>
-        <p:spPr/>
-        <p:txBody>
-          <a:bodyPr/>
-          <a:lstStyle/>
-          <a:p>
-            <a:endParaRPr lang="en-US"/>
+          <p:cNvSpPr/>
+          <p:nvPr/>
+        </p:nvSpPr>
+        <p:spPr>
+          <a:xfrm>
+            <a:off x="964334" y="3095339"/>
+            <a:ext cx="5793574" cy="461665"/>
+          </a:xfrm>
+          <a:prstGeom prst="rect">
+            <a:avLst/>
+          </a:prstGeom>
+        </p:spPr>
+        <p:txBody>
+          <a:bodyPr wrap="none">
+            <a:spAutoFit/>
+          </a:bodyPr>
+          <a:lstStyle/>
+          <a:p>
+            <a:r>
+              <a:rPr lang="en-US" sz="2400" i="1" dirty="0"/>
+              <a:t>r</a:t>
+            </a:r>
+            <a:r>
+              <a:rPr lang="en-US" sz="2400" dirty="0"/>
+              <a:t>  (Pearson r correlation coefficient) = </a:t>
+            </a:r>
+          </a:p>
+        </p:txBody>
+      </p:sp>
+      <p:sp>
+        <p:nvSpPr>
+          <p:cNvPr id="12" name="Rectangle 11">
+            <a:extLst>
+              <a:ext uri="{FF2B5EF4-FFF2-40B4-BE49-F238E27FC236}">
+                <a16:creationId xmlns:a16="http://schemas.microsoft.com/office/drawing/2014/main" id="{EA844962-4085-4A2F-BC12-5147E6B63378}"/>
+              </a:ext>
+            </a:extLst>
+          </p:cNvPr>
+          <p:cNvSpPr/>
+          <p:nvPr/>
+        </p:nvSpPr>
+        <p:spPr>
+          <a:xfrm>
+            <a:off x="7092339" y="3095339"/>
+            <a:ext cx="1329210" cy="738664"/>
+          </a:xfrm>
+          <a:prstGeom prst="rect">
+            <a:avLst/>
+          </a:prstGeom>
+        </p:spPr>
+        <p:txBody>
+          <a:bodyPr wrap="none">
+            <a:spAutoFit/>
+          </a:bodyPr>
+          <a:lstStyle/>
+          <a:p>
+            <a:r>
+              <a:rPr lang="en-US" dirty="0">
+                <a:solidFill>
+                  <a:srgbClr val="000000"/>
+                </a:solidFill>
+                <a:latin typeface="Calibri" panose="020F0502020204030204" pitchFamily="34" charset="0"/>
+              </a:rPr>
+              <a:t>-</a:t>
+            </a:r>
+            <a:r>
+              <a:rPr lang="en-US" sz="2400" dirty="0">
+                <a:solidFill>
+                  <a:schemeClr val="tx1">
+                    <a:lumMod val="95000"/>
+                  </a:schemeClr>
+                </a:solidFill>
+                <a:latin typeface="Calibri" panose="020F0502020204030204" pitchFamily="34" charset="0"/>
+              </a:rPr>
+              <a:t>0.32519</a:t>
+            </a:r>
+            <a:r>
+              <a:rPr lang="en-US" dirty="0"/>
+              <a:t> </a:t>
+            </a:r>
+          </a:p>
+          <a:p>
+            <a:r>
+              <a:rPr lang="en-US" dirty="0"/>
+              <a:t> </a:t>
+            </a:r>
+          </a:p>
+        </p:txBody>
+      </p:sp>
+      <p:sp>
+        <p:nvSpPr>
+          <p:cNvPr id="14" name="Rectangle 13">
+            <a:extLst>
+              <a:ext uri="{FF2B5EF4-FFF2-40B4-BE49-F238E27FC236}">
+                <a16:creationId xmlns:a16="http://schemas.microsoft.com/office/drawing/2014/main" id="{C1213706-3723-4309-8AD5-A6944F14F19C}"/>
+              </a:ext>
+            </a:extLst>
+          </p:cNvPr>
+          <p:cNvSpPr/>
+          <p:nvPr/>
+        </p:nvSpPr>
+        <p:spPr>
+          <a:xfrm>
+            <a:off x="5254496" y="2243461"/>
+            <a:ext cx="3675686" cy="461665"/>
+          </a:xfrm>
+          <a:prstGeom prst="rect">
+            <a:avLst/>
+          </a:prstGeom>
+        </p:spPr>
+        <p:txBody>
+          <a:bodyPr wrap="none">
+            <a:spAutoFit/>
+          </a:bodyPr>
+          <a:lstStyle/>
+          <a:p>
+            <a:r>
+              <a:rPr lang="en-US" sz="2400" dirty="0">
+                <a:solidFill>
+                  <a:schemeClr val="tx1">
+                    <a:lumMod val="95000"/>
+                  </a:schemeClr>
+                </a:solidFill>
+                <a:latin typeface="Calibri" panose="020F0502020204030204" pitchFamily="34" charset="0"/>
+              </a:rPr>
+              <a:t>Happiness - GDP Per Capita</a:t>
+            </a:r>
+            <a:r>
+              <a:rPr lang="en-US" sz="2400" dirty="0">
+                <a:solidFill>
+                  <a:schemeClr val="tx1">
+                    <a:lumMod val="95000"/>
+                  </a:schemeClr>
+                </a:solidFill>
+              </a:rPr>
+              <a:t> </a:t>
+            </a:r>
+          </a:p>
+        </p:txBody>
+      </p:sp>
+      <p:sp>
+        <p:nvSpPr>
+          <p:cNvPr id="15" name="TextBox 14">
+            <a:extLst>
+              <a:ext uri="{FF2B5EF4-FFF2-40B4-BE49-F238E27FC236}">
+                <a16:creationId xmlns:a16="http://schemas.microsoft.com/office/drawing/2014/main" id="{C46F7A4E-24DB-45BF-AF39-94257B642867}"/>
+              </a:ext>
+            </a:extLst>
+          </p:cNvPr>
+          <p:cNvSpPr txBox="1"/>
+          <p:nvPr/>
+        </p:nvSpPr>
+        <p:spPr>
+          <a:xfrm>
+            <a:off x="1083212" y="4318782"/>
+            <a:ext cx="8328074" cy="923330"/>
+          </a:xfrm>
+          <a:prstGeom prst="rect">
+            <a:avLst/>
+          </a:prstGeom>
+          <a:noFill/>
+        </p:spPr>
+        <p:txBody>
+          <a:bodyPr wrap="square" rtlCol="0">
+            <a:spAutoFit/>
+          </a:bodyPr>
+          <a:lstStyle/>
+          <a:p>
+            <a:r>
+              <a:rPr lang="en-US" dirty="0"/>
+              <a:t>According to results of our analysis we can state that there is a medium negative relationship between Birth Rate and Happiness Score of a country</a:t>
+            </a:r>
           </a:p>
         </p:txBody>
       </p:sp>

</xml_diff>

<commit_message>
regration analysis result added into powerpoint
</commit_message>
<xml_diff>
--- a/Project_1_Team_7_Presentation.pptx
+++ b/Project_1_Team_7_Presentation.pptx
@@ -17,6 +17,10 @@
     <p:sldId id="267" r:id="rId11"/>
     <p:sldId id="264" r:id="rId12"/>
     <p:sldId id="263" r:id="rId13"/>
+    <p:sldId id="271" r:id="rId14"/>
+    <p:sldId id="269" r:id="rId15"/>
+    <p:sldId id="268" r:id="rId16"/>
+    <p:sldId id="270" r:id="rId17"/>
   </p:sldIdLst>
   <p:sldSz cx="12192000" cy="6858000"/>
   <p:notesSz cx="6858000" cy="9144000"/>
@@ -6895,6 +6899,398 @@
 </p:sld>
 </file>
 
+<file path=ppt/slides/slide13.xml><?xml version="1.0" encoding="utf-8"?>
+<p:sld xmlns:a="http://schemas.openxmlformats.org/drawingml/2006/main" xmlns:r="http://schemas.openxmlformats.org/officeDocument/2006/relationships" xmlns:p="http://schemas.openxmlformats.org/presentationml/2006/main">
+  <p:cSld>
+    <p:spTree>
+      <p:nvGrpSpPr>
+        <p:cNvPr id="1" name=""/>
+        <p:cNvGrpSpPr/>
+        <p:nvPr/>
+      </p:nvGrpSpPr>
+      <p:grpSpPr>
+        <a:xfrm>
+          <a:off x="0" y="0"/>
+          <a:ext cx="0" cy="0"/>
+          <a:chOff x="0" y="0"/>
+          <a:chExt cx="0" cy="0"/>
+        </a:xfrm>
+      </p:grpSpPr>
+      <p:sp>
+        <p:nvSpPr>
+          <p:cNvPr id="2" name="Title 1">
+            <a:extLst>
+              <a:ext uri="{FF2B5EF4-FFF2-40B4-BE49-F238E27FC236}">
+                <a16:creationId xmlns:a16="http://schemas.microsoft.com/office/drawing/2014/main" id="{9FD42EA0-B6D9-4787-AC3B-6BFD24FB3858}"/>
+              </a:ext>
+            </a:extLst>
+          </p:cNvPr>
+          <p:cNvSpPr>
+            <a:spLocks noGrp="1"/>
+          </p:cNvSpPr>
+          <p:nvPr>
+            <p:ph type="title"/>
+          </p:nvPr>
+        </p:nvSpPr>
+        <p:spPr/>
+        <p:txBody>
+          <a:bodyPr/>
+          <a:lstStyle/>
+          <a:p>
+            <a:pPr algn="ctr"/>
+            <a:r>
+              <a:rPr lang="en-US" dirty="0"/>
+              <a:t>Regression Analysis</a:t>
+            </a:r>
+          </a:p>
+        </p:txBody>
+      </p:sp>
+      <p:sp>
+        <p:nvSpPr>
+          <p:cNvPr id="3" name="Content Placeholder 2">
+            <a:extLst>
+              <a:ext uri="{FF2B5EF4-FFF2-40B4-BE49-F238E27FC236}">
+                <a16:creationId xmlns:a16="http://schemas.microsoft.com/office/drawing/2014/main" id="{B0C1DBA9-3580-4B6B-B131-063D8A4CEFAD}"/>
+              </a:ext>
+            </a:extLst>
+          </p:cNvPr>
+          <p:cNvSpPr>
+            <a:spLocks noGrp="1"/>
+          </p:cNvSpPr>
+          <p:nvPr>
+            <p:ph idx="1"/>
+          </p:nvPr>
+        </p:nvSpPr>
+        <p:spPr/>
+        <p:txBody>
+          <a:bodyPr/>
+          <a:lstStyle/>
+          <a:p>
+            <a:r>
+              <a:rPr lang="en-US" dirty="0"/>
+              <a:t>Regression analysis generates an equation to describe the statistical relationship between one or more predictor variables and the response variable.</a:t>
+            </a:r>
+          </a:p>
+        </p:txBody>
+      </p:sp>
+    </p:spTree>
+    <p:extLst>
+      <p:ext uri="{BB962C8B-B14F-4D97-AF65-F5344CB8AC3E}">
+        <p14:creationId xmlns:p14="http://schemas.microsoft.com/office/powerpoint/2010/main" val="170037080"/>
+      </p:ext>
+    </p:extLst>
+  </p:cSld>
+  <p:clrMapOvr>
+    <a:masterClrMapping/>
+  </p:clrMapOvr>
+</p:sld>
+</file>
+
+<file path=ppt/slides/slide14.xml><?xml version="1.0" encoding="utf-8"?>
+<p:sld xmlns:a="http://schemas.openxmlformats.org/drawingml/2006/main" xmlns:r="http://schemas.openxmlformats.org/officeDocument/2006/relationships" xmlns:p="http://schemas.openxmlformats.org/presentationml/2006/main">
+  <p:cSld>
+    <p:spTree>
+      <p:nvGrpSpPr>
+        <p:cNvPr id="1" name=""/>
+        <p:cNvGrpSpPr/>
+        <p:nvPr/>
+      </p:nvGrpSpPr>
+      <p:grpSpPr>
+        <a:xfrm>
+          <a:off x="0" y="0"/>
+          <a:ext cx="0" cy="0"/>
+          <a:chOff x="0" y="0"/>
+          <a:chExt cx="0" cy="0"/>
+        </a:xfrm>
+      </p:grpSpPr>
+      <p:sp>
+        <p:nvSpPr>
+          <p:cNvPr id="2" name="Title 1">
+            <a:extLst>
+              <a:ext uri="{FF2B5EF4-FFF2-40B4-BE49-F238E27FC236}">
+                <a16:creationId xmlns:a16="http://schemas.microsoft.com/office/drawing/2014/main" id="{D7DE779D-A8F2-47DD-96CD-E25FEF4EBC75}"/>
+              </a:ext>
+            </a:extLst>
+          </p:cNvPr>
+          <p:cNvSpPr>
+            <a:spLocks noGrp="1"/>
+          </p:cNvSpPr>
+          <p:nvPr>
+            <p:ph type="title"/>
+          </p:nvPr>
+        </p:nvSpPr>
+        <p:spPr/>
+        <p:txBody>
+          <a:bodyPr/>
+          <a:lstStyle/>
+          <a:p>
+            <a:pPr algn="ctr"/>
+            <a:r>
+              <a:rPr lang="en-US" dirty="0" err="1"/>
+              <a:t>Regration</a:t>
+            </a:r>
+            <a:r>
+              <a:rPr lang="en-US" dirty="0"/>
+              <a:t> Analysis</a:t>
+            </a:r>
+            <a:br>
+              <a:rPr lang="en-US" dirty="0"/>
+            </a:br>
+            <a:r>
+              <a:rPr lang="en-US" dirty="0"/>
+              <a:t>Happiness – GDP Per Capita</a:t>
+            </a:r>
+          </a:p>
+        </p:txBody>
+      </p:sp>
+      <p:pic>
+        <p:nvPicPr>
+          <p:cNvPr id="7" name="Picture 6">
+            <a:extLst>
+              <a:ext uri="{FF2B5EF4-FFF2-40B4-BE49-F238E27FC236}">
+                <a16:creationId xmlns:a16="http://schemas.microsoft.com/office/drawing/2014/main" id="{7E23D6C0-89A2-4E3E-A9E6-D045C4D13B5E}"/>
+              </a:ext>
+            </a:extLst>
+          </p:cNvPr>
+          <p:cNvPicPr>
+            <a:picLocks noChangeAspect="1"/>
+          </p:cNvPicPr>
+          <p:nvPr/>
+        </p:nvPicPr>
+        <p:blipFill rotWithShape="1">
+          <a:blip r:embed="rId2"/>
+          <a:srcRect l="16615" t="29196" r="1692" b="11161"/>
+          <a:stretch/>
+        </p:blipFill>
+        <p:spPr>
+          <a:xfrm>
+            <a:off x="267285" y="1853247"/>
+            <a:ext cx="11408899" cy="4683113"/>
+          </a:xfrm>
+          <a:prstGeom prst="rect">
+            <a:avLst/>
+          </a:prstGeom>
+        </p:spPr>
+      </p:pic>
+    </p:spTree>
+    <p:extLst>
+      <p:ext uri="{BB962C8B-B14F-4D97-AF65-F5344CB8AC3E}">
+        <p14:creationId xmlns:p14="http://schemas.microsoft.com/office/powerpoint/2010/main" val="1439698341"/>
+      </p:ext>
+    </p:extLst>
+  </p:cSld>
+  <p:clrMapOvr>
+    <a:masterClrMapping/>
+  </p:clrMapOvr>
+</p:sld>
+</file>
+
+<file path=ppt/slides/slide15.xml><?xml version="1.0" encoding="utf-8"?>
+<p:sld xmlns:a="http://schemas.openxmlformats.org/drawingml/2006/main" xmlns:r="http://schemas.openxmlformats.org/officeDocument/2006/relationships" xmlns:p="http://schemas.openxmlformats.org/presentationml/2006/main">
+  <p:cSld>
+    <p:spTree>
+      <p:nvGrpSpPr>
+        <p:cNvPr id="1" name=""/>
+        <p:cNvGrpSpPr/>
+        <p:nvPr/>
+      </p:nvGrpSpPr>
+      <p:grpSpPr>
+        <a:xfrm>
+          <a:off x="0" y="0"/>
+          <a:ext cx="0" cy="0"/>
+          <a:chOff x="0" y="0"/>
+          <a:chExt cx="0" cy="0"/>
+        </a:xfrm>
+      </p:grpSpPr>
+      <p:sp>
+        <p:nvSpPr>
+          <p:cNvPr id="2" name="Title 1">
+            <a:extLst>
+              <a:ext uri="{FF2B5EF4-FFF2-40B4-BE49-F238E27FC236}">
+                <a16:creationId xmlns:a16="http://schemas.microsoft.com/office/drawing/2014/main" id="{1732194C-3430-4A85-BC0B-6D8031F531A2}"/>
+              </a:ext>
+            </a:extLst>
+          </p:cNvPr>
+          <p:cNvSpPr>
+            <a:spLocks noGrp="1"/>
+          </p:cNvSpPr>
+          <p:nvPr>
+            <p:ph type="title"/>
+          </p:nvPr>
+        </p:nvSpPr>
+        <p:spPr>
+          <a:xfrm>
+            <a:off x="646111" y="452718"/>
+            <a:ext cx="9404723" cy="939984"/>
+          </a:xfrm>
+        </p:spPr>
+        <p:txBody>
+          <a:bodyPr/>
+          <a:lstStyle/>
+          <a:p>
+            <a:pPr algn="ctr"/>
+            <a:r>
+              <a:rPr lang="en-US" dirty="0"/>
+              <a:t>Regression Analysis </a:t>
+            </a:r>
+            <a:br>
+              <a:rPr lang="en-US" dirty="0"/>
+            </a:br>
+            <a:r>
+              <a:rPr lang="en-US" dirty="0" err="1"/>
+              <a:t>Hapiness</a:t>
+            </a:r>
+            <a:r>
+              <a:rPr lang="en-US" dirty="0"/>
+              <a:t> – Birth Rate</a:t>
+            </a:r>
+          </a:p>
+        </p:txBody>
+      </p:sp>
+      <p:pic>
+        <p:nvPicPr>
+          <p:cNvPr id="9" name="Picture 8">
+            <a:extLst>
+              <a:ext uri="{FF2B5EF4-FFF2-40B4-BE49-F238E27FC236}">
+                <a16:creationId xmlns:a16="http://schemas.microsoft.com/office/drawing/2014/main" id="{F216AEE9-ADD9-4314-BF60-7211F276DA46}"/>
+              </a:ext>
+            </a:extLst>
+          </p:cNvPr>
+          <p:cNvPicPr>
+            <a:picLocks noChangeAspect="1"/>
+          </p:cNvPicPr>
+          <p:nvPr/>
+        </p:nvPicPr>
+        <p:blipFill rotWithShape="1">
+          <a:blip r:embed="rId2"/>
+          <a:srcRect l="23769" t="35070" r="5500" b="13212"/>
+          <a:stretch/>
+        </p:blipFill>
+        <p:spPr>
+          <a:xfrm>
+            <a:off x="466467" y="1871002"/>
+            <a:ext cx="10956499" cy="4504142"/>
+          </a:xfrm>
+          <a:prstGeom prst="rect">
+            <a:avLst/>
+          </a:prstGeom>
+        </p:spPr>
+      </p:pic>
+    </p:spTree>
+    <p:extLst>
+      <p:ext uri="{BB962C8B-B14F-4D97-AF65-F5344CB8AC3E}">
+        <p14:creationId xmlns:p14="http://schemas.microsoft.com/office/powerpoint/2010/main" val="402089898"/>
+      </p:ext>
+    </p:extLst>
+  </p:cSld>
+  <p:clrMapOvr>
+    <a:masterClrMapping/>
+  </p:clrMapOvr>
+</p:sld>
+</file>
+
+<file path=ppt/slides/slide16.xml><?xml version="1.0" encoding="utf-8"?>
+<p:sld xmlns:a="http://schemas.openxmlformats.org/drawingml/2006/main" xmlns:r="http://schemas.openxmlformats.org/officeDocument/2006/relationships" xmlns:p="http://schemas.openxmlformats.org/presentationml/2006/main">
+  <p:cSld>
+    <p:spTree>
+      <p:nvGrpSpPr>
+        <p:cNvPr id="1" name=""/>
+        <p:cNvGrpSpPr/>
+        <p:nvPr/>
+      </p:nvGrpSpPr>
+      <p:grpSpPr>
+        <a:xfrm>
+          <a:off x="0" y="0"/>
+          <a:ext cx="0" cy="0"/>
+          <a:chOff x="0" y="0"/>
+          <a:chExt cx="0" cy="0"/>
+        </a:xfrm>
+      </p:grpSpPr>
+      <p:sp>
+        <p:nvSpPr>
+          <p:cNvPr id="2" name="Title 1">
+            <a:extLst>
+              <a:ext uri="{FF2B5EF4-FFF2-40B4-BE49-F238E27FC236}">
+                <a16:creationId xmlns:a16="http://schemas.microsoft.com/office/drawing/2014/main" id="{638D4F7A-95B4-42BA-82AF-5516C3E97193}"/>
+              </a:ext>
+            </a:extLst>
+          </p:cNvPr>
+          <p:cNvSpPr>
+            <a:spLocks noGrp="1"/>
+          </p:cNvSpPr>
+          <p:nvPr>
+            <p:ph type="title"/>
+          </p:nvPr>
+        </p:nvSpPr>
+        <p:spPr/>
+        <p:txBody>
+          <a:bodyPr/>
+          <a:lstStyle/>
+          <a:p>
+            <a:endParaRPr lang="en-US"/>
+          </a:p>
+        </p:txBody>
+      </p:sp>
+      <p:sp>
+        <p:nvSpPr>
+          <p:cNvPr id="3" name="Content Placeholder 2">
+            <a:extLst>
+              <a:ext uri="{FF2B5EF4-FFF2-40B4-BE49-F238E27FC236}">
+                <a16:creationId xmlns:a16="http://schemas.microsoft.com/office/drawing/2014/main" id="{8478FBF7-AA29-40E4-AE5E-EF359E64C777}"/>
+              </a:ext>
+            </a:extLst>
+          </p:cNvPr>
+          <p:cNvSpPr>
+            <a:spLocks noGrp="1"/>
+          </p:cNvSpPr>
+          <p:nvPr>
+            <p:ph idx="1"/>
+          </p:nvPr>
+        </p:nvSpPr>
+        <p:spPr/>
+        <p:txBody>
+          <a:bodyPr/>
+          <a:lstStyle/>
+          <a:p>
+            <a:pPr fontAlgn="base"/>
+            <a:r>
+              <a:rPr lang="en-US" dirty="0">
+                <a:solidFill>
+                  <a:srgbClr val="FF0000"/>
+                </a:solidFill>
+              </a:rPr>
+              <a:t>R Square</a:t>
+            </a:r>
+          </a:p>
+          <a:p>
+            <a:pPr fontAlgn="base"/>
+            <a:r>
+              <a:rPr lang="en-US" dirty="0">
+                <a:solidFill>
+                  <a:srgbClr val="FF0000"/>
+                </a:solidFill>
+              </a:rPr>
+              <a:t>R Square equals 0.962, which is a very good fit. 96% of the variation in Quantity Sold is explained by the independent variables Price and Advertising. The closer to 1, the better the regression line (read on) fits the data.</a:t>
+            </a:r>
+          </a:p>
+          <a:p>
+            <a:endParaRPr lang="en-US" dirty="0"/>
+          </a:p>
+        </p:txBody>
+      </p:sp>
+    </p:spTree>
+    <p:extLst>
+      <p:ext uri="{BB962C8B-B14F-4D97-AF65-F5344CB8AC3E}">
+        <p14:creationId xmlns:p14="http://schemas.microsoft.com/office/powerpoint/2010/main" val="3204994572"/>
+      </p:ext>
+    </p:extLst>
+  </p:cSld>
+  <p:clrMapOvr>
+    <a:masterClrMapping/>
+  </p:clrMapOvr>
+</p:sld>
+</file>
+
 <file path=ppt/slides/slide2.xml><?xml version="1.0" encoding="utf-8"?>
 <p:sld xmlns:a="http://schemas.openxmlformats.org/drawingml/2006/main" xmlns:r="http://schemas.openxmlformats.org/officeDocument/2006/relationships" xmlns:p="http://schemas.openxmlformats.org/presentationml/2006/main">
   <p:cSld>

</xml_diff>

<commit_message>
photos added to power point
</commit_message>
<xml_diff>
--- a/Project_1_Team_7_Presentation.pptx
+++ b/Project_1_Team_7_Presentation.pptx
@@ -6973,6 +6973,42 @@
           </a:p>
         </p:txBody>
       </p:sp>
+      <p:pic>
+        <p:nvPicPr>
+          <p:cNvPr id="4" name="Picture 3">
+            <a:extLst>
+              <a:ext uri="{FF2B5EF4-FFF2-40B4-BE49-F238E27FC236}">
+                <a16:creationId xmlns:a16="http://schemas.microsoft.com/office/drawing/2014/main" id="{1E0E9D8E-53FE-4842-8E4B-1F399161780F}"/>
+              </a:ext>
+            </a:extLst>
+          </p:cNvPr>
+          <p:cNvPicPr>
+            <a:picLocks noChangeAspect="1"/>
+          </p:cNvPicPr>
+          <p:nvPr/>
+        </p:nvPicPr>
+        <p:blipFill>
+          <a:blip r:embed="rId2">
+            <a:extLst>
+              <a:ext uri="{28A0092B-C50C-407E-A947-70E740481C1C}">
+                <a14:useLocalDpi xmlns:a14="http://schemas.microsoft.com/office/drawing/2010/main" val="0"/>
+              </a:ext>
+            </a:extLst>
+          </a:blip>
+          <a:stretch>
+            <a:fillRect/>
+          </a:stretch>
+        </p:blipFill>
+        <p:spPr>
+          <a:xfrm>
+            <a:off x="4291923" y="3615397"/>
+            <a:ext cx="2113097" cy="2239107"/>
+          </a:xfrm>
+          <a:prstGeom prst="rect">
+            <a:avLst/>
+          </a:prstGeom>
+        </p:spPr>
+      </p:pic>
     </p:spTree>
     <p:extLst>
       <p:ext uri="{BB962C8B-B14F-4D97-AF65-F5344CB8AC3E}">
@@ -8143,8 +8179,8 @@
         </p:blipFill>
         <p:spPr>
           <a:xfrm>
-            <a:off x="1716258" y="205650"/>
-            <a:ext cx="8334576" cy="6250933"/>
+            <a:off x="1716257" y="205650"/>
+            <a:ext cx="8391497" cy="6293624"/>
           </a:xfrm>
         </p:spPr>
       </p:pic>

</xml_diff>

<commit_message>
regresion anlysis and correlation analysis combines in 1 slayt
</commit_message>
<xml_diff>
--- a/Project_1_Team_7_Presentation.pptx
+++ b/Project_1_Team_7_Presentation.pptx
@@ -11,16 +11,8 @@
     <p:sldId id="258" r:id="rId5"/>
     <p:sldId id="259" r:id="rId6"/>
     <p:sldId id="260" r:id="rId7"/>
-    <p:sldId id="262" r:id="rId8"/>
-    <p:sldId id="266" r:id="rId9"/>
-    <p:sldId id="265" r:id="rId10"/>
-    <p:sldId id="267" r:id="rId11"/>
-    <p:sldId id="264" r:id="rId12"/>
-    <p:sldId id="263" r:id="rId13"/>
-    <p:sldId id="271" r:id="rId14"/>
-    <p:sldId id="269" r:id="rId15"/>
-    <p:sldId id="268" r:id="rId16"/>
-    <p:sldId id="270" r:id="rId17"/>
+    <p:sldId id="272" r:id="rId8"/>
+    <p:sldId id="265" r:id="rId9"/>
   </p:sldIdLst>
   <p:sldSz cx="12192000" cy="6858000"/>
   <p:notesSz cx="6858000" cy="9144000"/>
@@ -317,7 +309,7 @@
           <a:p>
             <a:fld id="{EB5372E6-5C80-43C9-AA4A-63A6D2675B67}" type="datetimeFigureOut">
               <a:rPr lang="en-US" smtClean="0"/>
-              <a:t>4/11/2018</a:t>
+              <a:t>4/12/2018</a:t>
             </a:fld>
             <a:endParaRPr lang="en-US"/>
           </a:p>
@@ -592,7 +584,7 @@
           <a:p>
             <a:fld id="{EB5372E6-5C80-43C9-AA4A-63A6D2675B67}" type="datetimeFigureOut">
               <a:rPr lang="en-US" smtClean="0"/>
-              <a:t>4/11/2018</a:t>
+              <a:t>4/12/2018</a:t>
             </a:fld>
             <a:endParaRPr lang="en-US"/>
           </a:p>
@@ -786,7 +778,7 @@
           <a:p>
             <a:fld id="{EB5372E6-5C80-43C9-AA4A-63A6D2675B67}" type="datetimeFigureOut">
               <a:rPr lang="en-US" smtClean="0"/>
-              <a:t>4/11/2018</a:t>
+              <a:t>4/12/2018</a:t>
             </a:fld>
             <a:endParaRPr lang="en-US"/>
           </a:p>
@@ -1059,7 +1051,7 @@
           <a:p>
             <a:fld id="{EB5372E6-5C80-43C9-AA4A-63A6D2675B67}" type="datetimeFigureOut">
               <a:rPr lang="en-US" smtClean="0"/>
-              <a:t>4/11/2018</a:t>
+              <a:t>4/12/2018</a:t>
             </a:fld>
             <a:endParaRPr lang="en-US"/>
           </a:p>
@@ -1400,7 +1392,7 @@
           <a:p>
             <a:fld id="{EB5372E6-5C80-43C9-AA4A-63A6D2675B67}" type="datetimeFigureOut">
               <a:rPr lang="en-US" smtClean="0"/>
-              <a:t>4/11/2018</a:t>
+              <a:t>4/12/2018</a:t>
             </a:fld>
             <a:endParaRPr lang="en-US"/>
           </a:p>
@@ -2023,7 +2015,7 @@
           <a:p>
             <a:fld id="{EB5372E6-5C80-43C9-AA4A-63A6D2675B67}" type="datetimeFigureOut">
               <a:rPr lang="en-US" smtClean="0"/>
-              <a:t>4/11/2018</a:t>
+              <a:t>4/12/2018</a:t>
             </a:fld>
             <a:endParaRPr lang="en-US"/>
           </a:p>
@@ -2883,7 +2875,7 @@
           <a:p>
             <a:fld id="{EB5372E6-5C80-43C9-AA4A-63A6D2675B67}" type="datetimeFigureOut">
               <a:rPr lang="en-US" smtClean="0"/>
-              <a:t>4/11/2018</a:t>
+              <a:t>4/12/2018</a:t>
             </a:fld>
             <a:endParaRPr lang="en-US"/>
           </a:p>
@@ -3053,7 +3045,7 @@
           <a:p>
             <a:fld id="{EB5372E6-5C80-43C9-AA4A-63A6D2675B67}" type="datetimeFigureOut">
               <a:rPr lang="en-US" smtClean="0"/>
-              <a:t>4/11/2018</a:t>
+              <a:t>4/12/2018</a:t>
             </a:fld>
             <a:endParaRPr lang="en-US"/>
           </a:p>
@@ -3233,7 +3225,7 @@
           <a:p>
             <a:fld id="{EB5372E6-5C80-43C9-AA4A-63A6D2675B67}" type="datetimeFigureOut">
               <a:rPr lang="en-US" smtClean="0"/>
-              <a:t>4/11/2018</a:t>
+              <a:t>4/12/2018</a:t>
             </a:fld>
             <a:endParaRPr lang="en-US"/>
           </a:p>
@@ -3403,7 +3395,7 @@
           <a:p>
             <a:fld id="{EB5372E6-5C80-43C9-AA4A-63A6D2675B67}" type="datetimeFigureOut">
               <a:rPr lang="en-US" smtClean="0"/>
-              <a:t>4/11/2018</a:t>
+              <a:t>4/12/2018</a:t>
             </a:fld>
             <a:endParaRPr lang="en-US"/>
           </a:p>
@@ -3650,7 +3642,7 @@
           <a:p>
             <a:fld id="{EB5372E6-5C80-43C9-AA4A-63A6D2675B67}" type="datetimeFigureOut">
               <a:rPr lang="en-US" smtClean="0"/>
-              <a:t>4/11/2018</a:t>
+              <a:t>4/12/2018</a:t>
             </a:fld>
             <a:endParaRPr lang="en-US"/>
           </a:p>
@@ -3942,7 +3934,7 @@
           <a:p>
             <a:fld id="{EB5372E6-5C80-43C9-AA4A-63A6D2675B67}" type="datetimeFigureOut">
               <a:rPr lang="en-US" smtClean="0"/>
-              <a:t>4/11/2018</a:t>
+              <a:t>4/12/2018</a:t>
             </a:fld>
             <a:endParaRPr lang="en-US"/>
           </a:p>
@@ -4386,7 +4378,7 @@
           <a:p>
             <a:fld id="{EB5372E6-5C80-43C9-AA4A-63A6D2675B67}" type="datetimeFigureOut">
               <a:rPr lang="en-US" smtClean="0"/>
-              <a:t>4/11/2018</a:t>
+              <a:t>4/12/2018</a:t>
             </a:fld>
             <a:endParaRPr lang="en-US"/>
           </a:p>
@@ -4504,7 +4496,7 @@
           <a:p>
             <a:fld id="{EB5372E6-5C80-43C9-AA4A-63A6D2675B67}" type="datetimeFigureOut">
               <a:rPr lang="en-US" smtClean="0"/>
-              <a:t>4/11/2018</a:t>
+              <a:t>4/12/2018</a:t>
             </a:fld>
             <a:endParaRPr lang="en-US"/>
           </a:p>
@@ -4599,7 +4591,7 @@
           <a:p>
             <a:fld id="{EB5372E6-5C80-43C9-AA4A-63A6D2675B67}" type="datetimeFigureOut">
               <a:rPr lang="en-US" smtClean="0"/>
-              <a:t>4/11/2018</a:t>
+              <a:t>4/12/2018</a:t>
             </a:fld>
             <a:endParaRPr lang="en-US"/>
           </a:p>
@@ -4878,7 +4870,7 @@
           <a:p>
             <a:fld id="{EB5372E6-5C80-43C9-AA4A-63A6D2675B67}" type="datetimeFigureOut">
               <a:rPr lang="en-US" smtClean="0"/>
-              <a:t>4/11/2018</a:t>
+              <a:t>4/12/2018</a:t>
             </a:fld>
             <a:endParaRPr lang="en-US"/>
           </a:p>
@@ -5153,7 +5145,7 @@
           <a:p>
             <a:fld id="{EB5372E6-5C80-43C9-AA4A-63A6D2675B67}" type="datetimeFigureOut">
               <a:rPr lang="en-US" smtClean="0"/>
-              <a:t>4/11/2018</a:t>
+              <a:t>4/12/2018</a:t>
             </a:fld>
             <a:endParaRPr lang="en-US"/>
           </a:p>
@@ -5582,7 +5574,7 @@
           <a:p>
             <a:fld id="{EB5372E6-5C80-43C9-AA4A-63A6D2675B67}" type="datetimeFigureOut">
               <a:rPr lang="en-US" smtClean="0"/>
-              <a:t>4/11/2018</a:t>
+              <a:t>4/12/2018</a:t>
             </a:fld>
             <a:endParaRPr lang="en-US"/>
           </a:p>
@@ -6153,31 +6145,6 @@
           </a:p>
         </p:txBody>
       </p:sp>
-      <p:sp>
-        <p:nvSpPr>
-          <p:cNvPr id="3" name="Subtitle 2">
-            <a:extLst>
-              <a:ext uri="{FF2B5EF4-FFF2-40B4-BE49-F238E27FC236}">
-                <a16:creationId xmlns:a16="http://schemas.microsoft.com/office/drawing/2014/main" id="{2A7911BC-15FE-432E-94C7-8158BCDE6AE4}"/>
-              </a:ext>
-            </a:extLst>
-          </p:cNvPr>
-          <p:cNvSpPr>
-            <a:spLocks noGrp="1"/>
-          </p:cNvSpPr>
-          <p:nvPr>
-            <p:ph type="subTitle" idx="1"/>
-          </p:nvPr>
-        </p:nvSpPr>
-        <p:spPr/>
-        <p:txBody>
-          <a:bodyPr/>
-          <a:lstStyle/>
-          <a:p>
-            <a:endParaRPr lang="en-US" dirty="0"/>
-          </a:p>
-        </p:txBody>
-      </p:sp>
       <p:pic>
         <p:nvPicPr>
           <p:cNvPr id="5" name="Picture 4">
@@ -6218,1106 +6185,6 @@
     <p:extLst>
       <p:ext uri="{BB962C8B-B14F-4D97-AF65-F5344CB8AC3E}">
         <p14:creationId xmlns:p14="http://schemas.microsoft.com/office/powerpoint/2010/main" val="3193065559"/>
-      </p:ext>
-    </p:extLst>
-  </p:cSld>
-  <p:clrMapOvr>
-    <a:masterClrMapping/>
-  </p:clrMapOvr>
-</p:sld>
-</file>
-
-<file path=ppt/slides/slide10.xml><?xml version="1.0" encoding="utf-8"?>
-<p:sld xmlns:a="http://schemas.openxmlformats.org/drawingml/2006/main" xmlns:r="http://schemas.openxmlformats.org/officeDocument/2006/relationships" xmlns:p="http://schemas.openxmlformats.org/presentationml/2006/main">
-  <p:cSld>
-    <p:spTree>
-      <p:nvGrpSpPr>
-        <p:cNvPr id="1" name=""/>
-        <p:cNvGrpSpPr/>
-        <p:nvPr/>
-      </p:nvGrpSpPr>
-      <p:grpSpPr>
-        <a:xfrm>
-          <a:off x="0" y="0"/>
-          <a:ext cx="0" cy="0"/>
-          <a:chOff x="0" y="0"/>
-          <a:chExt cx="0" cy="0"/>
-        </a:xfrm>
-      </p:grpSpPr>
-      <p:sp>
-        <p:nvSpPr>
-          <p:cNvPr id="2" name="Title 1">
-            <a:extLst>
-              <a:ext uri="{FF2B5EF4-FFF2-40B4-BE49-F238E27FC236}">
-                <a16:creationId xmlns:a16="http://schemas.microsoft.com/office/drawing/2014/main" id="{52D8E120-84A6-4AA7-8B39-5A660C266F05}"/>
-              </a:ext>
-            </a:extLst>
-          </p:cNvPr>
-          <p:cNvSpPr>
-            <a:spLocks noGrp="1"/>
-          </p:cNvSpPr>
-          <p:nvPr>
-            <p:ph type="title"/>
-          </p:nvPr>
-        </p:nvSpPr>
-        <p:spPr/>
-        <p:txBody>
-          <a:bodyPr/>
-          <a:lstStyle/>
-          <a:p>
-            <a:pPr algn="ctr"/>
-            <a:r>
-              <a:rPr lang="en-US" dirty="0"/>
-              <a:t>Correlation Test</a:t>
-            </a:r>
-          </a:p>
-        </p:txBody>
-      </p:sp>
-      <p:sp>
-        <p:nvSpPr>
-          <p:cNvPr id="4" name="Content Placeholder 3">
-            <a:extLst>
-              <a:ext uri="{FF2B5EF4-FFF2-40B4-BE49-F238E27FC236}">
-                <a16:creationId xmlns:a16="http://schemas.microsoft.com/office/drawing/2014/main" id="{E7B5DD4C-760C-4B19-AF25-337D315BCF07}"/>
-              </a:ext>
-            </a:extLst>
-          </p:cNvPr>
-          <p:cNvSpPr txBox="1">
-            <a:spLocks noGrp="1"/>
-          </p:cNvSpPr>
-          <p:nvPr>
-            <p:ph idx="1"/>
-          </p:nvPr>
-        </p:nvSpPr>
-        <p:spPr>
-          <a:xfrm>
-            <a:off x="1104293" y="1532414"/>
-            <a:ext cx="8946541" cy="4298613"/>
-          </a:xfrm>
-          <a:prstGeom prst="rect">
-            <a:avLst/>
-          </a:prstGeom>
-          <a:noFill/>
-        </p:spPr>
-        <p:txBody>
-          <a:bodyPr wrap="square" rtlCol="0">
-            <a:spAutoFit/>
-          </a:bodyPr>
-          <a:lstStyle/>
-          <a:p>
-            <a:pPr marL="0" indent="0">
-              <a:buNone/>
-            </a:pPr>
-            <a:r>
-              <a:rPr lang="en-US" b="1" i="1" dirty="0"/>
-              <a:t>	Pearson r correlation:</a:t>
-            </a:r>
-            <a:r>
-              <a:rPr lang="en-US" dirty="0"/>
-              <a:t> Pearson </a:t>
-            </a:r>
-            <a:r>
-              <a:rPr lang="en-US" i="1" dirty="0"/>
-              <a:t>r</a:t>
-            </a:r>
-            <a:r>
-              <a:rPr lang="en-US" dirty="0"/>
-              <a:t> correlation is the most widely used correlation statistic to measure the degree of the relationship.  For example, in the stock market, if we want to measure how two stocks are related to each other, Pearson </a:t>
-            </a:r>
-            <a:r>
-              <a:rPr lang="en-US" i="1" dirty="0"/>
-              <a:t>r</a:t>
-            </a:r>
-            <a:r>
-              <a:rPr lang="en-US" dirty="0"/>
-              <a:t> correlation is used to measure the degree of relationship between the two. </a:t>
-            </a:r>
-          </a:p>
-          <a:p>
-            <a:endParaRPr lang="en-US" dirty="0"/>
-          </a:p>
-          <a:p>
-            <a:pPr marL="0" indent="0">
-              <a:buNone/>
-            </a:pPr>
-            <a:r>
-              <a:rPr lang="en-US" dirty="0"/>
-              <a:t>	Correlation coefficients between </a:t>
-            </a:r>
-            <a:r>
-              <a:rPr lang="en-US" dirty="0">
-                <a:solidFill>
-                  <a:srgbClr val="FF0000"/>
-                </a:solidFill>
-              </a:rPr>
-              <a:t>0.10 and 0.29 </a:t>
-            </a:r>
-            <a:r>
-              <a:rPr lang="en-US" dirty="0"/>
-              <a:t>represent a small association or relationship, </a:t>
-            </a:r>
-          </a:p>
-          <a:p>
-            <a:pPr marL="0" indent="0">
-              <a:buNone/>
-            </a:pPr>
-            <a:r>
-              <a:rPr lang="en-US" dirty="0"/>
-              <a:t>	Correlation coefficients between </a:t>
-            </a:r>
-            <a:r>
-              <a:rPr lang="en-US" dirty="0">
-                <a:solidFill>
-                  <a:srgbClr val="FF0000"/>
-                </a:solidFill>
-              </a:rPr>
-              <a:t>0.30 and 0.49 </a:t>
-            </a:r>
-            <a:r>
-              <a:rPr lang="en-US" dirty="0"/>
-              <a:t>represent a medium association or relationship,</a:t>
-            </a:r>
-          </a:p>
-          <a:p>
-            <a:pPr marL="0" indent="0">
-              <a:buNone/>
-            </a:pPr>
-            <a:r>
-              <a:rPr lang="en-US" dirty="0"/>
-              <a:t>	Correlation coefficients of </a:t>
-            </a:r>
-            <a:r>
-              <a:rPr lang="en-US" dirty="0">
-                <a:solidFill>
-                  <a:srgbClr val="FF0000"/>
-                </a:solidFill>
-              </a:rPr>
-              <a:t>0.50 and above </a:t>
-            </a:r>
-            <a:r>
-              <a:rPr lang="en-US" dirty="0"/>
-              <a:t>represent a large association or relationship.</a:t>
-            </a:r>
-          </a:p>
-        </p:txBody>
-      </p:sp>
-    </p:spTree>
-    <p:extLst>
-      <p:ext uri="{BB962C8B-B14F-4D97-AF65-F5344CB8AC3E}">
-        <p14:creationId xmlns:p14="http://schemas.microsoft.com/office/powerpoint/2010/main" val="2588135083"/>
-      </p:ext>
-    </p:extLst>
-  </p:cSld>
-  <p:clrMapOvr>
-    <a:masterClrMapping/>
-  </p:clrMapOvr>
-</p:sld>
-</file>
-
-<file path=ppt/slides/slide11.xml><?xml version="1.0" encoding="utf-8"?>
-<p:sld xmlns:a="http://schemas.openxmlformats.org/drawingml/2006/main" xmlns:r="http://schemas.openxmlformats.org/officeDocument/2006/relationships" xmlns:p="http://schemas.openxmlformats.org/presentationml/2006/main">
-  <p:cSld>
-    <p:spTree>
-      <p:nvGrpSpPr>
-        <p:cNvPr id="1" name=""/>
-        <p:cNvGrpSpPr/>
-        <p:nvPr/>
-      </p:nvGrpSpPr>
-      <p:grpSpPr>
-        <a:xfrm>
-          <a:off x="0" y="0"/>
-          <a:ext cx="0" cy="0"/>
-          <a:chOff x="0" y="0"/>
-          <a:chExt cx="0" cy="0"/>
-        </a:xfrm>
-      </p:grpSpPr>
-      <p:sp>
-        <p:nvSpPr>
-          <p:cNvPr id="2" name="Title 1">
-            <a:extLst>
-              <a:ext uri="{FF2B5EF4-FFF2-40B4-BE49-F238E27FC236}">
-                <a16:creationId xmlns:a16="http://schemas.microsoft.com/office/drawing/2014/main" id="{3FA549DD-F4D4-473D-B798-C3DDEC97BB0E}"/>
-              </a:ext>
-            </a:extLst>
-          </p:cNvPr>
-          <p:cNvSpPr>
-            <a:spLocks noGrp="1"/>
-          </p:cNvSpPr>
-          <p:nvPr>
-            <p:ph type="title"/>
-          </p:nvPr>
-        </p:nvSpPr>
-        <p:spPr/>
-        <p:txBody>
-          <a:bodyPr/>
-          <a:lstStyle/>
-          <a:p>
-            <a:pPr algn="ctr"/>
-            <a:r>
-              <a:rPr lang="en-US" dirty="0"/>
-              <a:t>Correlation Test Result for</a:t>
-            </a:r>
-            <a:br>
-              <a:rPr lang="en-US" dirty="0"/>
-            </a:br>
-            <a:r>
-              <a:rPr lang="en-US" dirty="0"/>
-              <a:t> Happiness – GDP Per Capita</a:t>
-            </a:r>
-          </a:p>
-        </p:txBody>
-      </p:sp>
-      <p:sp>
-        <p:nvSpPr>
-          <p:cNvPr id="20" name="Rectangle 19">
-            <a:extLst>
-              <a:ext uri="{FF2B5EF4-FFF2-40B4-BE49-F238E27FC236}">
-                <a16:creationId xmlns:a16="http://schemas.microsoft.com/office/drawing/2014/main" id="{EFDB967E-1F4D-4AE0-AF65-7EEE17F48A91}"/>
-              </a:ext>
-            </a:extLst>
-          </p:cNvPr>
-          <p:cNvSpPr/>
-          <p:nvPr/>
-        </p:nvSpPr>
-        <p:spPr>
-          <a:xfrm>
-            <a:off x="964334" y="3095339"/>
-            <a:ext cx="5793574" cy="461665"/>
-          </a:xfrm>
-          <a:prstGeom prst="rect">
-            <a:avLst/>
-          </a:prstGeom>
-        </p:spPr>
-        <p:txBody>
-          <a:bodyPr wrap="none">
-            <a:spAutoFit/>
-          </a:bodyPr>
-          <a:lstStyle/>
-          <a:p>
-            <a:r>
-              <a:rPr lang="en-US" sz="2400" i="1" dirty="0"/>
-              <a:t>r</a:t>
-            </a:r>
-            <a:r>
-              <a:rPr lang="en-US" sz="2400" dirty="0"/>
-              <a:t>  (Pearson r correlation coefficient) = </a:t>
-            </a:r>
-          </a:p>
-        </p:txBody>
-      </p:sp>
-      <p:sp>
-        <p:nvSpPr>
-          <p:cNvPr id="21" name="Rectangle 20">
-            <a:extLst>
-              <a:ext uri="{FF2B5EF4-FFF2-40B4-BE49-F238E27FC236}">
-                <a16:creationId xmlns:a16="http://schemas.microsoft.com/office/drawing/2014/main" id="{4E00E77B-C062-481C-9CBB-0CCA1DFEAF6C}"/>
-              </a:ext>
-            </a:extLst>
-          </p:cNvPr>
-          <p:cNvSpPr/>
-          <p:nvPr/>
-        </p:nvSpPr>
-        <p:spPr>
-          <a:xfrm>
-            <a:off x="7092339" y="3095339"/>
-            <a:ext cx="1009650" cy="368300"/>
-          </a:xfrm>
-          <a:prstGeom prst="rect">
-            <a:avLst/>
-          </a:prstGeom>
-        </p:spPr>
-        <p:txBody>
-          <a:bodyPr wrap="none">
-            <a:spAutoFit/>
-          </a:bodyPr>
-          <a:lstStyle/>
-          <a:p>
-            <a:r>
-              <a:rPr lang="en-US" dirty="0">
-                <a:solidFill>
-                  <a:schemeClr val="tx1">
-                    <a:lumMod val="95000"/>
-                  </a:schemeClr>
-                </a:solidFill>
-                <a:latin typeface="Calibri" panose="020F0502020204030204" pitchFamily="34" charset="0"/>
-              </a:rPr>
-              <a:t>0.73372</a:t>
-            </a:r>
-            <a:r>
-              <a:rPr lang="en-US" dirty="0"/>
-              <a:t> </a:t>
-            </a:r>
-          </a:p>
-        </p:txBody>
-      </p:sp>
-      <p:sp>
-        <p:nvSpPr>
-          <p:cNvPr id="22" name="Rectangle 21">
-            <a:extLst>
-              <a:ext uri="{FF2B5EF4-FFF2-40B4-BE49-F238E27FC236}">
-                <a16:creationId xmlns:a16="http://schemas.microsoft.com/office/drawing/2014/main" id="{D851582D-8B61-4E38-B056-6EF32C85D29E}"/>
-              </a:ext>
-            </a:extLst>
-          </p:cNvPr>
-          <p:cNvSpPr/>
-          <p:nvPr/>
-        </p:nvSpPr>
-        <p:spPr>
-          <a:xfrm>
-            <a:off x="5254496" y="2243461"/>
-            <a:ext cx="3675686" cy="461665"/>
-          </a:xfrm>
-          <a:prstGeom prst="rect">
-            <a:avLst/>
-          </a:prstGeom>
-        </p:spPr>
-        <p:txBody>
-          <a:bodyPr wrap="none">
-            <a:spAutoFit/>
-          </a:bodyPr>
-          <a:lstStyle/>
-          <a:p>
-            <a:r>
-              <a:rPr lang="en-US" sz="2400" dirty="0">
-                <a:solidFill>
-                  <a:schemeClr val="tx1">
-                    <a:lumMod val="95000"/>
-                  </a:schemeClr>
-                </a:solidFill>
-                <a:latin typeface="Calibri" panose="020F0502020204030204" pitchFamily="34" charset="0"/>
-              </a:rPr>
-              <a:t>Happiness - GDP Per Capita</a:t>
-            </a:r>
-            <a:r>
-              <a:rPr lang="en-US" sz="2400" dirty="0">
-                <a:solidFill>
-                  <a:schemeClr val="tx1">
-                    <a:lumMod val="95000"/>
-                  </a:schemeClr>
-                </a:solidFill>
-              </a:rPr>
-              <a:t> </a:t>
-            </a:r>
-          </a:p>
-        </p:txBody>
-      </p:sp>
-      <p:sp>
-        <p:nvSpPr>
-          <p:cNvPr id="24" name="TextBox 23">
-            <a:extLst>
-              <a:ext uri="{FF2B5EF4-FFF2-40B4-BE49-F238E27FC236}">
-                <a16:creationId xmlns:a16="http://schemas.microsoft.com/office/drawing/2014/main" id="{83C146C3-04AD-4FB2-8C47-33B17327843E}"/>
-              </a:ext>
-            </a:extLst>
-          </p:cNvPr>
-          <p:cNvSpPr txBox="1"/>
-          <p:nvPr/>
-        </p:nvSpPr>
-        <p:spPr>
-          <a:xfrm>
-            <a:off x="1083212" y="4318782"/>
-            <a:ext cx="8328074" cy="923330"/>
-          </a:xfrm>
-          <a:prstGeom prst="rect">
-            <a:avLst/>
-          </a:prstGeom>
-          <a:noFill/>
-        </p:spPr>
-        <p:txBody>
-          <a:bodyPr wrap="square" rtlCol="0">
-            <a:spAutoFit/>
-          </a:bodyPr>
-          <a:lstStyle/>
-          <a:p>
-            <a:r>
-              <a:rPr lang="en-US" dirty="0"/>
-              <a:t>According to results of our analysis we can state that there is a strong positive relationship between GDP Per Capita and Happiness Score of a country</a:t>
-            </a:r>
-          </a:p>
-        </p:txBody>
-      </p:sp>
-    </p:spTree>
-    <p:extLst>
-      <p:ext uri="{BB962C8B-B14F-4D97-AF65-F5344CB8AC3E}">
-        <p14:creationId xmlns:p14="http://schemas.microsoft.com/office/powerpoint/2010/main" val="1060732054"/>
-      </p:ext>
-    </p:extLst>
-  </p:cSld>
-  <p:clrMapOvr>
-    <a:masterClrMapping/>
-  </p:clrMapOvr>
-</p:sld>
-</file>
-
-<file path=ppt/slides/slide12.xml><?xml version="1.0" encoding="utf-8"?>
-<p:sld xmlns:a="http://schemas.openxmlformats.org/drawingml/2006/main" xmlns:r="http://schemas.openxmlformats.org/officeDocument/2006/relationships" xmlns:p="http://schemas.openxmlformats.org/presentationml/2006/main">
-  <p:cSld>
-    <p:spTree>
-      <p:nvGrpSpPr>
-        <p:cNvPr id="1" name=""/>
-        <p:cNvGrpSpPr/>
-        <p:nvPr/>
-      </p:nvGrpSpPr>
-      <p:grpSpPr>
-        <a:xfrm>
-          <a:off x="0" y="0"/>
-          <a:ext cx="0" cy="0"/>
-          <a:chOff x="0" y="0"/>
-          <a:chExt cx="0" cy="0"/>
-        </a:xfrm>
-      </p:grpSpPr>
-      <p:sp>
-        <p:nvSpPr>
-          <p:cNvPr id="2" name="Title 1">
-            <a:extLst>
-              <a:ext uri="{FF2B5EF4-FFF2-40B4-BE49-F238E27FC236}">
-                <a16:creationId xmlns:a16="http://schemas.microsoft.com/office/drawing/2014/main" id="{332B1BDD-506F-4787-A390-70C70EE71B8D}"/>
-              </a:ext>
-            </a:extLst>
-          </p:cNvPr>
-          <p:cNvSpPr>
-            <a:spLocks noGrp="1"/>
-          </p:cNvSpPr>
-          <p:nvPr>
-            <p:ph type="title"/>
-          </p:nvPr>
-        </p:nvSpPr>
-        <p:spPr/>
-        <p:txBody>
-          <a:bodyPr/>
-          <a:lstStyle/>
-          <a:p>
-            <a:pPr algn="ctr"/>
-            <a:r>
-              <a:rPr lang="en-US" dirty="0"/>
-              <a:t>Correlation Test Result for</a:t>
-            </a:r>
-            <a:br>
-              <a:rPr lang="en-US" dirty="0"/>
-            </a:br>
-            <a:r>
-              <a:rPr lang="en-US" dirty="0"/>
-              <a:t> Happiness – Birth Rate</a:t>
-            </a:r>
-          </a:p>
-        </p:txBody>
-      </p:sp>
-      <p:sp>
-        <p:nvSpPr>
-          <p:cNvPr id="11" name="Rectangle 10">
-            <a:extLst>
-              <a:ext uri="{FF2B5EF4-FFF2-40B4-BE49-F238E27FC236}">
-                <a16:creationId xmlns:a16="http://schemas.microsoft.com/office/drawing/2014/main" id="{7985DDFE-34DB-4964-BEE2-40C9C6DFDBF7}"/>
-              </a:ext>
-            </a:extLst>
-          </p:cNvPr>
-          <p:cNvSpPr/>
-          <p:nvPr/>
-        </p:nvSpPr>
-        <p:spPr>
-          <a:xfrm>
-            <a:off x="964334" y="3095339"/>
-            <a:ext cx="5793574" cy="461665"/>
-          </a:xfrm>
-          <a:prstGeom prst="rect">
-            <a:avLst/>
-          </a:prstGeom>
-        </p:spPr>
-        <p:txBody>
-          <a:bodyPr wrap="none">
-            <a:spAutoFit/>
-          </a:bodyPr>
-          <a:lstStyle/>
-          <a:p>
-            <a:r>
-              <a:rPr lang="en-US" sz="2400" i="1" dirty="0"/>
-              <a:t>r</a:t>
-            </a:r>
-            <a:r>
-              <a:rPr lang="en-US" sz="2400" dirty="0"/>
-              <a:t>  (Pearson r correlation coefficient) = </a:t>
-            </a:r>
-          </a:p>
-        </p:txBody>
-      </p:sp>
-      <p:sp>
-        <p:nvSpPr>
-          <p:cNvPr id="12" name="Rectangle 11">
-            <a:extLst>
-              <a:ext uri="{FF2B5EF4-FFF2-40B4-BE49-F238E27FC236}">
-                <a16:creationId xmlns:a16="http://schemas.microsoft.com/office/drawing/2014/main" id="{EA844962-4085-4A2F-BC12-5147E6B63378}"/>
-              </a:ext>
-            </a:extLst>
-          </p:cNvPr>
-          <p:cNvSpPr/>
-          <p:nvPr/>
-        </p:nvSpPr>
-        <p:spPr>
-          <a:xfrm>
-            <a:off x="7092339" y="3095339"/>
-            <a:ext cx="1329210" cy="738664"/>
-          </a:xfrm>
-          <a:prstGeom prst="rect">
-            <a:avLst/>
-          </a:prstGeom>
-        </p:spPr>
-        <p:txBody>
-          <a:bodyPr wrap="none">
-            <a:spAutoFit/>
-          </a:bodyPr>
-          <a:lstStyle/>
-          <a:p>
-            <a:r>
-              <a:rPr lang="en-US" dirty="0">
-                <a:solidFill>
-                  <a:srgbClr val="000000"/>
-                </a:solidFill>
-                <a:latin typeface="Calibri" panose="020F0502020204030204" pitchFamily="34" charset="0"/>
-              </a:rPr>
-              <a:t>-</a:t>
-            </a:r>
-            <a:r>
-              <a:rPr lang="en-US" sz="2400" dirty="0">
-                <a:solidFill>
-                  <a:schemeClr val="tx1">
-                    <a:lumMod val="95000"/>
-                  </a:schemeClr>
-                </a:solidFill>
-                <a:latin typeface="Calibri" panose="020F0502020204030204" pitchFamily="34" charset="0"/>
-              </a:rPr>
-              <a:t>0.32519</a:t>
-            </a:r>
-            <a:r>
-              <a:rPr lang="en-US" dirty="0"/>
-              <a:t> </a:t>
-            </a:r>
-          </a:p>
-          <a:p>
-            <a:r>
-              <a:rPr lang="en-US" dirty="0"/>
-              <a:t> </a:t>
-            </a:r>
-          </a:p>
-        </p:txBody>
-      </p:sp>
-      <p:sp>
-        <p:nvSpPr>
-          <p:cNvPr id="14" name="Rectangle 13">
-            <a:extLst>
-              <a:ext uri="{FF2B5EF4-FFF2-40B4-BE49-F238E27FC236}">
-                <a16:creationId xmlns:a16="http://schemas.microsoft.com/office/drawing/2014/main" id="{C1213706-3723-4309-8AD5-A6944F14F19C}"/>
-              </a:ext>
-            </a:extLst>
-          </p:cNvPr>
-          <p:cNvSpPr/>
-          <p:nvPr/>
-        </p:nvSpPr>
-        <p:spPr>
-          <a:xfrm>
-            <a:off x="5254496" y="2243461"/>
-            <a:ext cx="3675686" cy="461665"/>
-          </a:xfrm>
-          <a:prstGeom prst="rect">
-            <a:avLst/>
-          </a:prstGeom>
-        </p:spPr>
-        <p:txBody>
-          <a:bodyPr wrap="none">
-            <a:spAutoFit/>
-          </a:bodyPr>
-          <a:lstStyle/>
-          <a:p>
-            <a:r>
-              <a:rPr lang="en-US" sz="2400" dirty="0">
-                <a:solidFill>
-                  <a:schemeClr val="tx1">
-                    <a:lumMod val="95000"/>
-                  </a:schemeClr>
-                </a:solidFill>
-                <a:latin typeface="Calibri" panose="020F0502020204030204" pitchFamily="34" charset="0"/>
-              </a:rPr>
-              <a:t>Happiness - GDP Per Capita</a:t>
-            </a:r>
-            <a:r>
-              <a:rPr lang="en-US" sz="2400" dirty="0">
-                <a:solidFill>
-                  <a:schemeClr val="tx1">
-                    <a:lumMod val="95000"/>
-                  </a:schemeClr>
-                </a:solidFill>
-              </a:rPr>
-              <a:t> </a:t>
-            </a:r>
-          </a:p>
-        </p:txBody>
-      </p:sp>
-      <p:sp>
-        <p:nvSpPr>
-          <p:cNvPr id="15" name="TextBox 14">
-            <a:extLst>
-              <a:ext uri="{FF2B5EF4-FFF2-40B4-BE49-F238E27FC236}">
-                <a16:creationId xmlns:a16="http://schemas.microsoft.com/office/drawing/2014/main" id="{C46F7A4E-24DB-45BF-AF39-94257B642867}"/>
-              </a:ext>
-            </a:extLst>
-          </p:cNvPr>
-          <p:cNvSpPr txBox="1"/>
-          <p:nvPr/>
-        </p:nvSpPr>
-        <p:spPr>
-          <a:xfrm>
-            <a:off x="1083212" y="4318782"/>
-            <a:ext cx="8328074" cy="923330"/>
-          </a:xfrm>
-          <a:prstGeom prst="rect">
-            <a:avLst/>
-          </a:prstGeom>
-          <a:noFill/>
-        </p:spPr>
-        <p:txBody>
-          <a:bodyPr wrap="square" rtlCol="0">
-            <a:spAutoFit/>
-          </a:bodyPr>
-          <a:lstStyle/>
-          <a:p>
-            <a:r>
-              <a:rPr lang="en-US" dirty="0"/>
-              <a:t>According to results of our analysis we can state that there is a medium negative relationship between Birth Rate and Happiness Score of a country</a:t>
-            </a:r>
-          </a:p>
-        </p:txBody>
-      </p:sp>
-    </p:spTree>
-    <p:extLst>
-      <p:ext uri="{BB962C8B-B14F-4D97-AF65-F5344CB8AC3E}">
-        <p14:creationId xmlns:p14="http://schemas.microsoft.com/office/powerpoint/2010/main" val="3871210490"/>
-      </p:ext>
-    </p:extLst>
-  </p:cSld>
-  <p:clrMapOvr>
-    <a:masterClrMapping/>
-  </p:clrMapOvr>
-</p:sld>
-</file>
-
-<file path=ppt/slides/slide13.xml><?xml version="1.0" encoding="utf-8"?>
-<p:sld xmlns:a="http://schemas.openxmlformats.org/drawingml/2006/main" xmlns:r="http://schemas.openxmlformats.org/officeDocument/2006/relationships" xmlns:p="http://schemas.openxmlformats.org/presentationml/2006/main">
-  <p:cSld>
-    <p:spTree>
-      <p:nvGrpSpPr>
-        <p:cNvPr id="1" name=""/>
-        <p:cNvGrpSpPr/>
-        <p:nvPr/>
-      </p:nvGrpSpPr>
-      <p:grpSpPr>
-        <a:xfrm>
-          <a:off x="0" y="0"/>
-          <a:ext cx="0" cy="0"/>
-          <a:chOff x="0" y="0"/>
-          <a:chExt cx="0" cy="0"/>
-        </a:xfrm>
-      </p:grpSpPr>
-      <p:sp>
-        <p:nvSpPr>
-          <p:cNvPr id="2" name="Title 1">
-            <a:extLst>
-              <a:ext uri="{FF2B5EF4-FFF2-40B4-BE49-F238E27FC236}">
-                <a16:creationId xmlns:a16="http://schemas.microsoft.com/office/drawing/2014/main" id="{9FD42EA0-B6D9-4787-AC3B-6BFD24FB3858}"/>
-              </a:ext>
-            </a:extLst>
-          </p:cNvPr>
-          <p:cNvSpPr>
-            <a:spLocks noGrp="1"/>
-          </p:cNvSpPr>
-          <p:nvPr>
-            <p:ph type="title"/>
-          </p:nvPr>
-        </p:nvSpPr>
-        <p:spPr/>
-        <p:txBody>
-          <a:bodyPr/>
-          <a:lstStyle/>
-          <a:p>
-            <a:pPr algn="ctr"/>
-            <a:r>
-              <a:rPr lang="en-US" dirty="0"/>
-              <a:t>Regression Analysis</a:t>
-            </a:r>
-          </a:p>
-        </p:txBody>
-      </p:sp>
-      <p:sp>
-        <p:nvSpPr>
-          <p:cNvPr id="3" name="Content Placeholder 2">
-            <a:extLst>
-              <a:ext uri="{FF2B5EF4-FFF2-40B4-BE49-F238E27FC236}">
-                <a16:creationId xmlns:a16="http://schemas.microsoft.com/office/drawing/2014/main" id="{B0C1DBA9-3580-4B6B-B131-063D8A4CEFAD}"/>
-              </a:ext>
-            </a:extLst>
-          </p:cNvPr>
-          <p:cNvSpPr>
-            <a:spLocks noGrp="1"/>
-          </p:cNvSpPr>
-          <p:nvPr>
-            <p:ph idx="1"/>
-          </p:nvPr>
-        </p:nvSpPr>
-        <p:spPr/>
-        <p:txBody>
-          <a:bodyPr/>
-          <a:lstStyle/>
-          <a:p>
-            <a:r>
-              <a:rPr lang="en-US" dirty="0"/>
-              <a:t>Regression analysis generates an equation to describe the statistical relationship between one or more predictor variables and the response variable.</a:t>
-            </a:r>
-          </a:p>
-        </p:txBody>
-      </p:sp>
-      <p:pic>
-        <p:nvPicPr>
-          <p:cNvPr id="4" name="Picture 3">
-            <a:extLst>
-              <a:ext uri="{FF2B5EF4-FFF2-40B4-BE49-F238E27FC236}">
-                <a16:creationId xmlns:a16="http://schemas.microsoft.com/office/drawing/2014/main" id="{1E0E9D8E-53FE-4842-8E4B-1F399161780F}"/>
-              </a:ext>
-            </a:extLst>
-          </p:cNvPr>
-          <p:cNvPicPr>
-            <a:picLocks noChangeAspect="1"/>
-          </p:cNvPicPr>
-          <p:nvPr/>
-        </p:nvPicPr>
-        <p:blipFill>
-          <a:blip r:embed="rId2">
-            <a:extLst>
-              <a:ext uri="{28A0092B-C50C-407E-A947-70E740481C1C}">
-                <a14:useLocalDpi xmlns:a14="http://schemas.microsoft.com/office/drawing/2010/main" val="0"/>
-              </a:ext>
-            </a:extLst>
-          </a:blip>
-          <a:stretch>
-            <a:fillRect/>
-          </a:stretch>
-        </p:blipFill>
-        <p:spPr>
-          <a:xfrm>
-            <a:off x="4291923" y="3615397"/>
-            <a:ext cx="2113097" cy="2239107"/>
-          </a:xfrm>
-          <a:prstGeom prst="rect">
-            <a:avLst/>
-          </a:prstGeom>
-        </p:spPr>
-      </p:pic>
-    </p:spTree>
-    <p:extLst>
-      <p:ext uri="{BB962C8B-B14F-4D97-AF65-F5344CB8AC3E}">
-        <p14:creationId xmlns:p14="http://schemas.microsoft.com/office/powerpoint/2010/main" val="170037080"/>
-      </p:ext>
-    </p:extLst>
-  </p:cSld>
-  <p:clrMapOvr>
-    <a:masterClrMapping/>
-  </p:clrMapOvr>
-</p:sld>
-</file>
-
-<file path=ppt/slides/slide14.xml><?xml version="1.0" encoding="utf-8"?>
-<p:sld xmlns:a="http://schemas.openxmlformats.org/drawingml/2006/main" xmlns:r="http://schemas.openxmlformats.org/officeDocument/2006/relationships" xmlns:p="http://schemas.openxmlformats.org/presentationml/2006/main">
-  <p:cSld>
-    <p:spTree>
-      <p:nvGrpSpPr>
-        <p:cNvPr id="1" name=""/>
-        <p:cNvGrpSpPr/>
-        <p:nvPr/>
-      </p:nvGrpSpPr>
-      <p:grpSpPr>
-        <a:xfrm>
-          <a:off x="0" y="0"/>
-          <a:ext cx="0" cy="0"/>
-          <a:chOff x="0" y="0"/>
-          <a:chExt cx="0" cy="0"/>
-        </a:xfrm>
-      </p:grpSpPr>
-      <p:sp>
-        <p:nvSpPr>
-          <p:cNvPr id="2" name="Title 1">
-            <a:extLst>
-              <a:ext uri="{FF2B5EF4-FFF2-40B4-BE49-F238E27FC236}">
-                <a16:creationId xmlns:a16="http://schemas.microsoft.com/office/drawing/2014/main" id="{D7DE779D-A8F2-47DD-96CD-E25FEF4EBC75}"/>
-              </a:ext>
-            </a:extLst>
-          </p:cNvPr>
-          <p:cNvSpPr>
-            <a:spLocks noGrp="1"/>
-          </p:cNvSpPr>
-          <p:nvPr>
-            <p:ph type="title"/>
-          </p:nvPr>
-        </p:nvSpPr>
-        <p:spPr/>
-        <p:txBody>
-          <a:bodyPr/>
-          <a:lstStyle/>
-          <a:p>
-            <a:pPr algn="ctr"/>
-            <a:r>
-              <a:rPr lang="en-US" dirty="0" err="1"/>
-              <a:t>Regration</a:t>
-            </a:r>
-            <a:r>
-              <a:rPr lang="en-US" dirty="0"/>
-              <a:t> Analysis</a:t>
-            </a:r>
-            <a:br>
-              <a:rPr lang="en-US" dirty="0"/>
-            </a:br>
-            <a:r>
-              <a:rPr lang="en-US" dirty="0"/>
-              <a:t>Happiness – GDP Per Capita</a:t>
-            </a:r>
-          </a:p>
-        </p:txBody>
-      </p:sp>
-      <p:pic>
-        <p:nvPicPr>
-          <p:cNvPr id="7" name="Picture 6">
-            <a:extLst>
-              <a:ext uri="{FF2B5EF4-FFF2-40B4-BE49-F238E27FC236}">
-                <a16:creationId xmlns:a16="http://schemas.microsoft.com/office/drawing/2014/main" id="{7E23D6C0-89A2-4E3E-A9E6-D045C4D13B5E}"/>
-              </a:ext>
-            </a:extLst>
-          </p:cNvPr>
-          <p:cNvPicPr>
-            <a:picLocks noChangeAspect="1"/>
-          </p:cNvPicPr>
-          <p:nvPr/>
-        </p:nvPicPr>
-        <p:blipFill rotWithShape="1">
-          <a:blip r:embed="rId2"/>
-          <a:srcRect l="16615" t="29196" r="1692" b="11161"/>
-          <a:stretch/>
-        </p:blipFill>
-        <p:spPr>
-          <a:xfrm>
-            <a:off x="267285" y="1853247"/>
-            <a:ext cx="11408899" cy="4683113"/>
-          </a:xfrm>
-          <a:prstGeom prst="rect">
-            <a:avLst/>
-          </a:prstGeom>
-        </p:spPr>
-      </p:pic>
-    </p:spTree>
-    <p:extLst>
-      <p:ext uri="{BB962C8B-B14F-4D97-AF65-F5344CB8AC3E}">
-        <p14:creationId xmlns:p14="http://schemas.microsoft.com/office/powerpoint/2010/main" val="1439698341"/>
-      </p:ext>
-    </p:extLst>
-  </p:cSld>
-  <p:clrMapOvr>
-    <a:masterClrMapping/>
-  </p:clrMapOvr>
-</p:sld>
-</file>
-
-<file path=ppt/slides/slide15.xml><?xml version="1.0" encoding="utf-8"?>
-<p:sld xmlns:a="http://schemas.openxmlformats.org/drawingml/2006/main" xmlns:r="http://schemas.openxmlformats.org/officeDocument/2006/relationships" xmlns:p="http://schemas.openxmlformats.org/presentationml/2006/main">
-  <p:cSld>
-    <p:spTree>
-      <p:nvGrpSpPr>
-        <p:cNvPr id="1" name=""/>
-        <p:cNvGrpSpPr/>
-        <p:nvPr/>
-      </p:nvGrpSpPr>
-      <p:grpSpPr>
-        <a:xfrm>
-          <a:off x="0" y="0"/>
-          <a:ext cx="0" cy="0"/>
-          <a:chOff x="0" y="0"/>
-          <a:chExt cx="0" cy="0"/>
-        </a:xfrm>
-      </p:grpSpPr>
-      <p:sp>
-        <p:nvSpPr>
-          <p:cNvPr id="2" name="Title 1">
-            <a:extLst>
-              <a:ext uri="{FF2B5EF4-FFF2-40B4-BE49-F238E27FC236}">
-                <a16:creationId xmlns:a16="http://schemas.microsoft.com/office/drawing/2014/main" id="{1732194C-3430-4A85-BC0B-6D8031F531A2}"/>
-              </a:ext>
-            </a:extLst>
-          </p:cNvPr>
-          <p:cNvSpPr>
-            <a:spLocks noGrp="1"/>
-          </p:cNvSpPr>
-          <p:nvPr>
-            <p:ph type="title"/>
-          </p:nvPr>
-        </p:nvSpPr>
-        <p:spPr>
-          <a:xfrm>
-            <a:off x="646111" y="452718"/>
-            <a:ext cx="9404723" cy="939984"/>
-          </a:xfrm>
-        </p:spPr>
-        <p:txBody>
-          <a:bodyPr/>
-          <a:lstStyle/>
-          <a:p>
-            <a:pPr algn="ctr"/>
-            <a:r>
-              <a:rPr lang="en-US" dirty="0"/>
-              <a:t>Regression Analysis </a:t>
-            </a:r>
-            <a:br>
-              <a:rPr lang="en-US" dirty="0"/>
-            </a:br>
-            <a:r>
-              <a:rPr lang="en-US" dirty="0" err="1"/>
-              <a:t>Hapiness</a:t>
-            </a:r>
-            <a:r>
-              <a:rPr lang="en-US" dirty="0"/>
-              <a:t> – Birth Rate</a:t>
-            </a:r>
-          </a:p>
-        </p:txBody>
-      </p:sp>
-      <p:pic>
-        <p:nvPicPr>
-          <p:cNvPr id="9" name="Picture 8">
-            <a:extLst>
-              <a:ext uri="{FF2B5EF4-FFF2-40B4-BE49-F238E27FC236}">
-                <a16:creationId xmlns:a16="http://schemas.microsoft.com/office/drawing/2014/main" id="{F216AEE9-ADD9-4314-BF60-7211F276DA46}"/>
-              </a:ext>
-            </a:extLst>
-          </p:cNvPr>
-          <p:cNvPicPr>
-            <a:picLocks noChangeAspect="1"/>
-          </p:cNvPicPr>
-          <p:nvPr/>
-        </p:nvPicPr>
-        <p:blipFill rotWithShape="1">
-          <a:blip r:embed="rId2"/>
-          <a:srcRect l="23769" t="35070" r="5500" b="13212"/>
-          <a:stretch/>
-        </p:blipFill>
-        <p:spPr>
-          <a:xfrm>
-            <a:off x="466467" y="1871002"/>
-            <a:ext cx="10956499" cy="4504142"/>
-          </a:xfrm>
-          <a:prstGeom prst="rect">
-            <a:avLst/>
-          </a:prstGeom>
-        </p:spPr>
-      </p:pic>
-    </p:spTree>
-    <p:extLst>
-      <p:ext uri="{BB962C8B-B14F-4D97-AF65-F5344CB8AC3E}">
-        <p14:creationId xmlns:p14="http://schemas.microsoft.com/office/powerpoint/2010/main" val="402089898"/>
-      </p:ext>
-    </p:extLst>
-  </p:cSld>
-  <p:clrMapOvr>
-    <a:masterClrMapping/>
-  </p:clrMapOvr>
-</p:sld>
-</file>
-
-<file path=ppt/slides/slide16.xml><?xml version="1.0" encoding="utf-8"?>
-<p:sld xmlns:a="http://schemas.openxmlformats.org/drawingml/2006/main" xmlns:r="http://schemas.openxmlformats.org/officeDocument/2006/relationships" xmlns:p="http://schemas.openxmlformats.org/presentationml/2006/main">
-  <p:cSld>
-    <p:spTree>
-      <p:nvGrpSpPr>
-        <p:cNvPr id="1" name=""/>
-        <p:cNvGrpSpPr/>
-        <p:nvPr/>
-      </p:nvGrpSpPr>
-      <p:grpSpPr>
-        <a:xfrm>
-          <a:off x="0" y="0"/>
-          <a:ext cx="0" cy="0"/>
-          <a:chOff x="0" y="0"/>
-          <a:chExt cx="0" cy="0"/>
-        </a:xfrm>
-      </p:grpSpPr>
-      <p:sp>
-        <p:nvSpPr>
-          <p:cNvPr id="2" name="Title 1">
-            <a:extLst>
-              <a:ext uri="{FF2B5EF4-FFF2-40B4-BE49-F238E27FC236}">
-                <a16:creationId xmlns:a16="http://schemas.microsoft.com/office/drawing/2014/main" id="{638D4F7A-95B4-42BA-82AF-5516C3E97193}"/>
-              </a:ext>
-            </a:extLst>
-          </p:cNvPr>
-          <p:cNvSpPr>
-            <a:spLocks noGrp="1"/>
-          </p:cNvSpPr>
-          <p:nvPr>
-            <p:ph type="title"/>
-          </p:nvPr>
-        </p:nvSpPr>
-        <p:spPr/>
-        <p:txBody>
-          <a:bodyPr/>
-          <a:lstStyle/>
-          <a:p>
-            <a:endParaRPr lang="en-US"/>
-          </a:p>
-        </p:txBody>
-      </p:sp>
-      <p:sp>
-        <p:nvSpPr>
-          <p:cNvPr id="3" name="Content Placeholder 2">
-            <a:extLst>
-              <a:ext uri="{FF2B5EF4-FFF2-40B4-BE49-F238E27FC236}">
-                <a16:creationId xmlns:a16="http://schemas.microsoft.com/office/drawing/2014/main" id="{8478FBF7-AA29-40E4-AE5E-EF359E64C777}"/>
-              </a:ext>
-            </a:extLst>
-          </p:cNvPr>
-          <p:cNvSpPr>
-            <a:spLocks noGrp="1"/>
-          </p:cNvSpPr>
-          <p:nvPr>
-            <p:ph idx="1"/>
-          </p:nvPr>
-        </p:nvSpPr>
-        <p:spPr/>
-        <p:txBody>
-          <a:bodyPr/>
-          <a:lstStyle/>
-          <a:p>
-            <a:pPr fontAlgn="base"/>
-            <a:r>
-              <a:rPr lang="en-US" dirty="0">
-                <a:solidFill>
-                  <a:srgbClr val="FF0000"/>
-                </a:solidFill>
-              </a:rPr>
-              <a:t>R Square</a:t>
-            </a:r>
-          </a:p>
-          <a:p>
-            <a:pPr fontAlgn="base"/>
-            <a:r>
-              <a:rPr lang="en-US" dirty="0">
-                <a:solidFill>
-                  <a:srgbClr val="FF0000"/>
-                </a:solidFill>
-              </a:rPr>
-              <a:t>R Square equals 0.962, which is a very good fit. 96% of the variation in Quantity Sold is explained by the independent variables Price and Advertising. The closer to 1, the better the regression line (read on) fits the data.</a:t>
-            </a:r>
-          </a:p>
-          <a:p>
-            <a:endParaRPr lang="en-US" dirty="0"/>
-          </a:p>
-        </p:txBody>
-      </p:sp>
-    </p:spTree>
-    <p:extLst>
-      <p:ext uri="{BB962C8B-B14F-4D97-AF65-F5344CB8AC3E}">
-        <p14:creationId xmlns:p14="http://schemas.microsoft.com/office/powerpoint/2010/main" val="3204994572"/>
       </p:ext>
     </p:extLst>
   </p:cSld>
@@ -7664,7 +6531,7 @@
             </a:r>
             <a:r>
               <a:rPr lang="en-US" dirty="0"/>
-              <a:t>We will examine the data set and answer following questions than put our finding in our final presentation to make it more visually understandable for consumers to help their decision-making process.</a:t>
+              <a:t>We will examine the data set and answer following questions then put our finding in our final presentation to make it more visually understandable for consumers to help their decision-making process.</a:t>
             </a:r>
           </a:p>
         </p:txBody>
@@ -7947,7 +6814,7 @@
             </a:r>
             <a:r>
               <a:rPr lang="en-US" dirty="0"/>
-              <a:t>Does less trust in government lead to higher levels of terrorism?</a:t>
+              <a:t>Does Form of government influence the level of happiness?</a:t>
             </a:r>
           </a:p>
           <a:p>
@@ -7960,7 +6827,7 @@
           <a:p>
             <a:r>
               <a:rPr lang="en-US" b="1" dirty="0"/>
-              <a:t>Question 8 – </a:t>
+              <a:t>Question 8 - </a:t>
             </a:r>
             <a:endParaRPr lang="en-US" dirty="0"/>
           </a:p>
@@ -8126,44 +6993,312 @@
       </p:grpSpPr>
       <p:sp>
         <p:nvSpPr>
-          <p:cNvPr id="2" name="Title 1">
+          <p:cNvPr id="4" name="Rectangle 3">
             <a:extLst>
               <a:ext uri="{FF2B5EF4-FFF2-40B4-BE49-F238E27FC236}">
-                <a16:creationId xmlns:a16="http://schemas.microsoft.com/office/drawing/2014/main" id="{AC4213F2-1371-4E50-8B7D-D8927C8F92C0}"/>
+                <a16:creationId xmlns:a16="http://schemas.microsoft.com/office/drawing/2014/main" id="{5F64D7D0-2137-41AC-8CF3-86805B05934E}"/>
               </a:ext>
             </a:extLst>
           </p:cNvPr>
-          <p:cNvSpPr>
-            <a:spLocks noGrp="1"/>
-          </p:cNvSpPr>
-          <p:nvPr>
-            <p:ph type="title"/>
-          </p:nvPr>
-        </p:nvSpPr>
-        <p:spPr/>
-        <p:txBody>
-          <a:bodyPr/>
-          <a:lstStyle/>
+          <p:cNvSpPr/>
+          <p:nvPr/>
+        </p:nvSpPr>
+        <p:spPr>
+          <a:xfrm>
+            <a:off x="7171263" y="1820430"/>
+            <a:ext cx="4177747" cy="369332"/>
+          </a:xfrm>
+          <a:prstGeom prst="rect">
+            <a:avLst/>
+          </a:prstGeom>
+        </p:spPr>
+        <p:txBody>
+          <a:bodyPr wrap="none">
+            <a:spAutoFit/>
+          </a:bodyPr>
+          <a:lstStyle/>
+          <a:p>
+            <a:r>
+              <a:rPr lang="en-US" dirty="0"/>
+              <a:t>Pearson r correlation coefficient = </a:t>
+            </a:r>
+          </a:p>
+        </p:txBody>
+      </p:sp>
+      <p:sp>
+        <p:nvSpPr>
+          <p:cNvPr id="6" name="Rectangle 5">
+            <a:extLst>
+              <a:ext uri="{FF2B5EF4-FFF2-40B4-BE49-F238E27FC236}">
+                <a16:creationId xmlns:a16="http://schemas.microsoft.com/office/drawing/2014/main" id="{03015C6F-68EC-49CF-848D-50C5A8E8307E}"/>
+              </a:ext>
+            </a:extLst>
+          </p:cNvPr>
+          <p:cNvSpPr/>
+          <p:nvPr/>
+        </p:nvSpPr>
+        <p:spPr>
+          <a:xfrm>
+            <a:off x="11186379" y="1820430"/>
+            <a:ext cx="697627" cy="369332"/>
+          </a:xfrm>
+          <a:prstGeom prst="rect">
+            <a:avLst/>
+          </a:prstGeom>
+        </p:spPr>
+        <p:txBody>
+          <a:bodyPr wrap="none">
+            <a:spAutoFit/>
+          </a:bodyPr>
+          <a:lstStyle/>
+          <a:p>
+            <a:r>
+              <a:rPr lang="en-US" dirty="0"/>
+              <a:t>0.73 </a:t>
+            </a:r>
+          </a:p>
+        </p:txBody>
+      </p:sp>
+      <p:sp>
+        <p:nvSpPr>
+          <p:cNvPr id="7" name="Rectangle 6">
+            <a:extLst>
+              <a:ext uri="{FF2B5EF4-FFF2-40B4-BE49-F238E27FC236}">
+                <a16:creationId xmlns:a16="http://schemas.microsoft.com/office/drawing/2014/main" id="{F416C710-8C4C-4AC8-A3E8-867856B20B4A}"/>
+              </a:ext>
+            </a:extLst>
+          </p:cNvPr>
+          <p:cNvSpPr/>
+          <p:nvPr/>
+        </p:nvSpPr>
+        <p:spPr>
+          <a:xfrm>
+            <a:off x="8418037" y="1280908"/>
+            <a:ext cx="2043316" cy="369332"/>
+          </a:xfrm>
+          <a:prstGeom prst="rect">
+            <a:avLst/>
+          </a:prstGeom>
+        </p:spPr>
+        <p:txBody>
+          <a:bodyPr wrap="none">
+            <a:spAutoFit/>
+          </a:bodyPr>
+          <a:lstStyle/>
+          <a:p>
+            <a:r>
+              <a:rPr lang="en-US" dirty="0">
+                <a:solidFill>
+                  <a:schemeClr val="tx1">
+                    <a:lumMod val="95000"/>
+                  </a:schemeClr>
+                </a:solidFill>
+                <a:latin typeface="Calibri" panose="020F0502020204030204" pitchFamily="34" charset="0"/>
+              </a:rPr>
+              <a:t>Correlation Analysis</a:t>
+            </a:r>
+            <a:endParaRPr lang="en-US" dirty="0">
+              <a:solidFill>
+                <a:schemeClr val="tx1">
+                  <a:lumMod val="95000"/>
+                </a:schemeClr>
+              </a:solidFill>
+            </a:endParaRPr>
+          </a:p>
+        </p:txBody>
+      </p:sp>
+      <p:sp>
+        <p:nvSpPr>
+          <p:cNvPr id="8" name="TextBox 7">
+            <a:extLst>
+              <a:ext uri="{FF2B5EF4-FFF2-40B4-BE49-F238E27FC236}">
+                <a16:creationId xmlns:a16="http://schemas.microsoft.com/office/drawing/2014/main" id="{D260F145-CBF9-4884-9772-A0604E57EF28}"/>
+              </a:ext>
+            </a:extLst>
+          </p:cNvPr>
+          <p:cNvSpPr txBox="1"/>
+          <p:nvPr/>
+        </p:nvSpPr>
+        <p:spPr>
+          <a:xfrm>
+            <a:off x="7424149" y="2533411"/>
+            <a:ext cx="4265260" cy="1477328"/>
+          </a:xfrm>
+          <a:prstGeom prst="rect">
+            <a:avLst/>
+          </a:prstGeom>
+          <a:noFill/>
+        </p:spPr>
+        <p:txBody>
+          <a:bodyPr wrap="square" rtlCol="0">
+            <a:spAutoFit/>
+          </a:bodyPr>
+          <a:lstStyle/>
+          <a:p>
+            <a:r>
+              <a:rPr lang="en-US" dirty="0"/>
+              <a:t>According to results of our analysis we can state that there is </a:t>
+            </a:r>
+            <a:r>
+              <a:rPr lang="en-US" b="1" dirty="0">
+                <a:solidFill>
+                  <a:srgbClr val="FF0000"/>
+                </a:solidFill>
+              </a:rPr>
+              <a:t>a strong positive  relationship</a:t>
+            </a:r>
+            <a:r>
+              <a:rPr lang="en-US" b="1" dirty="0"/>
+              <a:t> </a:t>
+            </a:r>
+            <a:r>
+              <a:rPr lang="en-US" dirty="0"/>
+              <a:t>between Happiness Score and GDP Per Capita of a country</a:t>
+            </a:r>
+          </a:p>
+        </p:txBody>
+      </p:sp>
+      <p:sp>
+        <p:nvSpPr>
+          <p:cNvPr id="2" name="TextBox 1">
+            <a:extLst>
+              <a:ext uri="{FF2B5EF4-FFF2-40B4-BE49-F238E27FC236}">
+                <a16:creationId xmlns:a16="http://schemas.microsoft.com/office/drawing/2014/main" id="{F1C01DC8-35AB-4A7A-9405-D30B57007CEE}"/>
+              </a:ext>
+            </a:extLst>
+          </p:cNvPr>
+          <p:cNvSpPr txBox="1"/>
+          <p:nvPr/>
+        </p:nvSpPr>
+        <p:spPr>
+          <a:xfrm>
+            <a:off x="7500958" y="4170570"/>
+            <a:ext cx="4111642" cy="2585323"/>
+          </a:xfrm>
+          <a:prstGeom prst="rect">
+            <a:avLst/>
+          </a:prstGeom>
+          <a:noFill/>
+        </p:spPr>
+        <p:txBody>
+          <a:bodyPr wrap="square" rtlCol="0">
+            <a:spAutoFit/>
+          </a:bodyPr>
+          <a:lstStyle/>
+          <a:p>
+            <a:r>
+              <a:rPr lang="en-US" dirty="0"/>
+              <a:t>Regression Analysis Result</a:t>
+            </a:r>
+          </a:p>
           <a:p>
             <a:endParaRPr lang="en-US" dirty="0"/>
+          </a:p>
+          <a:p>
+            <a:r>
+              <a:rPr lang="en-US" dirty="0"/>
+              <a:t>Observations 137 </a:t>
+            </a:r>
+          </a:p>
+          <a:p>
+            <a:r>
+              <a:rPr lang="en-US" dirty="0"/>
+              <a:t>R Square 0.530437094 </a:t>
+            </a:r>
+          </a:p>
+          <a:p>
+            <a:r>
+              <a:rPr lang="en-US" i="1" dirty="0"/>
+              <a:t>Significance F</a:t>
+            </a:r>
+            <a:r>
+              <a:rPr lang="en-US" dirty="0"/>
+              <a:t>  6.46E-24 </a:t>
+            </a:r>
+          </a:p>
+          <a:p>
+            <a:r>
+              <a:rPr lang="en-US" i="1" dirty="0"/>
+              <a:t>P-value</a:t>
+            </a:r>
+            <a:r>
+              <a:rPr lang="en-US" dirty="0"/>
+              <a:t> 6.46E-24    </a:t>
+            </a:r>
+          </a:p>
+          <a:p>
+            <a:r>
+              <a:rPr lang="en-US" i="1" dirty="0"/>
+              <a:t>Coefficients</a:t>
+            </a:r>
+            <a:r>
+              <a:rPr lang="en-US" dirty="0"/>
+              <a:t>  0.0000437763</a:t>
+            </a:r>
+          </a:p>
+          <a:p>
+            <a:r>
+              <a:rPr lang="en-US" dirty="0"/>
+              <a:t>Each 10K = 0.437763 HS</a:t>
+            </a:r>
+          </a:p>
+          <a:p>
+            <a:r>
+              <a:rPr lang="en-US" dirty="0"/>
+              <a:t>Each 30K = 1.313289 HS</a:t>
+            </a:r>
+          </a:p>
+        </p:txBody>
+      </p:sp>
+      <p:sp>
+        <p:nvSpPr>
+          <p:cNvPr id="3" name="TextBox 2">
+            <a:extLst>
+              <a:ext uri="{FF2B5EF4-FFF2-40B4-BE49-F238E27FC236}">
+                <a16:creationId xmlns:a16="http://schemas.microsoft.com/office/drawing/2014/main" id="{FBD304F1-8291-4644-8CD7-797813D5B83E}"/>
+              </a:ext>
+            </a:extLst>
+          </p:cNvPr>
+          <p:cNvSpPr txBox="1"/>
+          <p:nvPr/>
+        </p:nvSpPr>
+        <p:spPr>
+          <a:xfrm>
+            <a:off x="1868627" y="506437"/>
+            <a:ext cx="8006893" cy="461665"/>
+          </a:xfrm>
+          <a:prstGeom prst="rect">
+            <a:avLst/>
+          </a:prstGeom>
+          <a:noFill/>
+        </p:spPr>
+        <p:txBody>
+          <a:bodyPr wrap="square" rtlCol="0">
+            <a:spAutoFit/>
+          </a:bodyPr>
+          <a:lstStyle/>
+          <a:p>
+            <a:pPr algn="ctr"/>
+            <a:r>
+              <a:rPr lang="en-US" sz="2400" dirty="0"/>
+              <a:t>Question 2 – Happiness Score and GDP Per Capita</a:t>
+            </a:r>
           </a:p>
         </p:txBody>
       </p:sp>
       <p:pic>
         <p:nvPicPr>
-          <p:cNvPr id="5" name="Content Placeholder 4">
+          <p:cNvPr id="15" name="Content Placeholder 4">
             <a:extLst>
               <a:ext uri="{FF2B5EF4-FFF2-40B4-BE49-F238E27FC236}">
-                <a16:creationId xmlns:a16="http://schemas.microsoft.com/office/drawing/2014/main" id="{A8404D9B-82C4-4A68-9970-F4E0AA12AE46}"/>
+                <a16:creationId xmlns:a16="http://schemas.microsoft.com/office/drawing/2014/main" id="{F70500A0-A201-4F64-BDF6-74E62CD49771}"/>
               </a:ext>
             </a:extLst>
           </p:cNvPr>
           <p:cNvPicPr>
-            <a:picLocks noGrp="1" noChangeAspect="1"/>
+            <a:picLocks noChangeAspect="1"/>
           </p:cNvPicPr>
-          <p:nvPr>
-            <p:ph idx="1"/>
-          </p:nvPr>
+          <p:nvPr/>
         </p:nvPicPr>
         <p:blipFill>
           <a:blip r:embed="rId2">
@@ -8179,15 +7314,229 @@
         </p:blipFill>
         <p:spPr>
           <a:xfrm>
-            <a:off x="1716257" y="205650"/>
-            <a:ext cx="8391497" cy="6293624"/>
-          </a:xfrm>
+            <a:off x="518653" y="1392703"/>
+            <a:ext cx="6596921" cy="4947692"/>
+          </a:xfrm>
+          <a:prstGeom prst="rect">
+            <a:avLst/>
+          </a:prstGeom>
         </p:spPr>
       </p:pic>
+      <p:sp>
+        <p:nvSpPr>
+          <p:cNvPr id="16" name="TextBox 15">
+            <a:extLst>
+              <a:ext uri="{FF2B5EF4-FFF2-40B4-BE49-F238E27FC236}">
+                <a16:creationId xmlns:a16="http://schemas.microsoft.com/office/drawing/2014/main" id="{F22E4AB2-44EF-4855-B12D-CDF1E4FBB6BF}"/>
+              </a:ext>
+            </a:extLst>
+          </p:cNvPr>
+          <p:cNvSpPr txBox="1"/>
+          <p:nvPr/>
+        </p:nvSpPr>
+        <p:spPr>
+          <a:xfrm>
+            <a:off x="5387878" y="2696746"/>
+            <a:ext cx="1793099" cy="646331"/>
+          </a:xfrm>
+          <a:prstGeom prst="rect">
+            <a:avLst/>
+          </a:prstGeom>
+          <a:noFill/>
+        </p:spPr>
+        <p:txBody>
+          <a:bodyPr wrap="square" rtlCol="0">
+            <a:spAutoFit/>
+          </a:bodyPr>
+          <a:lstStyle/>
+          <a:p>
+            <a:r>
+              <a:rPr lang="en-US" sz="1200" dirty="0">
+                <a:solidFill>
+                  <a:schemeClr val="bg1"/>
+                </a:solidFill>
+              </a:rPr>
+              <a:t>Luxemburg</a:t>
+            </a:r>
+          </a:p>
+          <a:p>
+            <a:r>
+              <a:rPr lang="en-US" sz="1200" dirty="0">
+                <a:solidFill>
+                  <a:schemeClr val="bg1"/>
+                </a:solidFill>
+              </a:rPr>
+              <a:t>HS:6.9 </a:t>
+            </a:r>
+          </a:p>
+          <a:p>
+            <a:r>
+              <a:rPr lang="en-US" sz="1200" dirty="0">
+                <a:solidFill>
+                  <a:schemeClr val="bg1"/>
+                </a:solidFill>
+              </a:rPr>
+              <a:t>GDPPC:$111K</a:t>
+            </a:r>
+          </a:p>
+        </p:txBody>
+      </p:sp>
+      <p:sp>
+        <p:nvSpPr>
+          <p:cNvPr id="17" name="TextBox 16">
+            <a:extLst>
+              <a:ext uri="{FF2B5EF4-FFF2-40B4-BE49-F238E27FC236}">
+                <a16:creationId xmlns:a16="http://schemas.microsoft.com/office/drawing/2014/main" id="{F26BD1AF-7B5B-4E0A-A34C-9DD3E8F69F14}"/>
+              </a:ext>
+            </a:extLst>
+          </p:cNvPr>
+          <p:cNvSpPr txBox="1"/>
+          <p:nvPr/>
+        </p:nvSpPr>
+        <p:spPr>
+          <a:xfrm>
+            <a:off x="3149726" y="3220218"/>
+            <a:ext cx="1589649" cy="646331"/>
+          </a:xfrm>
+          <a:prstGeom prst="rect">
+            <a:avLst/>
+          </a:prstGeom>
+          <a:noFill/>
+        </p:spPr>
+        <p:txBody>
+          <a:bodyPr wrap="square" rtlCol="0">
+            <a:spAutoFit/>
+          </a:bodyPr>
+          <a:lstStyle/>
+          <a:p>
+            <a:r>
+              <a:rPr lang="en-US" sz="1200" dirty="0">
+                <a:solidFill>
+                  <a:schemeClr val="bg1"/>
+                </a:solidFill>
+              </a:rPr>
+              <a:t>USA</a:t>
+            </a:r>
+          </a:p>
+          <a:p>
+            <a:r>
+              <a:rPr lang="en-US" sz="1200" dirty="0">
+                <a:solidFill>
+                  <a:schemeClr val="bg1"/>
+                </a:solidFill>
+              </a:rPr>
+              <a:t>HS:7.1 GDPPC:$56K</a:t>
+            </a:r>
+          </a:p>
+        </p:txBody>
+      </p:sp>
+      <p:sp>
+        <p:nvSpPr>
+          <p:cNvPr id="18" name="TextBox 17">
+            <a:extLst>
+              <a:ext uri="{FF2B5EF4-FFF2-40B4-BE49-F238E27FC236}">
+                <a16:creationId xmlns:a16="http://schemas.microsoft.com/office/drawing/2014/main" id="{0DE266C0-9770-4BFC-B118-B16D539D4397}"/>
+              </a:ext>
+            </a:extLst>
+          </p:cNvPr>
+          <p:cNvSpPr txBox="1"/>
+          <p:nvPr/>
+        </p:nvSpPr>
+        <p:spPr>
+          <a:xfrm>
+            <a:off x="1693689" y="1916879"/>
+            <a:ext cx="1589649" cy="646331"/>
+          </a:xfrm>
+          <a:prstGeom prst="rect">
+            <a:avLst/>
+          </a:prstGeom>
+          <a:noFill/>
+        </p:spPr>
+        <p:txBody>
+          <a:bodyPr wrap="square" rtlCol="0">
+            <a:spAutoFit/>
+          </a:bodyPr>
+          <a:lstStyle/>
+          <a:p>
+            <a:r>
+              <a:rPr lang="en-US" sz="1200" dirty="0">
+                <a:solidFill>
+                  <a:schemeClr val="bg1"/>
+                </a:solidFill>
+              </a:rPr>
+              <a:t>Spain</a:t>
+            </a:r>
+          </a:p>
+          <a:p>
+            <a:r>
+              <a:rPr lang="en-US" sz="1200" dirty="0">
+                <a:solidFill>
+                  <a:schemeClr val="bg1"/>
+                </a:solidFill>
+              </a:rPr>
+              <a:t>HS:6.3 GDPPC:$25K</a:t>
+            </a:r>
+          </a:p>
+        </p:txBody>
+      </p:sp>
+      <p:sp>
+        <p:nvSpPr>
+          <p:cNvPr id="19" name="TextBox 18">
+            <a:extLst>
+              <a:ext uri="{FF2B5EF4-FFF2-40B4-BE49-F238E27FC236}">
+                <a16:creationId xmlns:a16="http://schemas.microsoft.com/office/drawing/2014/main" id="{A1A87CB7-46E7-4764-A78A-801F7445FCAA}"/>
+              </a:ext>
+            </a:extLst>
+          </p:cNvPr>
+          <p:cNvSpPr txBox="1"/>
+          <p:nvPr/>
+        </p:nvSpPr>
+        <p:spPr>
+          <a:xfrm>
+            <a:off x="1560077" y="5047733"/>
+            <a:ext cx="1589649" cy="646331"/>
+          </a:xfrm>
+          <a:prstGeom prst="rect">
+            <a:avLst/>
+          </a:prstGeom>
+          <a:noFill/>
+        </p:spPr>
+        <p:txBody>
+          <a:bodyPr wrap="square" rtlCol="0">
+            <a:spAutoFit/>
+          </a:bodyPr>
+          <a:lstStyle/>
+          <a:p>
+            <a:r>
+              <a:rPr lang="en-US" sz="1200" dirty="0" err="1">
+                <a:solidFill>
+                  <a:schemeClr val="bg1"/>
+                </a:solidFill>
+              </a:rPr>
+              <a:t>Brundi</a:t>
+            </a:r>
+            <a:endParaRPr lang="en-US" sz="1200" dirty="0">
+              <a:solidFill>
+                <a:schemeClr val="bg1"/>
+              </a:solidFill>
+            </a:endParaRPr>
+          </a:p>
+          <a:p>
+            <a:r>
+              <a:rPr lang="en-US" sz="1200" dirty="0">
+                <a:solidFill>
+                  <a:schemeClr val="bg1"/>
+                </a:solidFill>
+              </a:rPr>
+              <a:t>HS:2.9 GDPPC:$300</a:t>
+            </a:r>
+          </a:p>
+        </p:txBody>
+      </p:sp>
     </p:spTree>
     <p:extLst>
       <p:ext uri="{BB962C8B-B14F-4D97-AF65-F5344CB8AC3E}">
-        <p14:creationId xmlns:p14="http://schemas.microsoft.com/office/powerpoint/2010/main" val="868787261"/>
+        <p14:creationId xmlns:p14="http://schemas.microsoft.com/office/powerpoint/2010/main" val="2008852766"/>
       </p:ext>
     </p:extLst>
   </p:cSld>
@@ -8214,37 +7563,12 @@
           <a:chExt cx="0" cy="0"/>
         </a:xfrm>
       </p:grpSpPr>
-      <p:sp>
-        <p:nvSpPr>
-          <p:cNvPr id="2" name="Title 1">
-            <a:extLst>
-              <a:ext uri="{FF2B5EF4-FFF2-40B4-BE49-F238E27FC236}">
-                <a16:creationId xmlns:a16="http://schemas.microsoft.com/office/drawing/2014/main" id="{89EC2CC8-6964-4973-905D-3AA4690802FA}"/>
-              </a:ext>
-            </a:extLst>
-          </p:cNvPr>
-          <p:cNvSpPr>
-            <a:spLocks noGrp="1"/>
-          </p:cNvSpPr>
-          <p:nvPr>
-            <p:ph type="title"/>
-          </p:nvPr>
-        </p:nvSpPr>
-        <p:spPr/>
-        <p:txBody>
-          <a:bodyPr/>
-          <a:lstStyle/>
-          <a:p>
-            <a:endParaRPr lang="en-US" dirty="0"/>
-          </a:p>
-        </p:txBody>
-      </p:sp>
       <p:pic>
         <p:nvPicPr>
           <p:cNvPr id="5" name="Content Placeholder 4">
             <a:extLst>
               <a:ext uri="{FF2B5EF4-FFF2-40B4-BE49-F238E27FC236}">
-                <a16:creationId xmlns:a16="http://schemas.microsoft.com/office/drawing/2014/main" id="{5C5F7913-271B-4FB3-B087-4DB08803688A}"/>
+                <a16:creationId xmlns:a16="http://schemas.microsoft.com/office/drawing/2014/main" id="{FC4D9827-35EE-4603-BF61-2EC1DD330BA2}"/>
               </a:ext>
             </a:extLst>
           </p:cNvPr>
@@ -8269,101 +7593,486 @@
         </p:blipFill>
         <p:spPr>
           <a:xfrm>
-            <a:off x="1873790" y="277621"/>
-            <a:ext cx="8320797" cy="6240598"/>
+            <a:off x="243408" y="1496675"/>
+            <a:ext cx="6736389" cy="5052292"/>
           </a:xfrm>
         </p:spPr>
       </p:pic>
-    </p:spTree>
-    <p:extLst>
-      <p:ext uri="{BB962C8B-B14F-4D97-AF65-F5344CB8AC3E}">
-        <p14:creationId xmlns:p14="http://schemas.microsoft.com/office/powerpoint/2010/main" val="4181697474"/>
-      </p:ext>
-    </p:extLst>
-  </p:cSld>
-  <p:clrMapOvr>
-    <a:masterClrMapping/>
-  </p:clrMapOvr>
-</p:sld>
-</file>
-
-<file path=ppt/slides/slide9.xml><?xml version="1.0" encoding="utf-8"?>
-<p:sld xmlns:a="http://schemas.openxmlformats.org/drawingml/2006/main" xmlns:r="http://schemas.openxmlformats.org/officeDocument/2006/relationships" xmlns:p="http://schemas.openxmlformats.org/presentationml/2006/main">
-  <p:cSld>
-    <p:spTree>
-      <p:nvGrpSpPr>
-        <p:cNvPr id="1" name=""/>
-        <p:cNvGrpSpPr/>
-        <p:nvPr/>
-      </p:nvGrpSpPr>
-      <p:grpSpPr>
-        <a:xfrm>
-          <a:off x="0" y="0"/>
-          <a:ext cx="0" cy="0"/>
-          <a:chOff x="0" y="0"/>
-          <a:chExt cx="0" cy="0"/>
-        </a:xfrm>
-      </p:grpSpPr>
-      <p:sp>
-        <p:nvSpPr>
-          <p:cNvPr id="2" name="Title 1">
+      <p:sp>
+        <p:nvSpPr>
+          <p:cNvPr id="4" name="Rectangle 3">
             <a:extLst>
               <a:ext uri="{FF2B5EF4-FFF2-40B4-BE49-F238E27FC236}">
-                <a16:creationId xmlns:a16="http://schemas.microsoft.com/office/drawing/2014/main" id="{335F5070-DE8F-4360-93C5-A26B68779A20}"/>
+                <a16:creationId xmlns:a16="http://schemas.microsoft.com/office/drawing/2014/main" id="{5F64D7D0-2137-41AC-8CF3-86805B05934E}"/>
               </a:ext>
             </a:extLst>
           </p:cNvPr>
-          <p:cNvSpPr>
-            <a:spLocks noGrp="1"/>
-          </p:cNvSpPr>
-          <p:nvPr>
-            <p:ph type="title"/>
-          </p:nvPr>
-        </p:nvSpPr>
-        <p:spPr/>
-        <p:txBody>
-          <a:bodyPr/>
-          <a:lstStyle/>
-          <a:p>
-            <a:endParaRPr lang="en-US"/>
-          </a:p>
-        </p:txBody>
-      </p:sp>
-      <p:pic>
-        <p:nvPicPr>
-          <p:cNvPr id="5" name="Content Placeholder 4">
+          <p:cNvSpPr/>
+          <p:nvPr/>
+        </p:nvSpPr>
+        <p:spPr>
+          <a:xfrm>
+            <a:off x="7180977" y="1960180"/>
+            <a:ext cx="4177747" cy="369332"/>
+          </a:xfrm>
+          <a:prstGeom prst="rect">
+            <a:avLst/>
+          </a:prstGeom>
+        </p:spPr>
+        <p:txBody>
+          <a:bodyPr wrap="none">
+            <a:spAutoFit/>
+          </a:bodyPr>
+          <a:lstStyle/>
+          <a:p>
+            <a:r>
+              <a:rPr lang="en-US" dirty="0"/>
+              <a:t>Pearson r correlation coefficient = </a:t>
+            </a:r>
+          </a:p>
+        </p:txBody>
+      </p:sp>
+      <p:sp>
+        <p:nvSpPr>
+          <p:cNvPr id="6" name="Rectangle 5">
             <a:extLst>
               <a:ext uri="{FF2B5EF4-FFF2-40B4-BE49-F238E27FC236}">
-                <a16:creationId xmlns:a16="http://schemas.microsoft.com/office/drawing/2014/main" id="{FC4D9827-35EE-4603-BF61-2EC1DD330BA2}"/>
+                <a16:creationId xmlns:a16="http://schemas.microsoft.com/office/drawing/2014/main" id="{03015C6F-68EC-49CF-848D-50C5A8E8307E}"/>
               </a:ext>
             </a:extLst>
           </p:cNvPr>
-          <p:cNvPicPr>
-            <a:picLocks noGrp="1" noChangeAspect="1"/>
-          </p:cNvPicPr>
-          <p:nvPr>
-            <p:ph idx="1"/>
-          </p:nvPr>
-        </p:nvPicPr>
-        <p:blipFill>
-          <a:blip r:embed="rId2">
+          <p:cNvSpPr/>
+          <p:nvPr/>
+        </p:nvSpPr>
+        <p:spPr>
+          <a:xfrm>
+            <a:off x="11098234" y="1978109"/>
+            <a:ext cx="710451" cy="369332"/>
+          </a:xfrm>
+          <a:prstGeom prst="rect">
+            <a:avLst/>
+          </a:prstGeom>
+        </p:spPr>
+        <p:txBody>
+          <a:bodyPr wrap="none">
+            <a:spAutoFit/>
+          </a:bodyPr>
+          <a:lstStyle/>
+          <a:p>
+            <a:r>
+              <a:rPr lang="en-US" dirty="0"/>
+              <a:t>-0.32</a:t>
+            </a:r>
+          </a:p>
+        </p:txBody>
+      </p:sp>
+      <p:sp>
+        <p:nvSpPr>
+          <p:cNvPr id="7" name="Rectangle 6">
             <a:extLst>
-              <a:ext uri="{28A0092B-C50C-407E-A947-70E740481C1C}">
-                <a14:useLocalDpi xmlns:a14="http://schemas.microsoft.com/office/drawing/2010/main" val="0"/>
+              <a:ext uri="{FF2B5EF4-FFF2-40B4-BE49-F238E27FC236}">
+                <a16:creationId xmlns:a16="http://schemas.microsoft.com/office/drawing/2014/main" id="{F416C710-8C4C-4AC8-A3E8-867856B20B4A}"/>
               </a:ext>
             </a:extLst>
-          </a:blip>
-          <a:stretch>
-            <a:fillRect/>
-          </a:stretch>
-        </p:blipFill>
-        <p:spPr>
-          <a:xfrm>
-            <a:off x="1560887" y="141432"/>
-            <a:ext cx="8653156" cy="6489867"/>
-          </a:xfrm>
-        </p:spPr>
-      </p:pic>
+          </p:cNvPr>
+          <p:cNvSpPr/>
+          <p:nvPr/>
+        </p:nvSpPr>
+        <p:spPr>
+          <a:xfrm>
+            <a:off x="7974144" y="1409691"/>
+            <a:ext cx="3029355" cy="369332"/>
+          </a:xfrm>
+          <a:prstGeom prst="rect">
+            <a:avLst/>
+          </a:prstGeom>
+        </p:spPr>
+        <p:txBody>
+          <a:bodyPr wrap="none">
+            <a:spAutoFit/>
+          </a:bodyPr>
+          <a:lstStyle/>
+          <a:p>
+            <a:r>
+              <a:rPr lang="en-US" dirty="0">
+                <a:solidFill>
+                  <a:schemeClr val="tx1">
+                    <a:lumMod val="95000"/>
+                  </a:schemeClr>
+                </a:solidFill>
+                <a:latin typeface="Calibri" panose="020F0502020204030204" pitchFamily="34" charset="0"/>
+              </a:rPr>
+              <a:t>Correlation Analysis Birth Rate</a:t>
+            </a:r>
+            <a:endParaRPr lang="en-US" dirty="0">
+              <a:solidFill>
+                <a:schemeClr val="tx1">
+                  <a:lumMod val="95000"/>
+                </a:schemeClr>
+              </a:solidFill>
+            </a:endParaRPr>
+          </a:p>
+        </p:txBody>
+      </p:sp>
+      <p:sp>
+        <p:nvSpPr>
+          <p:cNvPr id="8" name="TextBox 7">
+            <a:extLst>
+              <a:ext uri="{FF2B5EF4-FFF2-40B4-BE49-F238E27FC236}">
+                <a16:creationId xmlns:a16="http://schemas.microsoft.com/office/drawing/2014/main" id="{D260F145-CBF9-4884-9772-A0604E57EF28}"/>
+              </a:ext>
+            </a:extLst>
+          </p:cNvPr>
+          <p:cNvSpPr txBox="1"/>
+          <p:nvPr/>
+        </p:nvSpPr>
+        <p:spPr>
+          <a:xfrm>
+            <a:off x="7356191" y="2538320"/>
+            <a:ext cx="4265260" cy="1477328"/>
+          </a:xfrm>
+          <a:prstGeom prst="rect">
+            <a:avLst/>
+          </a:prstGeom>
+          <a:noFill/>
+        </p:spPr>
+        <p:txBody>
+          <a:bodyPr wrap="square" rtlCol="0">
+            <a:spAutoFit/>
+          </a:bodyPr>
+          <a:lstStyle/>
+          <a:p>
+            <a:r>
+              <a:rPr lang="en-US" dirty="0"/>
+              <a:t>According to results of our analysis we can state that there </a:t>
+            </a:r>
+            <a:r>
+              <a:rPr lang="en-US" b="1" dirty="0">
+                <a:solidFill>
+                  <a:srgbClr val="FF0000"/>
+                </a:solidFill>
+              </a:rPr>
+              <a:t>is a weak-medium negative  relationship </a:t>
+            </a:r>
+            <a:r>
+              <a:rPr lang="en-US" dirty="0"/>
+              <a:t>between Happiness Score and Birth Rate of a country</a:t>
+            </a:r>
+          </a:p>
+        </p:txBody>
+      </p:sp>
+      <p:sp>
+        <p:nvSpPr>
+          <p:cNvPr id="9" name="TextBox 8">
+            <a:extLst>
+              <a:ext uri="{FF2B5EF4-FFF2-40B4-BE49-F238E27FC236}">
+                <a16:creationId xmlns:a16="http://schemas.microsoft.com/office/drawing/2014/main" id="{C529C43A-F87A-42D2-8B53-C3D2E99E2282}"/>
+              </a:ext>
+            </a:extLst>
+          </p:cNvPr>
+          <p:cNvSpPr txBox="1"/>
+          <p:nvPr/>
+        </p:nvSpPr>
+        <p:spPr>
+          <a:xfrm>
+            <a:off x="5620575" y="5355655"/>
+            <a:ext cx="1793099" cy="461665"/>
+          </a:xfrm>
+          <a:prstGeom prst="rect">
+            <a:avLst/>
+          </a:prstGeom>
+          <a:noFill/>
+        </p:spPr>
+        <p:txBody>
+          <a:bodyPr wrap="square" rtlCol="0">
+            <a:spAutoFit/>
+          </a:bodyPr>
+          <a:lstStyle/>
+          <a:p>
+            <a:r>
+              <a:rPr lang="en-US" sz="1200" dirty="0">
+                <a:solidFill>
+                  <a:schemeClr val="bg1"/>
+                </a:solidFill>
+              </a:rPr>
+              <a:t>Switzerland</a:t>
+            </a:r>
+          </a:p>
+          <a:p>
+            <a:r>
+              <a:rPr lang="en-US" sz="1200" dirty="0">
+                <a:solidFill>
+                  <a:schemeClr val="bg1"/>
+                </a:solidFill>
+              </a:rPr>
+              <a:t>BR:1.5 HS:7.6</a:t>
+            </a:r>
+          </a:p>
+        </p:txBody>
+      </p:sp>
+      <p:sp>
+        <p:nvSpPr>
+          <p:cNvPr id="10" name="TextBox 9">
+            <a:extLst>
+              <a:ext uri="{FF2B5EF4-FFF2-40B4-BE49-F238E27FC236}">
+                <a16:creationId xmlns:a16="http://schemas.microsoft.com/office/drawing/2014/main" id="{CFB23A9B-65E8-4B49-B5D9-100FBD47EF71}"/>
+              </a:ext>
+            </a:extLst>
+          </p:cNvPr>
+          <p:cNvSpPr txBox="1"/>
+          <p:nvPr/>
+        </p:nvSpPr>
+        <p:spPr>
+          <a:xfrm>
+            <a:off x="1868627" y="5131020"/>
+            <a:ext cx="1793099" cy="461665"/>
+          </a:xfrm>
+          <a:prstGeom prst="rect">
+            <a:avLst/>
+          </a:prstGeom>
+          <a:noFill/>
+        </p:spPr>
+        <p:txBody>
+          <a:bodyPr wrap="square" rtlCol="0">
+            <a:spAutoFit/>
+          </a:bodyPr>
+          <a:lstStyle/>
+          <a:p>
+            <a:r>
+              <a:rPr lang="en-US" sz="1200" dirty="0">
+                <a:solidFill>
+                  <a:schemeClr val="bg1"/>
+                </a:solidFill>
+              </a:rPr>
+              <a:t>Armenia</a:t>
+            </a:r>
+          </a:p>
+          <a:p>
+            <a:r>
+              <a:rPr lang="en-US" sz="1200" dirty="0">
+                <a:solidFill>
+                  <a:schemeClr val="bg1"/>
+                </a:solidFill>
+              </a:rPr>
+              <a:t>BR:1.6 HS:4.3</a:t>
+            </a:r>
+          </a:p>
+        </p:txBody>
+      </p:sp>
+      <p:sp>
+        <p:nvSpPr>
+          <p:cNvPr id="11" name="TextBox 10">
+            <a:extLst>
+              <a:ext uri="{FF2B5EF4-FFF2-40B4-BE49-F238E27FC236}">
+                <a16:creationId xmlns:a16="http://schemas.microsoft.com/office/drawing/2014/main" id="{C571242A-B0B3-486D-94D9-D9F9D6776D4A}"/>
+              </a:ext>
+            </a:extLst>
+          </p:cNvPr>
+          <p:cNvSpPr txBox="1"/>
+          <p:nvPr/>
+        </p:nvSpPr>
+        <p:spPr>
+          <a:xfrm>
+            <a:off x="4110080" y="2482492"/>
+            <a:ext cx="1793099" cy="461665"/>
+          </a:xfrm>
+          <a:prstGeom prst="rect">
+            <a:avLst/>
+          </a:prstGeom>
+          <a:noFill/>
+        </p:spPr>
+        <p:txBody>
+          <a:bodyPr wrap="square" rtlCol="0">
+            <a:spAutoFit/>
+          </a:bodyPr>
+          <a:lstStyle/>
+          <a:p>
+            <a:r>
+              <a:rPr lang="en-US" sz="1200" dirty="0">
+                <a:solidFill>
+                  <a:schemeClr val="bg1"/>
+                </a:solidFill>
+              </a:rPr>
+              <a:t>Zambia</a:t>
+            </a:r>
+          </a:p>
+          <a:p>
+            <a:r>
+              <a:rPr lang="en-US" sz="1200" dirty="0">
+                <a:solidFill>
+                  <a:schemeClr val="bg1"/>
+                </a:solidFill>
+              </a:rPr>
+              <a:t>BR:5 HS:5.1</a:t>
+            </a:r>
+          </a:p>
+        </p:txBody>
+      </p:sp>
+      <p:sp>
+        <p:nvSpPr>
+          <p:cNvPr id="12" name="TextBox 11">
+            <a:extLst>
+              <a:ext uri="{FF2B5EF4-FFF2-40B4-BE49-F238E27FC236}">
+                <a16:creationId xmlns:a16="http://schemas.microsoft.com/office/drawing/2014/main" id="{332A42A7-1146-44CA-B4F4-3B449381E117}"/>
+              </a:ext>
+            </a:extLst>
+          </p:cNvPr>
+          <p:cNvSpPr txBox="1"/>
+          <p:nvPr/>
+        </p:nvSpPr>
+        <p:spPr>
+          <a:xfrm>
+            <a:off x="1414695" y="2214541"/>
+            <a:ext cx="1793099" cy="461665"/>
+          </a:xfrm>
+          <a:prstGeom prst="rect">
+            <a:avLst/>
+          </a:prstGeom>
+          <a:noFill/>
+        </p:spPr>
+        <p:txBody>
+          <a:bodyPr wrap="square" rtlCol="0">
+            <a:spAutoFit/>
+          </a:bodyPr>
+          <a:lstStyle/>
+          <a:p>
+            <a:r>
+              <a:rPr lang="en-US" sz="1200" dirty="0">
+                <a:solidFill>
+                  <a:schemeClr val="bg1"/>
+                </a:solidFill>
+              </a:rPr>
+              <a:t>Chad</a:t>
+            </a:r>
+          </a:p>
+          <a:p>
+            <a:r>
+              <a:rPr lang="en-US" sz="1200" dirty="0">
+                <a:solidFill>
+                  <a:schemeClr val="bg1"/>
+                </a:solidFill>
+              </a:rPr>
+              <a:t>BR:6 HS:3.6</a:t>
+            </a:r>
+          </a:p>
+        </p:txBody>
+      </p:sp>
+      <p:sp>
+        <p:nvSpPr>
+          <p:cNvPr id="2" name="TextBox 1">
+            <a:extLst>
+              <a:ext uri="{FF2B5EF4-FFF2-40B4-BE49-F238E27FC236}">
+                <a16:creationId xmlns:a16="http://schemas.microsoft.com/office/drawing/2014/main" id="{F1C01DC8-35AB-4A7A-9405-D30B57007CEE}"/>
+              </a:ext>
+            </a:extLst>
+          </p:cNvPr>
+          <p:cNvSpPr txBox="1"/>
+          <p:nvPr/>
+        </p:nvSpPr>
+        <p:spPr>
+          <a:xfrm>
+            <a:off x="7391455" y="4224456"/>
+            <a:ext cx="4111642" cy="2031325"/>
+          </a:xfrm>
+          <a:prstGeom prst="rect">
+            <a:avLst/>
+          </a:prstGeom>
+          <a:noFill/>
+        </p:spPr>
+        <p:txBody>
+          <a:bodyPr wrap="square" rtlCol="0">
+            <a:spAutoFit/>
+          </a:bodyPr>
+          <a:lstStyle/>
+          <a:p>
+            <a:r>
+              <a:rPr lang="en-US" dirty="0"/>
+              <a:t>Regression Analysis Result</a:t>
+            </a:r>
+          </a:p>
+          <a:p>
+            <a:endParaRPr lang="en-US" dirty="0"/>
+          </a:p>
+          <a:p>
+            <a:r>
+              <a:rPr lang="en-US" dirty="0"/>
+              <a:t>Observations 137 </a:t>
+            </a:r>
+          </a:p>
+          <a:p>
+            <a:r>
+              <a:rPr lang="en-US" dirty="0"/>
+              <a:t>R Square 0.41558496</a:t>
+            </a:r>
+          </a:p>
+          <a:p>
+            <a:r>
+              <a:rPr lang="en-US" i="1" dirty="0"/>
+              <a:t>Significance F</a:t>
+            </a:r>
+            <a:r>
+              <a:rPr lang="en-US" dirty="0"/>
+              <a:t>  1.88791E-17</a:t>
+            </a:r>
+          </a:p>
+          <a:p>
+            <a:r>
+              <a:rPr lang="en-US" i="1" dirty="0"/>
+              <a:t>P-value</a:t>
+            </a:r>
+            <a:r>
+              <a:rPr lang="en-US" dirty="0"/>
+              <a:t> 1.88791E-17   </a:t>
+            </a:r>
+          </a:p>
+          <a:p>
+            <a:r>
+              <a:rPr lang="en-US" i="1" dirty="0"/>
+              <a:t>Coefficients</a:t>
+            </a:r>
+            <a:r>
+              <a:rPr lang="en-US" dirty="0"/>
+              <a:t>  -0.726368483 </a:t>
+            </a:r>
+          </a:p>
+        </p:txBody>
+      </p:sp>
+      <p:sp>
+        <p:nvSpPr>
+          <p:cNvPr id="3" name="TextBox 2">
+            <a:extLst>
+              <a:ext uri="{FF2B5EF4-FFF2-40B4-BE49-F238E27FC236}">
+                <a16:creationId xmlns:a16="http://schemas.microsoft.com/office/drawing/2014/main" id="{FBD304F1-8291-4644-8CD7-797813D5B83E}"/>
+              </a:ext>
+            </a:extLst>
+          </p:cNvPr>
+          <p:cNvSpPr txBox="1"/>
+          <p:nvPr/>
+        </p:nvSpPr>
+        <p:spPr>
+          <a:xfrm>
+            <a:off x="1868627" y="506437"/>
+            <a:ext cx="8006893" cy="461665"/>
+          </a:xfrm>
+          <a:prstGeom prst="rect">
+            <a:avLst/>
+          </a:prstGeom>
+          <a:noFill/>
+        </p:spPr>
+        <p:txBody>
+          <a:bodyPr wrap="square" rtlCol="0">
+            <a:spAutoFit/>
+          </a:bodyPr>
+          <a:lstStyle/>
+          <a:p>
+            <a:pPr algn="ctr"/>
+            <a:r>
+              <a:rPr lang="en-US" sz="2400" dirty="0"/>
+              <a:t>Question 3 – Birth Rate and Happiness Score</a:t>
+            </a:r>
+          </a:p>
+        </p:txBody>
+      </p:sp>
     </p:spTree>
     <p:extLst>
       <p:ext uri="{BB962C8B-B14F-4D97-AF65-F5344CB8AC3E}">

</xml_diff>

<commit_message>
for birthrate and hapiness regration analysis added
</commit_message>
<xml_diff>
--- a/Project_1_Team_7_Presentation.pptx
+++ b/Project_1_Team_7_Presentation.pptx
@@ -11,14 +11,9 @@
     <p:sldId id="258" r:id="rId5"/>
     <p:sldId id="259" r:id="rId6"/>
     <p:sldId id="260" r:id="rId7"/>
-    <p:sldId id="262" r:id="rId8"/>
-    <p:sldId id="265" r:id="rId9"/>
-    <p:sldId id="264" r:id="rId10"/>
-    <p:sldId id="263" r:id="rId11"/>
-    <p:sldId id="271" r:id="rId12"/>
-    <p:sldId id="269" r:id="rId13"/>
-    <p:sldId id="268" r:id="rId14"/>
-    <p:sldId id="270" r:id="rId15"/>
+    <p:sldId id="266" r:id="rId8"/>
+    <p:sldId id="262" r:id="rId9"/>
+    <p:sldId id="265" r:id="rId10"/>
   </p:sldIdLst>
   <p:sldSz cx="12192000" cy="6858000"/>
   <p:notesSz cx="6858000" cy="9144000"/>
@@ -6225,684 +6220,6 @@
 </p:sld>
 </file>
 
-<file path=ppt/slides/slide10.xml><?xml version="1.0" encoding="utf-8"?>
-<p:sld xmlns:a="http://schemas.openxmlformats.org/drawingml/2006/main" xmlns:r="http://schemas.openxmlformats.org/officeDocument/2006/relationships" xmlns:p="http://schemas.openxmlformats.org/presentationml/2006/main">
-  <p:cSld>
-    <p:spTree>
-      <p:nvGrpSpPr>
-        <p:cNvPr id="1" name=""/>
-        <p:cNvGrpSpPr/>
-        <p:nvPr/>
-      </p:nvGrpSpPr>
-      <p:grpSpPr>
-        <a:xfrm>
-          <a:off x="0" y="0"/>
-          <a:ext cx="0" cy="0"/>
-          <a:chOff x="0" y="0"/>
-          <a:chExt cx="0" cy="0"/>
-        </a:xfrm>
-      </p:grpSpPr>
-      <p:sp>
-        <p:nvSpPr>
-          <p:cNvPr id="2" name="Title 1">
-            <a:extLst>
-              <a:ext uri="{FF2B5EF4-FFF2-40B4-BE49-F238E27FC236}">
-                <a16:creationId xmlns:a16="http://schemas.microsoft.com/office/drawing/2014/main" id="{332B1BDD-506F-4787-A390-70C70EE71B8D}"/>
-              </a:ext>
-            </a:extLst>
-          </p:cNvPr>
-          <p:cNvSpPr>
-            <a:spLocks noGrp="1"/>
-          </p:cNvSpPr>
-          <p:nvPr>
-            <p:ph type="title"/>
-          </p:nvPr>
-        </p:nvSpPr>
-        <p:spPr/>
-        <p:txBody>
-          <a:bodyPr/>
-          <a:lstStyle/>
-          <a:p>
-            <a:pPr algn="ctr"/>
-            <a:r>
-              <a:rPr lang="en-US" dirty="0"/>
-              <a:t>Correlation Test Result for</a:t>
-            </a:r>
-            <a:br>
-              <a:rPr lang="en-US" dirty="0"/>
-            </a:br>
-            <a:r>
-              <a:rPr lang="en-US" dirty="0"/>
-              <a:t> Happiness – Birth Rate</a:t>
-            </a:r>
-          </a:p>
-        </p:txBody>
-      </p:sp>
-      <p:sp>
-        <p:nvSpPr>
-          <p:cNvPr id="11" name="Rectangle 10">
-            <a:extLst>
-              <a:ext uri="{FF2B5EF4-FFF2-40B4-BE49-F238E27FC236}">
-                <a16:creationId xmlns:a16="http://schemas.microsoft.com/office/drawing/2014/main" id="{7985DDFE-34DB-4964-BEE2-40C9C6DFDBF7}"/>
-              </a:ext>
-            </a:extLst>
-          </p:cNvPr>
-          <p:cNvSpPr/>
-          <p:nvPr/>
-        </p:nvSpPr>
-        <p:spPr>
-          <a:xfrm>
-            <a:off x="964334" y="3095339"/>
-            <a:ext cx="5793574" cy="461665"/>
-          </a:xfrm>
-          <a:prstGeom prst="rect">
-            <a:avLst/>
-          </a:prstGeom>
-        </p:spPr>
-        <p:txBody>
-          <a:bodyPr wrap="none">
-            <a:spAutoFit/>
-          </a:bodyPr>
-          <a:lstStyle/>
-          <a:p>
-            <a:r>
-              <a:rPr lang="en-US" sz="2400" i="1" dirty="0"/>
-              <a:t>r</a:t>
-            </a:r>
-            <a:r>
-              <a:rPr lang="en-US" sz="2400" dirty="0"/>
-              <a:t>  (Pearson r correlation coefficient) = </a:t>
-            </a:r>
-          </a:p>
-        </p:txBody>
-      </p:sp>
-      <p:sp>
-        <p:nvSpPr>
-          <p:cNvPr id="12" name="Rectangle 11">
-            <a:extLst>
-              <a:ext uri="{FF2B5EF4-FFF2-40B4-BE49-F238E27FC236}">
-                <a16:creationId xmlns:a16="http://schemas.microsoft.com/office/drawing/2014/main" id="{EA844962-4085-4A2F-BC12-5147E6B63378}"/>
-              </a:ext>
-            </a:extLst>
-          </p:cNvPr>
-          <p:cNvSpPr/>
-          <p:nvPr/>
-        </p:nvSpPr>
-        <p:spPr>
-          <a:xfrm>
-            <a:off x="7092339" y="3095339"/>
-            <a:ext cx="1329210" cy="738664"/>
-          </a:xfrm>
-          <a:prstGeom prst="rect">
-            <a:avLst/>
-          </a:prstGeom>
-        </p:spPr>
-        <p:txBody>
-          <a:bodyPr wrap="none">
-            <a:spAutoFit/>
-          </a:bodyPr>
-          <a:lstStyle/>
-          <a:p>
-            <a:r>
-              <a:rPr lang="en-US" dirty="0">
-                <a:solidFill>
-                  <a:srgbClr val="000000"/>
-                </a:solidFill>
-                <a:latin typeface="Calibri" panose="020F0502020204030204" pitchFamily="34" charset="0"/>
-              </a:rPr>
-              <a:t>-</a:t>
-            </a:r>
-            <a:r>
-              <a:rPr lang="en-US" sz="2400" dirty="0">
-                <a:solidFill>
-                  <a:schemeClr val="tx1">
-                    <a:lumMod val="95000"/>
-                  </a:schemeClr>
-                </a:solidFill>
-                <a:latin typeface="Calibri" panose="020F0502020204030204" pitchFamily="34" charset="0"/>
-              </a:rPr>
-              <a:t>0.32519</a:t>
-            </a:r>
-            <a:r>
-              <a:rPr lang="en-US" dirty="0"/>
-              <a:t> </a:t>
-            </a:r>
-          </a:p>
-          <a:p>
-            <a:r>
-              <a:rPr lang="en-US" dirty="0"/>
-              <a:t> </a:t>
-            </a:r>
-          </a:p>
-        </p:txBody>
-      </p:sp>
-      <p:sp>
-        <p:nvSpPr>
-          <p:cNvPr id="14" name="Rectangle 13">
-            <a:extLst>
-              <a:ext uri="{FF2B5EF4-FFF2-40B4-BE49-F238E27FC236}">
-                <a16:creationId xmlns:a16="http://schemas.microsoft.com/office/drawing/2014/main" id="{C1213706-3723-4309-8AD5-A6944F14F19C}"/>
-              </a:ext>
-            </a:extLst>
-          </p:cNvPr>
-          <p:cNvSpPr/>
-          <p:nvPr/>
-        </p:nvSpPr>
-        <p:spPr>
-          <a:xfrm>
-            <a:off x="5254496" y="2243461"/>
-            <a:ext cx="3675686" cy="461665"/>
-          </a:xfrm>
-          <a:prstGeom prst="rect">
-            <a:avLst/>
-          </a:prstGeom>
-        </p:spPr>
-        <p:txBody>
-          <a:bodyPr wrap="none">
-            <a:spAutoFit/>
-          </a:bodyPr>
-          <a:lstStyle/>
-          <a:p>
-            <a:r>
-              <a:rPr lang="en-US" sz="2400" dirty="0">
-                <a:solidFill>
-                  <a:schemeClr val="tx1">
-                    <a:lumMod val="95000"/>
-                  </a:schemeClr>
-                </a:solidFill>
-                <a:latin typeface="Calibri" panose="020F0502020204030204" pitchFamily="34" charset="0"/>
-              </a:rPr>
-              <a:t>Happiness - GDP Per Capita</a:t>
-            </a:r>
-            <a:r>
-              <a:rPr lang="en-US" sz="2400" dirty="0">
-                <a:solidFill>
-                  <a:schemeClr val="tx1">
-                    <a:lumMod val="95000"/>
-                  </a:schemeClr>
-                </a:solidFill>
-              </a:rPr>
-              <a:t> </a:t>
-            </a:r>
-          </a:p>
-        </p:txBody>
-      </p:sp>
-      <p:sp>
-        <p:nvSpPr>
-          <p:cNvPr id="15" name="TextBox 14">
-            <a:extLst>
-              <a:ext uri="{FF2B5EF4-FFF2-40B4-BE49-F238E27FC236}">
-                <a16:creationId xmlns:a16="http://schemas.microsoft.com/office/drawing/2014/main" id="{C46F7A4E-24DB-45BF-AF39-94257B642867}"/>
-              </a:ext>
-            </a:extLst>
-          </p:cNvPr>
-          <p:cNvSpPr txBox="1"/>
-          <p:nvPr/>
-        </p:nvSpPr>
-        <p:spPr>
-          <a:xfrm>
-            <a:off x="1083212" y="4318782"/>
-            <a:ext cx="8328074" cy="923330"/>
-          </a:xfrm>
-          <a:prstGeom prst="rect">
-            <a:avLst/>
-          </a:prstGeom>
-          <a:noFill/>
-        </p:spPr>
-        <p:txBody>
-          <a:bodyPr wrap="square" rtlCol="0">
-            <a:spAutoFit/>
-          </a:bodyPr>
-          <a:lstStyle/>
-          <a:p>
-            <a:r>
-              <a:rPr lang="en-US" dirty="0"/>
-              <a:t>According to results of our analysis we can state that there is a medium negative relationship between Birth Rate and Happiness Score of a country</a:t>
-            </a:r>
-          </a:p>
-        </p:txBody>
-      </p:sp>
-    </p:spTree>
-    <p:extLst>
-      <p:ext uri="{BB962C8B-B14F-4D97-AF65-F5344CB8AC3E}">
-        <p14:creationId xmlns:p14="http://schemas.microsoft.com/office/powerpoint/2010/main" val="3871210490"/>
-      </p:ext>
-    </p:extLst>
-  </p:cSld>
-  <p:clrMapOvr>
-    <a:masterClrMapping/>
-  </p:clrMapOvr>
-</p:sld>
-</file>
-
-<file path=ppt/slides/slide11.xml><?xml version="1.0" encoding="utf-8"?>
-<p:sld xmlns:a="http://schemas.openxmlformats.org/drawingml/2006/main" xmlns:r="http://schemas.openxmlformats.org/officeDocument/2006/relationships" xmlns:p="http://schemas.openxmlformats.org/presentationml/2006/main">
-  <p:cSld>
-    <p:spTree>
-      <p:nvGrpSpPr>
-        <p:cNvPr id="1" name=""/>
-        <p:cNvGrpSpPr/>
-        <p:nvPr/>
-      </p:nvGrpSpPr>
-      <p:grpSpPr>
-        <a:xfrm>
-          <a:off x="0" y="0"/>
-          <a:ext cx="0" cy="0"/>
-          <a:chOff x="0" y="0"/>
-          <a:chExt cx="0" cy="0"/>
-        </a:xfrm>
-      </p:grpSpPr>
-      <p:sp>
-        <p:nvSpPr>
-          <p:cNvPr id="2" name="Title 1">
-            <a:extLst>
-              <a:ext uri="{FF2B5EF4-FFF2-40B4-BE49-F238E27FC236}">
-                <a16:creationId xmlns:a16="http://schemas.microsoft.com/office/drawing/2014/main" id="{9FD42EA0-B6D9-4787-AC3B-6BFD24FB3858}"/>
-              </a:ext>
-            </a:extLst>
-          </p:cNvPr>
-          <p:cNvSpPr>
-            <a:spLocks noGrp="1"/>
-          </p:cNvSpPr>
-          <p:nvPr>
-            <p:ph type="title"/>
-          </p:nvPr>
-        </p:nvSpPr>
-        <p:spPr/>
-        <p:txBody>
-          <a:bodyPr/>
-          <a:lstStyle/>
-          <a:p>
-            <a:pPr algn="ctr"/>
-            <a:r>
-              <a:rPr lang="en-US" dirty="0"/>
-              <a:t>Regression Analysis</a:t>
-            </a:r>
-          </a:p>
-        </p:txBody>
-      </p:sp>
-      <p:sp>
-        <p:nvSpPr>
-          <p:cNvPr id="3" name="Content Placeholder 2">
-            <a:extLst>
-              <a:ext uri="{FF2B5EF4-FFF2-40B4-BE49-F238E27FC236}">
-                <a16:creationId xmlns:a16="http://schemas.microsoft.com/office/drawing/2014/main" id="{B0C1DBA9-3580-4B6B-B131-063D8A4CEFAD}"/>
-              </a:ext>
-            </a:extLst>
-          </p:cNvPr>
-          <p:cNvSpPr>
-            <a:spLocks noGrp="1"/>
-          </p:cNvSpPr>
-          <p:nvPr>
-            <p:ph idx="1"/>
-          </p:nvPr>
-        </p:nvSpPr>
-        <p:spPr/>
-        <p:txBody>
-          <a:bodyPr/>
-          <a:lstStyle/>
-          <a:p>
-            <a:r>
-              <a:rPr lang="en-US" dirty="0"/>
-              <a:t>Regression analysis generates an equation to describe the statistical relationship between one or more predictor variables and the response variable.</a:t>
-            </a:r>
-          </a:p>
-        </p:txBody>
-      </p:sp>
-      <p:pic>
-        <p:nvPicPr>
-          <p:cNvPr id="4" name="Picture 3">
-            <a:extLst>
-              <a:ext uri="{FF2B5EF4-FFF2-40B4-BE49-F238E27FC236}">
-                <a16:creationId xmlns:a16="http://schemas.microsoft.com/office/drawing/2014/main" id="{1E0E9D8E-53FE-4842-8E4B-1F399161780F}"/>
-              </a:ext>
-            </a:extLst>
-          </p:cNvPr>
-          <p:cNvPicPr>
-            <a:picLocks noChangeAspect="1"/>
-          </p:cNvPicPr>
-          <p:nvPr/>
-        </p:nvPicPr>
-        <p:blipFill>
-          <a:blip r:embed="rId2">
-            <a:extLst>
-              <a:ext uri="{28A0092B-C50C-407E-A947-70E740481C1C}">
-                <a14:useLocalDpi xmlns:a14="http://schemas.microsoft.com/office/drawing/2010/main" val="0"/>
-              </a:ext>
-            </a:extLst>
-          </a:blip>
-          <a:stretch>
-            <a:fillRect/>
-          </a:stretch>
-        </p:blipFill>
-        <p:spPr>
-          <a:xfrm>
-            <a:off x="4291923" y="3615397"/>
-            <a:ext cx="2113097" cy="2239107"/>
-          </a:xfrm>
-          <a:prstGeom prst="rect">
-            <a:avLst/>
-          </a:prstGeom>
-        </p:spPr>
-      </p:pic>
-    </p:spTree>
-    <p:extLst>
-      <p:ext uri="{BB962C8B-B14F-4D97-AF65-F5344CB8AC3E}">
-        <p14:creationId xmlns:p14="http://schemas.microsoft.com/office/powerpoint/2010/main" val="170037080"/>
-      </p:ext>
-    </p:extLst>
-  </p:cSld>
-  <p:clrMapOvr>
-    <a:masterClrMapping/>
-  </p:clrMapOvr>
-</p:sld>
-</file>
-
-<file path=ppt/slides/slide12.xml><?xml version="1.0" encoding="utf-8"?>
-<p:sld xmlns:a="http://schemas.openxmlformats.org/drawingml/2006/main" xmlns:r="http://schemas.openxmlformats.org/officeDocument/2006/relationships" xmlns:p="http://schemas.openxmlformats.org/presentationml/2006/main">
-  <p:cSld>
-    <p:spTree>
-      <p:nvGrpSpPr>
-        <p:cNvPr id="1" name=""/>
-        <p:cNvGrpSpPr/>
-        <p:nvPr/>
-      </p:nvGrpSpPr>
-      <p:grpSpPr>
-        <a:xfrm>
-          <a:off x="0" y="0"/>
-          <a:ext cx="0" cy="0"/>
-          <a:chOff x="0" y="0"/>
-          <a:chExt cx="0" cy="0"/>
-        </a:xfrm>
-      </p:grpSpPr>
-      <p:sp>
-        <p:nvSpPr>
-          <p:cNvPr id="2" name="Title 1">
-            <a:extLst>
-              <a:ext uri="{FF2B5EF4-FFF2-40B4-BE49-F238E27FC236}">
-                <a16:creationId xmlns:a16="http://schemas.microsoft.com/office/drawing/2014/main" id="{D7DE779D-A8F2-47DD-96CD-E25FEF4EBC75}"/>
-              </a:ext>
-            </a:extLst>
-          </p:cNvPr>
-          <p:cNvSpPr>
-            <a:spLocks noGrp="1"/>
-          </p:cNvSpPr>
-          <p:nvPr>
-            <p:ph type="title"/>
-          </p:nvPr>
-        </p:nvSpPr>
-        <p:spPr/>
-        <p:txBody>
-          <a:bodyPr/>
-          <a:lstStyle/>
-          <a:p>
-            <a:pPr algn="ctr"/>
-            <a:r>
-              <a:rPr lang="en-US" dirty="0" err="1"/>
-              <a:t>Regration</a:t>
-            </a:r>
-            <a:r>
-              <a:rPr lang="en-US" dirty="0"/>
-              <a:t> Analysis</a:t>
-            </a:r>
-            <a:br>
-              <a:rPr lang="en-US" dirty="0"/>
-            </a:br>
-            <a:r>
-              <a:rPr lang="en-US" dirty="0"/>
-              <a:t>Happiness – GDP Per Capita</a:t>
-            </a:r>
-          </a:p>
-        </p:txBody>
-      </p:sp>
-      <p:pic>
-        <p:nvPicPr>
-          <p:cNvPr id="7" name="Picture 6">
-            <a:extLst>
-              <a:ext uri="{FF2B5EF4-FFF2-40B4-BE49-F238E27FC236}">
-                <a16:creationId xmlns:a16="http://schemas.microsoft.com/office/drawing/2014/main" id="{7E23D6C0-89A2-4E3E-A9E6-D045C4D13B5E}"/>
-              </a:ext>
-            </a:extLst>
-          </p:cNvPr>
-          <p:cNvPicPr>
-            <a:picLocks noChangeAspect="1"/>
-          </p:cNvPicPr>
-          <p:nvPr/>
-        </p:nvPicPr>
-        <p:blipFill rotWithShape="1">
-          <a:blip r:embed="rId2"/>
-          <a:srcRect l="16615" t="29196" r="1692" b="11161"/>
-          <a:stretch/>
-        </p:blipFill>
-        <p:spPr>
-          <a:xfrm>
-            <a:off x="267285" y="1853247"/>
-            <a:ext cx="11408899" cy="4683113"/>
-          </a:xfrm>
-          <a:prstGeom prst="rect">
-            <a:avLst/>
-          </a:prstGeom>
-        </p:spPr>
-      </p:pic>
-    </p:spTree>
-    <p:extLst>
-      <p:ext uri="{BB962C8B-B14F-4D97-AF65-F5344CB8AC3E}">
-        <p14:creationId xmlns:p14="http://schemas.microsoft.com/office/powerpoint/2010/main" val="1439698341"/>
-      </p:ext>
-    </p:extLst>
-  </p:cSld>
-  <p:clrMapOvr>
-    <a:masterClrMapping/>
-  </p:clrMapOvr>
-</p:sld>
-</file>
-
-<file path=ppt/slides/slide13.xml><?xml version="1.0" encoding="utf-8"?>
-<p:sld xmlns:a="http://schemas.openxmlformats.org/drawingml/2006/main" xmlns:r="http://schemas.openxmlformats.org/officeDocument/2006/relationships" xmlns:p="http://schemas.openxmlformats.org/presentationml/2006/main">
-  <p:cSld>
-    <p:spTree>
-      <p:nvGrpSpPr>
-        <p:cNvPr id="1" name=""/>
-        <p:cNvGrpSpPr/>
-        <p:nvPr/>
-      </p:nvGrpSpPr>
-      <p:grpSpPr>
-        <a:xfrm>
-          <a:off x="0" y="0"/>
-          <a:ext cx="0" cy="0"/>
-          <a:chOff x="0" y="0"/>
-          <a:chExt cx="0" cy="0"/>
-        </a:xfrm>
-      </p:grpSpPr>
-      <p:sp>
-        <p:nvSpPr>
-          <p:cNvPr id="2" name="Title 1">
-            <a:extLst>
-              <a:ext uri="{FF2B5EF4-FFF2-40B4-BE49-F238E27FC236}">
-                <a16:creationId xmlns:a16="http://schemas.microsoft.com/office/drawing/2014/main" id="{1732194C-3430-4A85-BC0B-6D8031F531A2}"/>
-              </a:ext>
-            </a:extLst>
-          </p:cNvPr>
-          <p:cNvSpPr>
-            <a:spLocks noGrp="1"/>
-          </p:cNvSpPr>
-          <p:nvPr>
-            <p:ph type="title"/>
-          </p:nvPr>
-        </p:nvSpPr>
-        <p:spPr>
-          <a:xfrm>
-            <a:off x="646111" y="452718"/>
-            <a:ext cx="9404723" cy="939984"/>
-          </a:xfrm>
-        </p:spPr>
-        <p:txBody>
-          <a:bodyPr/>
-          <a:lstStyle/>
-          <a:p>
-            <a:pPr algn="ctr"/>
-            <a:r>
-              <a:rPr lang="en-US" dirty="0"/>
-              <a:t>Regression Analysis </a:t>
-            </a:r>
-            <a:br>
-              <a:rPr lang="en-US" dirty="0"/>
-            </a:br>
-            <a:r>
-              <a:rPr lang="en-US" dirty="0" err="1"/>
-              <a:t>Hapiness</a:t>
-            </a:r>
-            <a:r>
-              <a:rPr lang="en-US" dirty="0"/>
-              <a:t> – Birth Rate</a:t>
-            </a:r>
-          </a:p>
-        </p:txBody>
-      </p:sp>
-      <p:pic>
-        <p:nvPicPr>
-          <p:cNvPr id="9" name="Picture 8">
-            <a:extLst>
-              <a:ext uri="{FF2B5EF4-FFF2-40B4-BE49-F238E27FC236}">
-                <a16:creationId xmlns:a16="http://schemas.microsoft.com/office/drawing/2014/main" id="{F216AEE9-ADD9-4314-BF60-7211F276DA46}"/>
-              </a:ext>
-            </a:extLst>
-          </p:cNvPr>
-          <p:cNvPicPr>
-            <a:picLocks noChangeAspect="1"/>
-          </p:cNvPicPr>
-          <p:nvPr/>
-        </p:nvPicPr>
-        <p:blipFill rotWithShape="1">
-          <a:blip r:embed="rId2"/>
-          <a:srcRect l="23769" t="35070" r="5500" b="13212"/>
-          <a:stretch/>
-        </p:blipFill>
-        <p:spPr>
-          <a:xfrm>
-            <a:off x="466467" y="1871002"/>
-            <a:ext cx="10956499" cy="4504142"/>
-          </a:xfrm>
-          <a:prstGeom prst="rect">
-            <a:avLst/>
-          </a:prstGeom>
-        </p:spPr>
-      </p:pic>
-    </p:spTree>
-    <p:extLst>
-      <p:ext uri="{BB962C8B-B14F-4D97-AF65-F5344CB8AC3E}">
-        <p14:creationId xmlns:p14="http://schemas.microsoft.com/office/powerpoint/2010/main" val="402089898"/>
-      </p:ext>
-    </p:extLst>
-  </p:cSld>
-  <p:clrMapOvr>
-    <a:masterClrMapping/>
-  </p:clrMapOvr>
-</p:sld>
-</file>
-
-<file path=ppt/slides/slide14.xml><?xml version="1.0" encoding="utf-8"?>
-<p:sld xmlns:a="http://schemas.openxmlformats.org/drawingml/2006/main" xmlns:r="http://schemas.openxmlformats.org/officeDocument/2006/relationships" xmlns:p="http://schemas.openxmlformats.org/presentationml/2006/main">
-  <p:cSld>
-    <p:spTree>
-      <p:nvGrpSpPr>
-        <p:cNvPr id="1" name=""/>
-        <p:cNvGrpSpPr/>
-        <p:nvPr/>
-      </p:nvGrpSpPr>
-      <p:grpSpPr>
-        <a:xfrm>
-          <a:off x="0" y="0"/>
-          <a:ext cx="0" cy="0"/>
-          <a:chOff x="0" y="0"/>
-          <a:chExt cx="0" cy="0"/>
-        </a:xfrm>
-      </p:grpSpPr>
-      <p:sp>
-        <p:nvSpPr>
-          <p:cNvPr id="2" name="Title 1">
-            <a:extLst>
-              <a:ext uri="{FF2B5EF4-FFF2-40B4-BE49-F238E27FC236}">
-                <a16:creationId xmlns:a16="http://schemas.microsoft.com/office/drawing/2014/main" id="{638D4F7A-95B4-42BA-82AF-5516C3E97193}"/>
-              </a:ext>
-            </a:extLst>
-          </p:cNvPr>
-          <p:cNvSpPr>
-            <a:spLocks noGrp="1"/>
-          </p:cNvSpPr>
-          <p:nvPr>
-            <p:ph type="title"/>
-          </p:nvPr>
-        </p:nvSpPr>
-        <p:spPr/>
-        <p:txBody>
-          <a:bodyPr/>
-          <a:lstStyle/>
-          <a:p>
-            <a:endParaRPr lang="en-US"/>
-          </a:p>
-        </p:txBody>
-      </p:sp>
-      <p:sp>
-        <p:nvSpPr>
-          <p:cNvPr id="3" name="Content Placeholder 2">
-            <a:extLst>
-              <a:ext uri="{FF2B5EF4-FFF2-40B4-BE49-F238E27FC236}">
-                <a16:creationId xmlns:a16="http://schemas.microsoft.com/office/drawing/2014/main" id="{8478FBF7-AA29-40E4-AE5E-EF359E64C777}"/>
-              </a:ext>
-            </a:extLst>
-          </p:cNvPr>
-          <p:cNvSpPr>
-            <a:spLocks noGrp="1"/>
-          </p:cNvSpPr>
-          <p:nvPr>
-            <p:ph idx="1"/>
-          </p:nvPr>
-        </p:nvSpPr>
-        <p:spPr/>
-        <p:txBody>
-          <a:bodyPr/>
-          <a:lstStyle/>
-          <a:p>
-            <a:pPr fontAlgn="base"/>
-            <a:r>
-              <a:rPr lang="en-US" dirty="0">
-                <a:solidFill>
-                  <a:srgbClr val="FF0000"/>
-                </a:solidFill>
-              </a:rPr>
-              <a:t>R Square</a:t>
-            </a:r>
-          </a:p>
-          <a:p>
-            <a:pPr fontAlgn="base"/>
-            <a:r>
-              <a:rPr lang="en-US" dirty="0">
-                <a:solidFill>
-                  <a:srgbClr val="FF0000"/>
-                </a:solidFill>
-              </a:rPr>
-              <a:t>R Square equals 0.962, which is a very good fit. 96% of the variation in Quantity Sold is explained by the independent variables Price and Advertising. The closer to 1, the better the regression line (read on) fits the data.</a:t>
-            </a:r>
-          </a:p>
-          <a:p>
-            <a:endParaRPr lang="en-US" dirty="0"/>
-          </a:p>
-        </p:txBody>
-      </p:sp>
-    </p:spTree>
-    <p:extLst>
-      <p:ext uri="{BB962C8B-B14F-4D97-AF65-F5344CB8AC3E}">
-        <p14:creationId xmlns:p14="http://schemas.microsoft.com/office/powerpoint/2010/main" val="3204994572"/>
-      </p:ext>
-    </p:extLst>
-  </p:cSld>
-  <p:clrMapOvr>
-    <a:masterClrMapping/>
-  </p:clrMapOvr>
-</p:sld>
-</file>
-
 <file path=ppt/slides/slide2.xml><?xml version="1.0" encoding="utf-8"?>
 <p:sld xmlns:a="http://schemas.openxmlformats.org/drawingml/2006/main" xmlns:r="http://schemas.openxmlformats.org/officeDocument/2006/relationships" xmlns:p="http://schemas.openxmlformats.org/presentationml/2006/main">
   <p:cSld>
@@ -7700,6 +7017,319 @@
           <a:chExt cx="0" cy="0"/>
         </a:xfrm>
       </p:grpSpPr>
+      <p:pic>
+        <p:nvPicPr>
+          <p:cNvPr id="5" name="Content Placeholder 4">
+            <a:extLst>
+              <a:ext uri="{FF2B5EF4-FFF2-40B4-BE49-F238E27FC236}">
+                <a16:creationId xmlns:a16="http://schemas.microsoft.com/office/drawing/2014/main" id="{FC4D9827-35EE-4603-BF61-2EC1DD330BA2}"/>
+              </a:ext>
+            </a:extLst>
+          </p:cNvPr>
+          <p:cNvPicPr>
+            <a:picLocks noGrp="1" noChangeAspect="1"/>
+          </p:cNvPicPr>
+          <p:nvPr>
+            <p:ph idx="1"/>
+          </p:nvPr>
+        </p:nvPicPr>
+        <p:blipFill>
+          <a:blip r:embed="rId2">
+            <a:extLst>
+              <a:ext uri="{28A0092B-C50C-407E-A947-70E740481C1C}">
+                <a14:useLocalDpi xmlns:a14="http://schemas.microsoft.com/office/drawing/2010/main" val="0"/>
+              </a:ext>
+            </a:extLst>
+          </a:blip>
+          <a:stretch>
+            <a:fillRect/>
+          </a:stretch>
+        </p:blipFill>
+        <p:spPr>
+          <a:xfrm>
+            <a:off x="267285" y="1109726"/>
+            <a:ext cx="7343337" cy="5507504"/>
+          </a:xfrm>
+        </p:spPr>
+      </p:pic>
+      <p:sp>
+        <p:nvSpPr>
+          <p:cNvPr id="4" name="Rectangle 3">
+            <a:extLst>
+              <a:ext uri="{FF2B5EF4-FFF2-40B4-BE49-F238E27FC236}">
+                <a16:creationId xmlns:a16="http://schemas.microsoft.com/office/drawing/2014/main" id="{E2F53BA1-9F87-4567-BDA1-D2CDDD81A776}"/>
+              </a:ext>
+            </a:extLst>
+          </p:cNvPr>
+          <p:cNvSpPr/>
+          <p:nvPr/>
+        </p:nvSpPr>
+        <p:spPr>
+          <a:xfrm>
+            <a:off x="7610621" y="1655605"/>
+            <a:ext cx="4581379" cy="369332"/>
+          </a:xfrm>
+          <a:prstGeom prst="rect">
+            <a:avLst/>
+          </a:prstGeom>
+        </p:spPr>
+        <p:txBody>
+          <a:bodyPr wrap="square">
+            <a:spAutoFit/>
+          </a:bodyPr>
+          <a:lstStyle/>
+          <a:p>
+            <a:r>
+              <a:rPr lang="en-US" dirty="0"/>
+              <a:t>Pearson r correlation coefficient = -0.32 </a:t>
+            </a:r>
+          </a:p>
+        </p:txBody>
+      </p:sp>
+      <p:sp>
+        <p:nvSpPr>
+          <p:cNvPr id="7" name="TextBox 6">
+            <a:extLst>
+              <a:ext uri="{FF2B5EF4-FFF2-40B4-BE49-F238E27FC236}">
+                <a16:creationId xmlns:a16="http://schemas.microsoft.com/office/drawing/2014/main" id="{E1D2B391-8F20-4697-8870-819BFD2E66D8}"/>
+              </a:ext>
+            </a:extLst>
+          </p:cNvPr>
+          <p:cNvSpPr txBox="1"/>
+          <p:nvPr/>
+        </p:nvSpPr>
+        <p:spPr>
+          <a:xfrm>
+            <a:off x="7610620" y="2278967"/>
+            <a:ext cx="4417255" cy="1477328"/>
+          </a:xfrm>
+          <a:prstGeom prst="rect">
+            <a:avLst/>
+          </a:prstGeom>
+          <a:noFill/>
+        </p:spPr>
+        <p:txBody>
+          <a:bodyPr wrap="square" rtlCol="0">
+            <a:spAutoFit/>
+          </a:bodyPr>
+          <a:lstStyle/>
+          <a:p>
+            <a:r>
+              <a:rPr lang="en-US" dirty="0"/>
+              <a:t>According to results of our analysis we can state that there is </a:t>
+            </a:r>
+            <a:r>
+              <a:rPr lang="en-US" b="1" dirty="0">
+                <a:solidFill>
+                  <a:srgbClr val="FF0000"/>
+                </a:solidFill>
+              </a:rPr>
+              <a:t>a weak-medium negative relationship </a:t>
+            </a:r>
+            <a:r>
+              <a:rPr lang="en-US" dirty="0"/>
+              <a:t>between GDP Per Capita and Happiness Score of a country</a:t>
+            </a:r>
+          </a:p>
+        </p:txBody>
+      </p:sp>
+      <p:sp>
+        <p:nvSpPr>
+          <p:cNvPr id="3" name="TextBox 2">
+            <a:extLst>
+              <a:ext uri="{FF2B5EF4-FFF2-40B4-BE49-F238E27FC236}">
+                <a16:creationId xmlns:a16="http://schemas.microsoft.com/office/drawing/2014/main" id="{5A5957E6-23DC-40A2-8B1C-D03EE931329C}"/>
+              </a:ext>
+            </a:extLst>
+          </p:cNvPr>
+          <p:cNvSpPr txBox="1"/>
+          <p:nvPr/>
+        </p:nvSpPr>
+        <p:spPr>
+          <a:xfrm>
+            <a:off x="2321169" y="323557"/>
+            <a:ext cx="7329268" cy="461665"/>
+          </a:xfrm>
+          <a:prstGeom prst="rect">
+            <a:avLst/>
+          </a:prstGeom>
+          <a:noFill/>
+        </p:spPr>
+        <p:txBody>
+          <a:bodyPr wrap="square" rtlCol="0">
+            <a:spAutoFit/>
+          </a:bodyPr>
+          <a:lstStyle/>
+          <a:p>
+            <a:pPr algn="ctr"/>
+            <a:r>
+              <a:rPr lang="en-US" sz="2400" dirty="0"/>
+              <a:t>Question 4 – Birth Rate and Happiness Score</a:t>
+            </a:r>
+          </a:p>
+        </p:txBody>
+      </p:sp>
+      <p:sp>
+        <p:nvSpPr>
+          <p:cNvPr id="8" name="TextBox 7">
+            <a:extLst>
+              <a:ext uri="{FF2B5EF4-FFF2-40B4-BE49-F238E27FC236}">
+                <a16:creationId xmlns:a16="http://schemas.microsoft.com/office/drawing/2014/main" id="{989DCDCC-B357-427E-8A6A-1626161DFC76}"/>
+              </a:ext>
+            </a:extLst>
+          </p:cNvPr>
+          <p:cNvSpPr txBox="1"/>
+          <p:nvPr/>
+        </p:nvSpPr>
+        <p:spPr>
+          <a:xfrm>
+            <a:off x="8468751" y="1109726"/>
+            <a:ext cx="2700997" cy="369332"/>
+          </a:xfrm>
+          <a:prstGeom prst="rect">
+            <a:avLst/>
+          </a:prstGeom>
+          <a:noFill/>
+        </p:spPr>
+        <p:txBody>
+          <a:bodyPr wrap="square" rtlCol="0">
+            <a:spAutoFit/>
+          </a:bodyPr>
+          <a:lstStyle/>
+          <a:p>
+            <a:r>
+              <a:rPr lang="en-US" dirty="0"/>
+              <a:t>Correlation Analysis</a:t>
+            </a:r>
+          </a:p>
+        </p:txBody>
+      </p:sp>
+      <p:sp>
+        <p:nvSpPr>
+          <p:cNvPr id="9" name="TextBox 8">
+            <a:extLst>
+              <a:ext uri="{FF2B5EF4-FFF2-40B4-BE49-F238E27FC236}">
+                <a16:creationId xmlns:a16="http://schemas.microsoft.com/office/drawing/2014/main" id="{65105771-5F5D-4E93-9195-0C3814FE2000}"/>
+              </a:ext>
+            </a:extLst>
+          </p:cNvPr>
+          <p:cNvSpPr txBox="1"/>
+          <p:nvPr/>
+        </p:nvSpPr>
+        <p:spPr>
+          <a:xfrm>
+            <a:off x="8468748" y="4158906"/>
+            <a:ext cx="2700997" cy="369332"/>
+          </a:xfrm>
+          <a:prstGeom prst="rect">
+            <a:avLst/>
+          </a:prstGeom>
+          <a:noFill/>
+        </p:spPr>
+        <p:txBody>
+          <a:bodyPr wrap="square" rtlCol="0">
+            <a:spAutoFit/>
+          </a:bodyPr>
+          <a:lstStyle/>
+          <a:p>
+            <a:r>
+              <a:rPr lang="en-US" dirty="0"/>
+              <a:t>Regression Analysis</a:t>
+            </a:r>
+          </a:p>
+        </p:txBody>
+      </p:sp>
+      <p:sp>
+        <p:nvSpPr>
+          <p:cNvPr id="10" name="TextBox 9">
+            <a:extLst>
+              <a:ext uri="{FF2B5EF4-FFF2-40B4-BE49-F238E27FC236}">
+                <a16:creationId xmlns:a16="http://schemas.microsoft.com/office/drawing/2014/main" id="{18C58923-6336-4146-A0E1-23B3F820A740}"/>
+              </a:ext>
+            </a:extLst>
+          </p:cNvPr>
+          <p:cNvSpPr txBox="1"/>
+          <p:nvPr/>
+        </p:nvSpPr>
+        <p:spPr>
+          <a:xfrm>
+            <a:off x="7723163" y="4726751"/>
+            <a:ext cx="4079631" cy="1200329"/>
+          </a:xfrm>
+          <a:prstGeom prst="rect">
+            <a:avLst/>
+          </a:prstGeom>
+          <a:noFill/>
+        </p:spPr>
+        <p:txBody>
+          <a:bodyPr wrap="square" rtlCol="0">
+            <a:spAutoFit/>
+          </a:bodyPr>
+          <a:lstStyle/>
+          <a:p>
+            <a:r>
+              <a:rPr lang="en-US" dirty="0"/>
+              <a:t>R Square 0.41558496 </a:t>
+            </a:r>
+          </a:p>
+          <a:p>
+            <a:r>
+              <a:rPr lang="en-US" dirty="0"/>
+              <a:t>Observations  137</a:t>
+            </a:r>
+          </a:p>
+          <a:p>
+            <a:r>
+              <a:rPr lang="en-US" i="1" dirty="0"/>
+              <a:t>P-value</a:t>
+            </a:r>
+            <a:r>
+              <a:rPr lang="en-US" dirty="0"/>
+              <a:t>  1.89E-17 </a:t>
+            </a:r>
+          </a:p>
+          <a:p>
+            <a:r>
+              <a:rPr lang="en-US" i="1" dirty="0"/>
+              <a:t>Coefficients</a:t>
+            </a:r>
+            <a:r>
+              <a:rPr lang="en-US" dirty="0"/>
+              <a:t>  -0.726368483 </a:t>
+            </a:r>
+          </a:p>
+        </p:txBody>
+      </p:sp>
+    </p:spTree>
+    <p:extLst>
+      <p:ext uri="{BB962C8B-B14F-4D97-AF65-F5344CB8AC3E}">
+        <p14:creationId xmlns:p14="http://schemas.microsoft.com/office/powerpoint/2010/main" val="953563573"/>
+      </p:ext>
+    </p:extLst>
+  </p:cSld>
+  <p:clrMapOvr>
+    <a:masterClrMapping/>
+  </p:clrMapOvr>
+</p:sld>
+</file>
+
+<file path=ppt/slides/slide8.xml><?xml version="1.0" encoding="utf-8"?>
+<p:sld xmlns:a="http://schemas.openxmlformats.org/drawingml/2006/main" xmlns:r="http://schemas.openxmlformats.org/officeDocument/2006/relationships" xmlns:p="http://schemas.openxmlformats.org/presentationml/2006/main">
+  <p:cSld>
+    <p:spTree>
+      <p:nvGrpSpPr>
+        <p:cNvPr id="1" name=""/>
+        <p:cNvGrpSpPr/>
+        <p:nvPr/>
+      </p:nvGrpSpPr>
+      <p:grpSpPr>
+        <a:xfrm>
+          <a:off x="0" y="0"/>
+          <a:ext cx="0" cy="0"/>
+          <a:chOff x="0" y="0"/>
+          <a:chExt cx="0" cy="0"/>
+        </a:xfrm>
+      </p:grpSpPr>
       <p:sp>
         <p:nvSpPr>
           <p:cNvPr id="2" name="Title 1">
@@ -7773,7 +7403,7 @@
 </p:sld>
 </file>
 
-<file path=ppt/slides/slide8.xml><?xml version="1.0" encoding="utf-8"?>
+<file path=ppt/slides/slide9.xml><?xml version="1.0" encoding="utf-8"?>
 <p:sld xmlns:a="http://schemas.openxmlformats.org/drawingml/2006/main" xmlns:r="http://schemas.openxmlformats.org/officeDocument/2006/relationships" xmlns:p="http://schemas.openxmlformats.org/presentationml/2006/main">
   <p:cSld>
     <p:spTree>
@@ -7840,7 +7470,7 @@
         <p:spPr>
           <a:xfrm>
             <a:off x="7610621" y="1655605"/>
-            <a:ext cx="4417255" cy="369332"/>
+            <a:ext cx="4581379" cy="369332"/>
           </a:xfrm>
           <a:prstGeom prst="rect">
             <a:avLst/>
@@ -7854,22 +7484,7 @@
           <a:p>
             <a:r>
               <a:rPr lang="en-US" dirty="0"/>
-              <a:t>Pearson r correlation coefficient = </a:t>
-            </a:r>
-            <a:r>
-              <a:rPr lang="en-US" dirty="0">
-                <a:solidFill>
-                  <a:schemeClr val="tx1">
-                    <a:lumMod val="95000"/>
-                  </a:schemeClr>
-                </a:solidFill>
-                <a:latin typeface="Calibri" panose="020F0502020204030204" pitchFamily="34" charset="0"/>
-              </a:rPr>
-              <a:t>0.73</a:t>
-            </a:r>
-            <a:r>
-              <a:rPr lang="en-US" dirty="0"/>
-              <a:t> </a:t>
+              <a:t>Pearson r correlation coefficient = -0.32 </a:t>
             </a:r>
           </a:p>
         </p:txBody>
@@ -7904,7 +7519,19 @@
           <a:p>
             <a:r>
               <a:rPr lang="en-US" dirty="0"/>
-              <a:t>According to results of our analysis we can state that there is a strong positive relationship between GDP Per Capita and Happiness Score of a country</a:t>
+              <a:t>According to results of our analysis we can state that there is </a:t>
+            </a:r>
+            <a:r>
+              <a:rPr lang="en-US" b="1" dirty="0">
+                <a:solidFill>
+                  <a:srgbClr val="FF0000"/>
+                </a:solidFill>
+              </a:rPr>
+              <a:t>a weak-medium negative relationship </a:t>
+            </a:r>
+            <a:r>
+              <a:rPr lang="en-US" dirty="0"/>
+              <a:t>between GDP Per Capita and Happiness Score of a country</a:t>
             </a:r>
           </a:p>
         </p:txBody>
@@ -7994,7 +7621,7 @@
         </p:nvSpPr>
         <p:spPr>
           <a:xfrm>
-            <a:off x="8468748" y="3863478"/>
+            <a:off x="8468748" y="4158906"/>
             <a:ext cx="2700997" cy="369332"/>
           </a:xfrm>
           <a:prstGeom prst="rect">
@@ -8029,8 +7656,8 @@
         </p:nvSpPr>
         <p:spPr>
           <a:xfrm>
-            <a:off x="7723163" y="4431323"/>
-            <a:ext cx="4079631" cy="369332"/>
+            <a:off x="7723163" y="4726751"/>
+            <a:ext cx="4079631" cy="1200329"/>
           </a:xfrm>
           <a:prstGeom prst="rect">
             <a:avLst/>
@@ -8045,7 +7672,33 @@
           <a:p>
             <a:r>
               <a:rPr lang="en-US" dirty="0"/>
-              <a:t>R Square</a:t>
+              <a:t>R Square 0.41558496 </a:t>
+            </a:r>
+          </a:p>
+          <a:p>
+            <a:r>
+              <a:rPr lang="en-US" dirty="0"/>
+              <a:t>Observations  137</a:t>
+            </a:r>
+          </a:p>
+          <a:p>
+            <a:r>
+              <a:rPr lang="en-US" i="1" dirty="0"/>
+              <a:t>P-value</a:t>
+            </a:r>
+            <a:r>
+              <a:rPr lang="en-US" dirty="0"/>
+              <a:t>  1.89E-17 </a:t>
+            </a:r>
+          </a:p>
+          <a:p>
+            <a:r>
+              <a:rPr lang="en-US" i="1" dirty="0"/>
+              <a:t>Coefficients</a:t>
+            </a:r>
+            <a:r>
+              <a:rPr lang="en-US" dirty="0"/>
+              <a:t>  -0.726368483 </a:t>
             </a:r>
           </a:p>
         </p:txBody>
@@ -8054,241 +7707,6 @@
     <p:extLst>
       <p:ext uri="{BB962C8B-B14F-4D97-AF65-F5344CB8AC3E}">
         <p14:creationId xmlns:p14="http://schemas.microsoft.com/office/powerpoint/2010/main" val="1533164640"/>
-      </p:ext>
-    </p:extLst>
-  </p:cSld>
-  <p:clrMapOvr>
-    <a:masterClrMapping/>
-  </p:clrMapOvr>
-</p:sld>
-</file>
-
-<file path=ppt/slides/slide9.xml><?xml version="1.0" encoding="utf-8"?>
-<p:sld xmlns:a="http://schemas.openxmlformats.org/drawingml/2006/main" xmlns:r="http://schemas.openxmlformats.org/officeDocument/2006/relationships" xmlns:p="http://schemas.openxmlformats.org/presentationml/2006/main">
-  <p:cSld>
-    <p:spTree>
-      <p:nvGrpSpPr>
-        <p:cNvPr id="1" name=""/>
-        <p:cNvGrpSpPr/>
-        <p:nvPr/>
-      </p:nvGrpSpPr>
-      <p:grpSpPr>
-        <a:xfrm>
-          <a:off x="0" y="0"/>
-          <a:ext cx="0" cy="0"/>
-          <a:chOff x="0" y="0"/>
-          <a:chExt cx="0" cy="0"/>
-        </a:xfrm>
-      </p:grpSpPr>
-      <p:sp>
-        <p:nvSpPr>
-          <p:cNvPr id="2" name="Title 1">
-            <a:extLst>
-              <a:ext uri="{FF2B5EF4-FFF2-40B4-BE49-F238E27FC236}">
-                <a16:creationId xmlns:a16="http://schemas.microsoft.com/office/drawing/2014/main" id="{3FA549DD-F4D4-473D-B798-C3DDEC97BB0E}"/>
-              </a:ext>
-            </a:extLst>
-          </p:cNvPr>
-          <p:cNvSpPr>
-            <a:spLocks noGrp="1"/>
-          </p:cNvSpPr>
-          <p:nvPr>
-            <p:ph type="title"/>
-          </p:nvPr>
-        </p:nvSpPr>
-        <p:spPr/>
-        <p:txBody>
-          <a:bodyPr/>
-          <a:lstStyle/>
-          <a:p>
-            <a:pPr algn="ctr"/>
-            <a:r>
-              <a:rPr lang="en-US" dirty="0"/>
-              <a:t>Correlation Test Result for</a:t>
-            </a:r>
-            <a:br>
-              <a:rPr lang="en-US" dirty="0"/>
-            </a:br>
-            <a:r>
-              <a:rPr lang="en-US" dirty="0"/>
-              <a:t> Happiness – GDP Per Capita</a:t>
-            </a:r>
-          </a:p>
-        </p:txBody>
-      </p:sp>
-      <p:sp>
-        <p:nvSpPr>
-          <p:cNvPr id="20" name="Rectangle 19">
-            <a:extLst>
-              <a:ext uri="{FF2B5EF4-FFF2-40B4-BE49-F238E27FC236}">
-                <a16:creationId xmlns:a16="http://schemas.microsoft.com/office/drawing/2014/main" id="{EFDB967E-1F4D-4AE0-AF65-7EEE17F48A91}"/>
-              </a:ext>
-            </a:extLst>
-          </p:cNvPr>
-          <p:cNvSpPr/>
-          <p:nvPr/>
-        </p:nvSpPr>
-        <p:spPr>
-          <a:xfrm>
-            <a:off x="964334" y="3095339"/>
-            <a:ext cx="5793574" cy="461665"/>
-          </a:xfrm>
-          <a:prstGeom prst="rect">
-            <a:avLst/>
-          </a:prstGeom>
-        </p:spPr>
-        <p:txBody>
-          <a:bodyPr wrap="none">
-            <a:spAutoFit/>
-          </a:bodyPr>
-          <a:lstStyle/>
-          <a:p>
-            <a:r>
-              <a:rPr lang="en-US" sz="2400" i="1" dirty="0"/>
-              <a:t>r</a:t>
-            </a:r>
-            <a:r>
-              <a:rPr lang="en-US" sz="2400" dirty="0"/>
-              <a:t>  (Pearson r correlation coefficient) = </a:t>
-            </a:r>
-          </a:p>
-        </p:txBody>
-      </p:sp>
-      <p:sp>
-        <p:nvSpPr>
-          <p:cNvPr id="21" name="Rectangle 20">
-            <a:extLst>
-              <a:ext uri="{FF2B5EF4-FFF2-40B4-BE49-F238E27FC236}">
-                <a16:creationId xmlns:a16="http://schemas.microsoft.com/office/drawing/2014/main" id="{4E00E77B-C062-481C-9CBB-0CCA1DFEAF6C}"/>
-              </a:ext>
-            </a:extLst>
-          </p:cNvPr>
-          <p:cNvSpPr/>
-          <p:nvPr/>
-        </p:nvSpPr>
-        <p:spPr>
-          <a:xfrm>
-            <a:off x="7092339" y="3095339"/>
-            <a:ext cx="1009650" cy="368300"/>
-          </a:xfrm>
-          <a:prstGeom prst="rect">
-            <a:avLst/>
-          </a:prstGeom>
-        </p:spPr>
-        <p:txBody>
-          <a:bodyPr wrap="none">
-            <a:spAutoFit/>
-          </a:bodyPr>
-          <a:lstStyle/>
-          <a:p>
-            <a:r>
-              <a:rPr lang="en-US" dirty="0">
-                <a:solidFill>
-                  <a:schemeClr val="tx1">
-                    <a:lumMod val="95000"/>
-                  </a:schemeClr>
-                </a:solidFill>
-                <a:latin typeface="Calibri" panose="020F0502020204030204" pitchFamily="34" charset="0"/>
-              </a:rPr>
-              <a:t>0.73372</a:t>
-            </a:r>
-            <a:r>
-              <a:rPr lang="en-US" dirty="0"/>
-              <a:t> </a:t>
-            </a:r>
-          </a:p>
-        </p:txBody>
-      </p:sp>
-      <p:sp>
-        <p:nvSpPr>
-          <p:cNvPr id="22" name="Rectangle 21">
-            <a:extLst>
-              <a:ext uri="{FF2B5EF4-FFF2-40B4-BE49-F238E27FC236}">
-                <a16:creationId xmlns:a16="http://schemas.microsoft.com/office/drawing/2014/main" id="{D851582D-8B61-4E38-B056-6EF32C85D29E}"/>
-              </a:ext>
-            </a:extLst>
-          </p:cNvPr>
-          <p:cNvSpPr/>
-          <p:nvPr/>
-        </p:nvSpPr>
-        <p:spPr>
-          <a:xfrm>
-            <a:off x="5254496" y="2243461"/>
-            <a:ext cx="3675686" cy="461665"/>
-          </a:xfrm>
-          <a:prstGeom prst="rect">
-            <a:avLst/>
-          </a:prstGeom>
-        </p:spPr>
-        <p:txBody>
-          <a:bodyPr wrap="none">
-            <a:spAutoFit/>
-          </a:bodyPr>
-          <a:lstStyle/>
-          <a:p>
-            <a:r>
-              <a:rPr lang="en-US" sz="2400" dirty="0">
-                <a:solidFill>
-                  <a:schemeClr val="tx1">
-                    <a:lumMod val="95000"/>
-                  </a:schemeClr>
-                </a:solidFill>
-                <a:latin typeface="Calibri" panose="020F0502020204030204" pitchFamily="34" charset="0"/>
-              </a:rPr>
-              <a:t>Happiness - GDP Per Capita</a:t>
-            </a:r>
-            <a:r>
-              <a:rPr lang="en-US" sz="2400" dirty="0">
-                <a:solidFill>
-                  <a:schemeClr val="tx1">
-                    <a:lumMod val="95000"/>
-                  </a:schemeClr>
-                </a:solidFill>
-              </a:rPr>
-              <a:t> </a:t>
-            </a:r>
-          </a:p>
-        </p:txBody>
-      </p:sp>
-      <p:sp>
-        <p:nvSpPr>
-          <p:cNvPr id="24" name="TextBox 23">
-            <a:extLst>
-              <a:ext uri="{FF2B5EF4-FFF2-40B4-BE49-F238E27FC236}">
-                <a16:creationId xmlns:a16="http://schemas.microsoft.com/office/drawing/2014/main" id="{83C146C3-04AD-4FB2-8C47-33B17327843E}"/>
-              </a:ext>
-            </a:extLst>
-          </p:cNvPr>
-          <p:cNvSpPr txBox="1"/>
-          <p:nvPr/>
-        </p:nvSpPr>
-        <p:spPr>
-          <a:xfrm>
-            <a:off x="1083212" y="4318782"/>
-            <a:ext cx="8328074" cy="923330"/>
-          </a:xfrm>
-          <a:prstGeom prst="rect">
-            <a:avLst/>
-          </a:prstGeom>
-          <a:noFill/>
-        </p:spPr>
-        <p:txBody>
-          <a:bodyPr wrap="square" rtlCol="0">
-            <a:spAutoFit/>
-          </a:bodyPr>
-          <a:lstStyle/>
-          <a:p>
-            <a:r>
-              <a:rPr lang="en-US" dirty="0"/>
-              <a:t>According to results of our analysis we can state that there is a strong positive relationship between GDP Per Capita and Happiness Score of a country</a:t>
-            </a:r>
-          </a:p>
-        </p:txBody>
-      </p:sp>
-    </p:spTree>
-    <p:extLst>
-      <p:ext uri="{BB962C8B-B14F-4D97-AF65-F5344CB8AC3E}">
-        <p14:creationId xmlns:p14="http://schemas.microsoft.com/office/powerpoint/2010/main" val="1060732054"/>
       </p:ext>
     </p:extLst>
   </p:cSld>

</xml_diff>

<commit_message>
for GDP and hapiness regresion analysis added
</commit_message>
<xml_diff>
--- a/Project_1_Team_7_Presentation.pptx
+++ b/Project_1_Team_7_Presentation.pptx
@@ -12,8 +12,7 @@
     <p:sldId id="259" r:id="rId6"/>
     <p:sldId id="260" r:id="rId7"/>
     <p:sldId id="266" r:id="rId8"/>
-    <p:sldId id="262" r:id="rId9"/>
-    <p:sldId id="265" r:id="rId10"/>
+    <p:sldId id="265" r:id="rId9"/>
   </p:sldIdLst>
   <p:sldSz cx="12192000" cy="6858000"/>
   <p:notesSz cx="6858000" cy="9144000"/>
@@ -7017,12 +7016,272 @@
           <a:chExt cx="0" cy="0"/>
         </a:xfrm>
       </p:grpSpPr>
+      <p:sp>
+        <p:nvSpPr>
+          <p:cNvPr id="4" name="Rectangle 3">
+            <a:extLst>
+              <a:ext uri="{FF2B5EF4-FFF2-40B4-BE49-F238E27FC236}">
+                <a16:creationId xmlns:a16="http://schemas.microsoft.com/office/drawing/2014/main" id="{E2F53BA1-9F87-4567-BDA1-D2CDDD81A776}"/>
+              </a:ext>
+            </a:extLst>
+          </p:cNvPr>
+          <p:cNvSpPr/>
+          <p:nvPr/>
+        </p:nvSpPr>
+        <p:spPr>
+          <a:xfrm>
+            <a:off x="7610621" y="1655605"/>
+            <a:ext cx="4581379" cy="369332"/>
+          </a:xfrm>
+          <a:prstGeom prst="rect">
+            <a:avLst/>
+          </a:prstGeom>
+        </p:spPr>
+        <p:txBody>
+          <a:bodyPr wrap="square">
+            <a:spAutoFit/>
+          </a:bodyPr>
+          <a:lstStyle/>
+          <a:p>
+            <a:r>
+              <a:rPr lang="en-US" dirty="0"/>
+              <a:t>Pearson r correlation coefficient = 0.73</a:t>
+            </a:r>
+          </a:p>
+        </p:txBody>
+      </p:sp>
+      <p:sp>
+        <p:nvSpPr>
+          <p:cNvPr id="7" name="TextBox 6">
+            <a:extLst>
+              <a:ext uri="{FF2B5EF4-FFF2-40B4-BE49-F238E27FC236}">
+                <a16:creationId xmlns:a16="http://schemas.microsoft.com/office/drawing/2014/main" id="{E1D2B391-8F20-4697-8870-819BFD2E66D8}"/>
+              </a:ext>
+            </a:extLst>
+          </p:cNvPr>
+          <p:cNvSpPr txBox="1"/>
+          <p:nvPr/>
+        </p:nvSpPr>
+        <p:spPr>
+          <a:xfrm>
+            <a:off x="7610620" y="2278967"/>
+            <a:ext cx="4417255" cy="1477328"/>
+          </a:xfrm>
+          <a:prstGeom prst="rect">
+            <a:avLst/>
+          </a:prstGeom>
+          <a:noFill/>
+        </p:spPr>
+        <p:txBody>
+          <a:bodyPr wrap="square" rtlCol="0">
+            <a:spAutoFit/>
+          </a:bodyPr>
+          <a:lstStyle/>
+          <a:p>
+            <a:r>
+              <a:rPr lang="en-US" dirty="0"/>
+              <a:t>According to results of our analysis we can state that there is </a:t>
+            </a:r>
+            <a:r>
+              <a:rPr lang="en-US" b="1" dirty="0">
+                <a:solidFill>
+                  <a:srgbClr val="FF0000"/>
+                </a:solidFill>
+              </a:rPr>
+              <a:t>a strong positive relationship </a:t>
+            </a:r>
+            <a:r>
+              <a:rPr lang="en-US" dirty="0"/>
+              <a:t>between GDP Per Capita and Happiness Score of a country</a:t>
+            </a:r>
+          </a:p>
+        </p:txBody>
+      </p:sp>
+      <p:sp>
+        <p:nvSpPr>
+          <p:cNvPr id="3" name="TextBox 2">
+            <a:extLst>
+              <a:ext uri="{FF2B5EF4-FFF2-40B4-BE49-F238E27FC236}">
+                <a16:creationId xmlns:a16="http://schemas.microsoft.com/office/drawing/2014/main" id="{5A5957E6-23DC-40A2-8B1C-D03EE931329C}"/>
+              </a:ext>
+            </a:extLst>
+          </p:cNvPr>
+          <p:cNvSpPr txBox="1"/>
+          <p:nvPr/>
+        </p:nvSpPr>
+        <p:spPr>
+          <a:xfrm>
+            <a:off x="2321169" y="323557"/>
+            <a:ext cx="7329268" cy="461665"/>
+          </a:xfrm>
+          <a:prstGeom prst="rect">
+            <a:avLst/>
+          </a:prstGeom>
+          <a:noFill/>
+        </p:spPr>
+        <p:txBody>
+          <a:bodyPr wrap="square" rtlCol="0">
+            <a:spAutoFit/>
+          </a:bodyPr>
+          <a:lstStyle/>
+          <a:p>
+            <a:pPr algn="ctr"/>
+            <a:r>
+              <a:rPr lang="en-US" sz="2400" dirty="0"/>
+              <a:t>Question 4 – Birth Rate and Happiness Score</a:t>
+            </a:r>
+          </a:p>
+        </p:txBody>
+      </p:sp>
+      <p:sp>
+        <p:nvSpPr>
+          <p:cNvPr id="8" name="TextBox 7">
+            <a:extLst>
+              <a:ext uri="{FF2B5EF4-FFF2-40B4-BE49-F238E27FC236}">
+                <a16:creationId xmlns:a16="http://schemas.microsoft.com/office/drawing/2014/main" id="{989DCDCC-B357-427E-8A6A-1626161DFC76}"/>
+              </a:ext>
+            </a:extLst>
+          </p:cNvPr>
+          <p:cNvSpPr txBox="1"/>
+          <p:nvPr/>
+        </p:nvSpPr>
+        <p:spPr>
+          <a:xfrm>
+            <a:off x="8468751" y="1109726"/>
+            <a:ext cx="2700997" cy="369332"/>
+          </a:xfrm>
+          <a:prstGeom prst="rect">
+            <a:avLst/>
+          </a:prstGeom>
+          <a:noFill/>
+        </p:spPr>
+        <p:txBody>
+          <a:bodyPr wrap="square" rtlCol="0">
+            <a:spAutoFit/>
+          </a:bodyPr>
+          <a:lstStyle/>
+          <a:p>
+            <a:r>
+              <a:rPr lang="en-US" dirty="0"/>
+              <a:t>Correlation Analysis</a:t>
+            </a:r>
+          </a:p>
+        </p:txBody>
+      </p:sp>
+      <p:sp>
+        <p:nvSpPr>
+          <p:cNvPr id="9" name="TextBox 8">
+            <a:extLst>
+              <a:ext uri="{FF2B5EF4-FFF2-40B4-BE49-F238E27FC236}">
+                <a16:creationId xmlns:a16="http://schemas.microsoft.com/office/drawing/2014/main" id="{65105771-5F5D-4E93-9195-0C3814FE2000}"/>
+              </a:ext>
+            </a:extLst>
+          </p:cNvPr>
+          <p:cNvSpPr txBox="1"/>
+          <p:nvPr/>
+        </p:nvSpPr>
+        <p:spPr>
+          <a:xfrm>
+            <a:off x="8468748" y="4158906"/>
+            <a:ext cx="2700997" cy="369332"/>
+          </a:xfrm>
+          <a:prstGeom prst="rect">
+            <a:avLst/>
+          </a:prstGeom>
+          <a:noFill/>
+        </p:spPr>
+        <p:txBody>
+          <a:bodyPr wrap="square" rtlCol="0">
+            <a:spAutoFit/>
+          </a:bodyPr>
+          <a:lstStyle/>
+          <a:p>
+            <a:r>
+              <a:rPr lang="en-US" dirty="0"/>
+              <a:t>Regression Analysis</a:t>
+            </a:r>
+          </a:p>
+        </p:txBody>
+      </p:sp>
+      <p:sp>
+        <p:nvSpPr>
+          <p:cNvPr id="10" name="TextBox 9">
+            <a:extLst>
+              <a:ext uri="{FF2B5EF4-FFF2-40B4-BE49-F238E27FC236}">
+                <a16:creationId xmlns:a16="http://schemas.microsoft.com/office/drawing/2014/main" id="{18C58923-6336-4146-A0E1-23B3F820A740}"/>
+              </a:ext>
+            </a:extLst>
+          </p:cNvPr>
+          <p:cNvSpPr txBox="1"/>
+          <p:nvPr/>
+        </p:nvSpPr>
+        <p:spPr>
+          <a:xfrm>
+            <a:off x="7723163" y="4726751"/>
+            <a:ext cx="4079631" cy="1754326"/>
+          </a:xfrm>
+          <a:prstGeom prst="rect">
+            <a:avLst/>
+          </a:prstGeom>
+          <a:noFill/>
+        </p:spPr>
+        <p:txBody>
+          <a:bodyPr wrap="square" rtlCol="0">
+            <a:spAutoFit/>
+          </a:bodyPr>
+          <a:lstStyle/>
+          <a:p>
+            <a:r>
+              <a:rPr lang="en-US" dirty="0"/>
+              <a:t>Observations  137</a:t>
+            </a:r>
+          </a:p>
+          <a:p>
+            <a:r>
+              <a:rPr lang="en-US" dirty="0"/>
+              <a:t>R Square 0.530437094  </a:t>
+            </a:r>
+          </a:p>
+          <a:p>
+            <a:r>
+              <a:rPr lang="en-US" i="1" dirty="0"/>
+              <a:t>P-value</a:t>
+            </a:r>
+            <a:r>
+              <a:rPr lang="en-US" dirty="0"/>
+              <a:t>  6.46E-24  </a:t>
+            </a:r>
+          </a:p>
+          <a:p>
+            <a:r>
+              <a:rPr lang="en-US" i="1" dirty="0"/>
+              <a:t>Coefficients</a:t>
+            </a:r>
+            <a:r>
+              <a:rPr lang="en-US" dirty="0"/>
+              <a:t>  0.0000437763</a:t>
+            </a:r>
+          </a:p>
+          <a:p>
+            <a:r>
+              <a:rPr lang="en-US" dirty="0"/>
+              <a:t>Each $10K = 0.437763</a:t>
+            </a:r>
+          </a:p>
+          <a:p>
+            <a:r>
+              <a:rPr lang="en-US" dirty="0"/>
+              <a:t>Each $30K = 1.313289 </a:t>
+            </a:r>
+          </a:p>
+        </p:txBody>
+      </p:sp>
       <p:pic>
         <p:nvPicPr>
-          <p:cNvPr id="5" name="Content Placeholder 4">
+          <p:cNvPr id="11" name="Content Placeholder 4">
             <a:extLst>
               <a:ext uri="{FF2B5EF4-FFF2-40B4-BE49-F238E27FC236}">
-                <a16:creationId xmlns:a16="http://schemas.microsoft.com/office/drawing/2014/main" id="{FC4D9827-35EE-4603-BF61-2EC1DD330BA2}"/>
+                <a16:creationId xmlns:a16="http://schemas.microsoft.com/office/drawing/2014/main" id="{31C2D769-F79F-4D20-92CC-6A8050EBAE8F}"/>
               </a:ext>
             </a:extLst>
           </p:cNvPr>
@@ -7047,259 +7306,11 @@
         </p:blipFill>
         <p:spPr>
           <a:xfrm>
-            <a:off x="267285" y="1109726"/>
-            <a:ext cx="7343337" cy="5507504"/>
+            <a:off x="246064" y="1109726"/>
+            <a:ext cx="7340065" cy="5505050"/>
           </a:xfrm>
         </p:spPr>
       </p:pic>
-      <p:sp>
-        <p:nvSpPr>
-          <p:cNvPr id="4" name="Rectangle 3">
-            <a:extLst>
-              <a:ext uri="{FF2B5EF4-FFF2-40B4-BE49-F238E27FC236}">
-                <a16:creationId xmlns:a16="http://schemas.microsoft.com/office/drawing/2014/main" id="{E2F53BA1-9F87-4567-BDA1-D2CDDD81A776}"/>
-              </a:ext>
-            </a:extLst>
-          </p:cNvPr>
-          <p:cNvSpPr/>
-          <p:nvPr/>
-        </p:nvSpPr>
-        <p:spPr>
-          <a:xfrm>
-            <a:off x="7610621" y="1655605"/>
-            <a:ext cx="4581379" cy="369332"/>
-          </a:xfrm>
-          <a:prstGeom prst="rect">
-            <a:avLst/>
-          </a:prstGeom>
-        </p:spPr>
-        <p:txBody>
-          <a:bodyPr wrap="square">
-            <a:spAutoFit/>
-          </a:bodyPr>
-          <a:lstStyle/>
-          <a:p>
-            <a:r>
-              <a:rPr lang="en-US" dirty="0"/>
-              <a:t>Pearson r correlation coefficient = -0.32 </a:t>
-            </a:r>
-          </a:p>
-        </p:txBody>
-      </p:sp>
-      <p:sp>
-        <p:nvSpPr>
-          <p:cNvPr id="7" name="TextBox 6">
-            <a:extLst>
-              <a:ext uri="{FF2B5EF4-FFF2-40B4-BE49-F238E27FC236}">
-                <a16:creationId xmlns:a16="http://schemas.microsoft.com/office/drawing/2014/main" id="{E1D2B391-8F20-4697-8870-819BFD2E66D8}"/>
-              </a:ext>
-            </a:extLst>
-          </p:cNvPr>
-          <p:cNvSpPr txBox="1"/>
-          <p:nvPr/>
-        </p:nvSpPr>
-        <p:spPr>
-          <a:xfrm>
-            <a:off x="7610620" y="2278967"/>
-            <a:ext cx="4417255" cy="1477328"/>
-          </a:xfrm>
-          <a:prstGeom prst="rect">
-            <a:avLst/>
-          </a:prstGeom>
-          <a:noFill/>
-        </p:spPr>
-        <p:txBody>
-          <a:bodyPr wrap="square" rtlCol="0">
-            <a:spAutoFit/>
-          </a:bodyPr>
-          <a:lstStyle/>
-          <a:p>
-            <a:r>
-              <a:rPr lang="en-US" dirty="0"/>
-              <a:t>According to results of our analysis we can state that there is </a:t>
-            </a:r>
-            <a:r>
-              <a:rPr lang="en-US" b="1" dirty="0">
-                <a:solidFill>
-                  <a:srgbClr val="FF0000"/>
-                </a:solidFill>
-              </a:rPr>
-              <a:t>a weak-medium negative relationship </a:t>
-            </a:r>
-            <a:r>
-              <a:rPr lang="en-US" dirty="0"/>
-              <a:t>between GDP Per Capita and Happiness Score of a country</a:t>
-            </a:r>
-          </a:p>
-        </p:txBody>
-      </p:sp>
-      <p:sp>
-        <p:nvSpPr>
-          <p:cNvPr id="3" name="TextBox 2">
-            <a:extLst>
-              <a:ext uri="{FF2B5EF4-FFF2-40B4-BE49-F238E27FC236}">
-                <a16:creationId xmlns:a16="http://schemas.microsoft.com/office/drawing/2014/main" id="{5A5957E6-23DC-40A2-8B1C-D03EE931329C}"/>
-              </a:ext>
-            </a:extLst>
-          </p:cNvPr>
-          <p:cNvSpPr txBox="1"/>
-          <p:nvPr/>
-        </p:nvSpPr>
-        <p:spPr>
-          <a:xfrm>
-            <a:off x="2321169" y="323557"/>
-            <a:ext cx="7329268" cy="461665"/>
-          </a:xfrm>
-          <a:prstGeom prst="rect">
-            <a:avLst/>
-          </a:prstGeom>
-          <a:noFill/>
-        </p:spPr>
-        <p:txBody>
-          <a:bodyPr wrap="square" rtlCol="0">
-            <a:spAutoFit/>
-          </a:bodyPr>
-          <a:lstStyle/>
-          <a:p>
-            <a:pPr algn="ctr"/>
-            <a:r>
-              <a:rPr lang="en-US" sz="2400" dirty="0"/>
-              <a:t>Question 4 – Birth Rate and Happiness Score</a:t>
-            </a:r>
-          </a:p>
-        </p:txBody>
-      </p:sp>
-      <p:sp>
-        <p:nvSpPr>
-          <p:cNvPr id="8" name="TextBox 7">
-            <a:extLst>
-              <a:ext uri="{FF2B5EF4-FFF2-40B4-BE49-F238E27FC236}">
-                <a16:creationId xmlns:a16="http://schemas.microsoft.com/office/drawing/2014/main" id="{989DCDCC-B357-427E-8A6A-1626161DFC76}"/>
-              </a:ext>
-            </a:extLst>
-          </p:cNvPr>
-          <p:cNvSpPr txBox="1"/>
-          <p:nvPr/>
-        </p:nvSpPr>
-        <p:spPr>
-          <a:xfrm>
-            <a:off x="8468751" y="1109726"/>
-            <a:ext cx="2700997" cy="369332"/>
-          </a:xfrm>
-          <a:prstGeom prst="rect">
-            <a:avLst/>
-          </a:prstGeom>
-          <a:noFill/>
-        </p:spPr>
-        <p:txBody>
-          <a:bodyPr wrap="square" rtlCol="0">
-            <a:spAutoFit/>
-          </a:bodyPr>
-          <a:lstStyle/>
-          <a:p>
-            <a:r>
-              <a:rPr lang="en-US" dirty="0"/>
-              <a:t>Correlation Analysis</a:t>
-            </a:r>
-          </a:p>
-        </p:txBody>
-      </p:sp>
-      <p:sp>
-        <p:nvSpPr>
-          <p:cNvPr id="9" name="TextBox 8">
-            <a:extLst>
-              <a:ext uri="{FF2B5EF4-FFF2-40B4-BE49-F238E27FC236}">
-                <a16:creationId xmlns:a16="http://schemas.microsoft.com/office/drawing/2014/main" id="{65105771-5F5D-4E93-9195-0C3814FE2000}"/>
-              </a:ext>
-            </a:extLst>
-          </p:cNvPr>
-          <p:cNvSpPr txBox="1"/>
-          <p:nvPr/>
-        </p:nvSpPr>
-        <p:spPr>
-          <a:xfrm>
-            <a:off x="8468748" y="4158906"/>
-            <a:ext cx="2700997" cy="369332"/>
-          </a:xfrm>
-          <a:prstGeom prst="rect">
-            <a:avLst/>
-          </a:prstGeom>
-          <a:noFill/>
-        </p:spPr>
-        <p:txBody>
-          <a:bodyPr wrap="square" rtlCol="0">
-            <a:spAutoFit/>
-          </a:bodyPr>
-          <a:lstStyle/>
-          <a:p>
-            <a:r>
-              <a:rPr lang="en-US" dirty="0"/>
-              <a:t>Regression Analysis</a:t>
-            </a:r>
-          </a:p>
-        </p:txBody>
-      </p:sp>
-      <p:sp>
-        <p:nvSpPr>
-          <p:cNvPr id="10" name="TextBox 9">
-            <a:extLst>
-              <a:ext uri="{FF2B5EF4-FFF2-40B4-BE49-F238E27FC236}">
-                <a16:creationId xmlns:a16="http://schemas.microsoft.com/office/drawing/2014/main" id="{18C58923-6336-4146-A0E1-23B3F820A740}"/>
-              </a:ext>
-            </a:extLst>
-          </p:cNvPr>
-          <p:cNvSpPr txBox="1"/>
-          <p:nvPr/>
-        </p:nvSpPr>
-        <p:spPr>
-          <a:xfrm>
-            <a:off x="7723163" y="4726751"/>
-            <a:ext cx="4079631" cy="1200329"/>
-          </a:xfrm>
-          <a:prstGeom prst="rect">
-            <a:avLst/>
-          </a:prstGeom>
-          <a:noFill/>
-        </p:spPr>
-        <p:txBody>
-          <a:bodyPr wrap="square" rtlCol="0">
-            <a:spAutoFit/>
-          </a:bodyPr>
-          <a:lstStyle/>
-          <a:p>
-            <a:r>
-              <a:rPr lang="en-US" dirty="0"/>
-              <a:t>R Square 0.41558496 </a:t>
-            </a:r>
-          </a:p>
-          <a:p>
-            <a:r>
-              <a:rPr lang="en-US" dirty="0"/>
-              <a:t>Observations  137</a:t>
-            </a:r>
-          </a:p>
-          <a:p>
-            <a:r>
-              <a:rPr lang="en-US" i="1" dirty="0"/>
-              <a:t>P-value</a:t>
-            </a:r>
-            <a:r>
-              <a:rPr lang="en-US" dirty="0"/>
-              <a:t>  1.89E-17 </a:t>
-            </a:r>
-          </a:p>
-          <a:p>
-            <a:r>
-              <a:rPr lang="en-US" i="1" dirty="0"/>
-              <a:t>Coefficients</a:t>
-            </a:r>
-            <a:r>
-              <a:rPr lang="en-US" dirty="0"/>
-              <a:t>  -0.726368483 </a:t>
-            </a:r>
-          </a:p>
-        </p:txBody>
-      </p:sp>
     </p:spTree>
     <p:extLst>
       <p:ext uri="{BB962C8B-B14F-4D97-AF65-F5344CB8AC3E}">
@@ -7314,96 +7325,6 @@
 </file>
 
 <file path=ppt/slides/slide8.xml><?xml version="1.0" encoding="utf-8"?>
-<p:sld xmlns:a="http://schemas.openxmlformats.org/drawingml/2006/main" xmlns:r="http://schemas.openxmlformats.org/officeDocument/2006/relationships" xmlns:p="http://schemas.openxmlformats.org/presentationml/2006/main">
-  <p:cSld>
-    <p:spTree>
-      <p:nvGrpSpPr>
-        <p:cNvPr id="1" name=""/>
-        <p:cNvGrpSpPr/>
-        <p:nvPr/>
-      </p:nvGrpSpPr>
-      <p:grpSpPr>
-        <a:xfrm>
-          <a:off x="0" y="0"/>
-          <a:ext cx="0" cy="0"/>
-          <a:chOff x="0" y="0"/>
-          <a:chExt cx="0" cy="0"/>
-        </a:xfrm>
-      </p:grpSpPr>
-      <p:sp>
-        <p:nvSpPr>
-          <p:cNvPr id="2" name="Title 1">
-            <a:extLst>
-              <a:ext uri="{FF2B5EF4-FFF2-40B4-BE49-F238E27FC236}">
-                <a16:creationId xmlns:a16="http://schemas.microsoft.com/office/drawing/2014/main" id="{AC4213F2-1371-4E50-8B7D-D8927C8F92C0}"/>
-              </a:ext>
-            </a:extLst>
-          </p:cNvPr>
-          <p:cNvSpPr>
-            <a:spLocks noGrp="1"/>
-          </p:cNvSpPr>
-          <p:nvPr>
-            <p:ph type="title"/>
-          </p:nvPr>
-        </p:nvSpPr>
-        <p:spPr/>
-        <p:txBody>
-          <a:bodyPr/>
-          <a:lstStyle/>
-          <a:p>
-            <a:endParaRPr lang="en-US" dirty="0"/>
-          </a:p>
-        </p:txBody>
-      </p:sp>
-      <p:pic>
-        <p:nvPicPr>
-          <p:cNvPr id="5" name="Content Placeholder 4">
-            <a:extLst>
-              <a:ext uri="{FF2B5EF4-FFF2-40B4-BE49-F238E27FC236}">
-                <a16:creationId xmlns:a16="http://schemas.microsoft.com/office/drawing/2014/main" id="{A8404D9B-82C4-4A68-9970-F4E0AA12AE46}"/>
-              </a:ext>
-            </a:extLst>
-          </p:cNvPr>
-          <p:cNvPicPr>
-            <a:picLocks noGrp="1" noChangeAspect="1"/>
-          </p:cNvPicPr>
-          <p:nvPr>
-            <p:ph idx="1"/>
-          </p:nvPr>
-        </p:nvPicPr>
-        <p:blipFill>
-          <a:blip r:embed="rId2">
-            <a:extLst>
-              <a:ext uri="{28A0092B-C50C-407E-A947-70E740481C1C}">
-                <a14:useLocalDpi xmlns:a14="http://schemas.microsoft.com/office/drawing/2010/main" val="0"/>
-              </a:ext>
-            </a:extLst>
-          </a:blip>
-          <a:stretch>
-            <a:fillRect/>
-          </a:stretch>
-        </p:blipFill>
-        <p:spPr>
-          <a:xfrm>
-            <a:off x="1716257" y="205650"/>
-            <a:ext cx="8391497" cy="6293624"/>
-          </a:xfrm>
-        </p:spPr>
-      </p:pic>
-    </p:spTree>
-    <p:extLst>
-      <p:ext uri="{BB962C8B-B14F-4D97-AF65-F5344CB8AC3E}">
-        <p14:creationId xmlns:p14="http://schemas.microsoft.com/office/powerpoint/2010/main" val="868787261"/>
-      </p:ext>
-    </p:extLst>
-  </p:cSld>
-  <p:clrMapOvr>
-    <a:masterClrMapping/>
-  </p:clrMapOvr>
-</p:sld>
-</file>
-
-<file path=ppt/slides/slide9.xml><?xml version="1.0" encoding="utf-8"?>
 <p:sld xmlns:a="http://schemas.openxmlformats.org/drawingml/2006/main" xmlns:r="http://schemas.openxmlformats.org/officeDocument/2006/relationships" xmlns:p="http://schemas.openxmlformats.org/presentationml/2006/main">
   <p:cSld>
     <p:spTree>

</xml_diff>

<commit_message>
example countries names added to the charts
</commit_message>
<xml_diff>
--- a/Project_1_Team_7_Presentation.pptx
+++ b/Project_1_Team_7_Presentation.pptx
@@ -7311,6 +7311,247 @@
           </a:xfrm>
         </p:spPr>
       </p:pic>
+      <p:sp>
+        <p:nvSpPr>
+          <p:cNvPr id="2" name="TextBox 1">
+            <a:extLst>
+              <a:ext uri="{FF2B5EF4-FFF2-40B4-BE49-F238E27FC236}">
+                <a16:creationId xmlns:a16="http://schemas.microsoft.com/office/drawing/2014/main" id="{D8EE70F3-75F9-43B3-AAF5-9D0A833F4A14}"/>
+              </a:ext>
+            </a:extLst>
+          </p:cNvPr>
+          <p:cNvSpPr txBox="1"/>
+          <p:nvPr/>
+        </p:nvSpPr>
+        <p:spPr>
+          <a:xfrm>
+            <a:off x="5431950" y="2518118"/>
+            <a:ext cx="1730326" cy="646331"/>
+          </a:xfrm>
+          <a:prstGeom prst="rect">
+            <a:avLst/>
+          </a:prstGeom>
+          <a:noFill/>
+        </p:spPr>
+        <p:txBody>
+          <a:bodyPr wrap="square" rtlCol="0">
+            <a:spAutoFit/>
+          </a:bodyPr>
+          <a:lstStyle/>
+          <a:p>
+            <a:r>
+              <a:rPr lang="en-US" sz="1200" dirty="0">
+                <a:solidFill>
+                  <a:schemeClr val="bg1"/>
+                </a:solidFill>
+              </a:rPr>
+              <a:t>Luxemburg</a:t>
+            </a:r>
+          </a:p>
+          <a:p>
+            <a:r>
+              <a:rPr lang="en-US" sz="1200" dirty="0">
+                <a:solidFill>
+                  <a:schemeClr val="bg1"/>
+                </a:solidFill>
+              </a:rPr>
+              <a:t>HS 6.9</a:t>
+            </a:r>
+          </a:p>
+          <a:p>
+            <a:r>
+              <a:rPr lang="en-US" sz="1200" dirty="0">
+                <a:solidFill>
+                  <a:schemeClr val="bg1"/>
+                </a:solidFill>
+              </a:rPr>
+              <a:t>GDP P C 101K</a:t>
+            </a:r>
+          </a:p>
+        </p:txBody>
+      </p:sp>
+      <p:sp>
+        <p:nvSpPr>
+          <p:cNvPr id="12" name="TextBox 11">
+            <a:extLst>
+              <a:ext uri="{FF2B5EF4-FFF2-40B4-BE49-F238E27FC236}">
+                <a16:creationId xmlns:a16="http://schemas.microsoft.com/office/drawing/2014/main" id="{BEDDEADD-1C41-4647-B030-2069AFCFB9B0}"/>
+              </a:ext>
+            </a:extLst>
+          </p:cNvPr>
+          <p:cNvSpPr txBox="1"/>
+          <p:nvPr/>
+        </p:nvSpPr>
+        <p:spPr>
+          <a:xfrm>
+            <a:off x="1456006" y="5280748"/>
+            <a:ext cx="1730326" cy="646331"/>
+          </a:xfrm>
+          <a:prstGeom prst="rect">
+            <a:avLst/>
+          </a:prstGeom>
+          <a:noFill/>
+        </p:spPr>
+        <p:txBody>
+          <a:bodyPr wrap="square" rtlCol="0">
+            <a:spAutoFit/>
+          </a:bodyPr>
+          <a:lstStyle/>
+          <a:p>
+            <a:r>
+              <a:rPr lang="en-US" sz="1200" dirty="0" err="1">
+                <a:solidFill>
+                  <a:schemeClr val="bg1"/>
+                </a:solidFill>
+              </a:rPr>
+              <a:t>Brundi</a:t>
+            </a:r>
+            <a:endParaRPr lang="en-US" sz="1200" dirty="0">
+              <a:solidFill>
+                <a:schemeClr val="bg1"/>
+              </a:solidFill>
+            </a:endParaRPr>
+          </a:p>
+          <a:p>
+            <a:r>
+              <a:rPr lang="en-US" sz="1200" dirty="0">
+                <a:solidFill>
+                  <a:schemeClr val="bg1"/>
+                </a:solidFill>
+              </a:rPr>
+              <a:t>HS 2.9</a:t>
+            </a:r>
+          </a:p>
+          <a:p>
+            <a:r>
+              <a:rPr lang="en-US" sz="1200" dirty="0">
+                <a:solidFill>
+                  <a:schemeClr val="bg1"/>
+                </a:solidFill>
+              </a:rPr>
+              <a:t>GDP P C $300</a:t>
+            </a:r>
+          </a:p>
+        </p:txBody>
+      </p:sp>
+      <p:sp>
+        <p:nvSpPr>
+          <p:cNvPr id="13" name="TextBox 12">
+            <a:extLst>
+              <a:ext uri="{FF2B5EF4-FFF2-40B4-BE49-F238E27FC236}">
+                <a16:creationId xmlns:a16="http://schemas.microsoft.com/office/drawing/2014/main" id="{ACE654CF-22C6-499A-A36F-58B0BB34E9AC}"/>
+              </a:ext>
+            </a:extLst>
+          </p:cNvPr>
+          <p:cNvSpPr txBox="1"/>
+          <p:nvPr/>
+        </p:nvSpPr>
+        <p:spPr>
+          <a:xfrm>
+            <a:off x="1456006" y="1701771"/>
+            <a:ext cx="1730326" cy="646331"/>
+          </a:xfrm>
+          <a:prstGeom prst="rect">
+            <a:avLst/>
+          </a:prstGeom>
+          <a:noFill/>
+        </p:spPr>
+        <p:txBody>
+          <a:bodyPr wrap="square" rtlCol="0">
+            <a:spAutoFit/>
+          </a:bodyPr>
+          <a:lstStyle/>
+          <a:p>
+            <a:r>
+              <a:rPr lang="en-US" sz="1200" dirty="0">
+                <a:solidFill>
+                  <a:schemeClr val="bg1"/>
+                </a:solidFill>
+              </a:rPr>
+              <a:t>Spain</a:t>
+            </a:r>
+          </a:p>
+          <a:p>
+            <a:r>
+              <a:rPr lang="en-US" sz="1200" dirty="0">
+                <a:solidFill>
+                  <a:schemeClr val="bg1"/>
+                </a:solidFill>
+              </a:rPr>
+              <a:t>HS 6.3</a:t>
+            </a:r>
+          </a:p>
+          <a:p>
+            <a:r>
+              <a:rPr lang="en-US" sz="1200" dirty="0">
+                <a:solidFill>
+                  <a:schemeClr val="bg1"/>
+                </a:solidFill>
+              </a:rPr>
+              <a:t>GDP P C 26K</a:t>
+            </a:r>
+          </a:p>
+        </p:txBody>
+      </p:sp>
+      <p:sp>
+        <p:nvSpPr>
+          <p:cNvPr id="14" name="TextBox 13">
+            <a:extLst>
+              <a:ext uri="{FF2B5EF4-FFF2-40B4-BE49-F238E27FC236}">
+                <a16:creationId xmlns:a16="http://schemas.microsoft.com/office/drawing/2014/main" id="{A4AB7AF4-D4BF-4BFB-BA65-B808938249CB}"/>
+              </a:ext>
+            </a:extLst>
+          </p:cNvPr>
+          <p:cNvSpPr txBox="1"/>
+          <p:nvPr/>
+        </p:nvSpPr>
+        <p:spPr>
+          <a:xfrm>
+            <a:off x="3547267" y="2852615"/>
+            <a:ext cx="1730326" cy="646331"/>
+          </a:xfrm>
+          <a:prstGeom prst="rect">
+            <a:avLst/>
+          </a:prstGeom>
+          <a:noFill/>
+        </p:spPr>
+        <p:txBody>
+          <a:bodyPr wrap="square" rtlCol="0">
+            <a:spAutoFit/>
+          </a:bodyPr>
+          <a:lstStyle/>
+          <a:p>
+            <a:r>
+              <a:rPr lang="en-US" sz="1200" dirty="0">
+                <a:solidFill>
+                  <a:schemeClr val="bg1"/>
+                </a:solidFill>
+              </a:rPr>
+              <a:t>USA</a:t>
+            </a:r>
+          </a:p>
+          <a:p>
+            <a:r>
+              <a:rPr lang="en-US" sz="1200" dirty="0">
+                <a:solidFill>
+                  <a:schemeClr val="bg1"/>
+                </a:solidFill>
+              </a:rPr>
+              <a:t>HS 7.1</a:t>
+            </a:r>
+          </a:p>
+          <a:p>
+            <a:r>
+              <a:rPr lang="en-US" sz="1200" dirty="0">
+                <a:solidFill>
+                  <a:schemeClr val="bg1"/>
+                </a:solidFill>
+              </a:rPr>
+              <a:t>GDP P C 56K</a:t>
+            </a:r>
+          </a:p>
+        </p:txBody>
+      </p:sp>
     </p:spTree>
     <p:extLst>
       <p:ext uri="{BB962C8B-B14F-4D97-AF65-F5344CB8AC3E}">
@@ -7371,7 +7612,7 @@
         </p:blipFill>
         <p:spPr>
           <a:xfrm>
-            <a:off x="267285" y="1109726"/>
+            <a:off x="154743" y="1002543"/>
             <a:ext cx="7343337" cy="5507504"/>
           </a:xfrm>
         </p:spPr>
@@ -7620,6 +7861,242 @@
             <a:r>
               <a:rPr lang="en-US" dirty="0"/>
               <a:t>  -0.726368483 </a:t>
+            </a:r>
+          </a:p>
+        </p:txBody>
+      </p:sp>
+      <p:sp>
+        <p:nvSpPr>
+          <p:cNvPr id="11" name="TextBox 10">
+            <a:extLst>
+              <a:ext uri="{FF2B5EF4-FFF2-40B4-BE49-F238E27FC236}">
+                <a16:creationId xmlns:a16="http://schemas.microsoft.com/office/drawing/2014/main" id="{A5915A70-9E41-4296-860D-DF2A98DB7E75}"/>
+              </a:ext>
+            </a:extLst>
+          </p:cNvPr>
+          <p:cNvSpPr txBox="1"/>
+          <p:nvPr/>
+        </p:nvSpPr>
+        <p:spPr>
+          <a:xfrm>
+            <a:off x="5985803" y="5131581"/>
+            <a:ext cx="1730326" cy="646331"/>
+          </a:xfrm>
+          <a:prstGeom prst="rect">
+            <a:avLst/>
+          </a:prstGeom>
+          <a:noFill/>
+        </p:spPr>
+        <p:txBody>
+          <a:bodyPr wrap="square" rtlCol="0">
+            <a:spAutoFit/>
+          </a:bodyPr>
+          <a:lstStyle/>
+          <a:p>
+            <a:r>
+              <a:rPr lang="en-US" sz="1200" dirty="0">
+                <a:solidFill>
+                  <a:schemeClr val="bg1"/>
+                </a:solidFill>
+              </a:rPr>
+              <a:t>Switzerland</a:t>
+            </a:r>
+          </a:p>
+          <a:p>
+            <a:r>
+              <a:rPr lang="en-US" sz="1200" dirty="0">
+                <a:solidFill>
+                  <a:schemeClr val="bg1"/>
+                </a:solidFill>
+              </a:rPr>
+              <a:t>HS 7.6</a:t>
+            </a:r>
+          </a:p>
+          <a:p>
+            <a:r>
+              <a:rPr lang="en-US" sz="1200" dirty="0">
+                <a:solidFill>
+                  <a:schemeClr val="bg1"/>
+                </a:solidFill>
+              </a:rPr>
+              <a:t>BR 1.5</a:t>
+            </a:r>
+          </a:p>
+        </p:txBody>
+      </p:sp>
+      <p:sp>
+        <p:nvSpPr>
+          <p:cNvPr id="12" name="TextBox 11">
+            <a:extLst>
+              <a:ext uri="{FF2B5EF4-FFF2-40B4-BE49-F238E27FC236}">
+                <a16:creationId xmlns:a16="http://schemas.microsoft.com/office/drawing/2014/main" id="{B41E2DD3-493A-482F-ABF1-5C2847538C44}"/>
+              </a:ext>
+            </a:extLst>
+          </p:cNvPr>
+          <p:cNvSpPr txBox="1"/>
+          <p:nvPr/>
+        </p:nvSpPr>
+        <p:spPr>
+          <a:xfrm>
+            <a:off x="2438400" y="5003749"/>
+            <a:ext cx="1730326" cy="646331"/>
+          </a:xfrm>
+          <a:prstGeom prst="rect">
+            <a:avLst/>
+          </a:prstGeom>
+          <a:noFill/>
+        </p:spPr>
+        <p:txBody>
+          <a:bodyPr wrap="square" rtlCol="0">
+            <a:spAutoFit/>
+          </a:bodyPr>
+          <a:lstStyle/>
+          <a:p>
+            <a:r>
+              <a:rPr lang="en-US" sz="1200" dirty="0">
+                <a:solidFill>
+                  <a:schemeClr val="bg1"/>
+                </a:solidFill>
+              </a:rPr>
+              <a:t>Armenia</a:t>
+            </a:r>
+          </a:p>
+          <a:p>
+            <a:r>
+              <a:rPr lang="en-US" sz="1200" dirty="0">
+                <a:solidFill>
+                  <a:schemeClr val="bg1"/>
+                </a:solidFill>
+              </a:rPr>
+              <a:t>HS 4.2</a:t>
+            </a:r>
+          </a:p>
+          <a:p>
+            <a:r>
+              <a:rPr lang="en-US" sz="1200" dirty="0">
+                <a:solidFill>
+                  <a:schemeClr val="bg1"/>
+                </a:solidFill>
+              </a:rPr>
+              <a:t>BR 1.6</a:t>
+            </a:r>
+          </a:p>
+        </p:txBody>
+      </p:sp>
+      <p:sp>
+        <p:nvSpPr>
+          <p:cNvPr id="13" name="TextBox 12">
+            <a:extLst>
+              <a:ext uri="{FF2B5EF4-FFF2-40B4-BE49-F238E27FC236}">
+                <a16:creationId xmlns:a16="http://schemas.microsoft.com/office/drawing/2014/main" id="{BF984F4B-FAA7-4D16-AF81-6BC3210C2973}"/>
+              </a:ext>
+            </a:extLst>
+          </p:cNvPr>
+          <p:cNvSpPr txBox="1"/>
+          <p:nvPr/>
+        </p:nvSpPr>
+        <p:spPr>
+          <a:xfrm>
+            <a:off x="4255477" y="1837144"/>
+            <a:ext cx="1730326" cy="646331"/>
+          </a:xfrm>
+          <a:prstGeom prst="rect">
+            <a:avLst/>
+          </a:prstGeom>
+          <a:noFill/>
+        </p:spPr>
+        <p:txBody>
+          <a:bodyPr wrap="square" rtlCol="0">
+            <a:spAutoFit/>
+          </a:bodyPr>
+          <a:lstStyle/>
+          <a:p>
+            <a:r>
+              <a:rPr lang="en-US" sz="1200" dirty="0">
+                <a:solidFill>
+                  <a:schemeClr val="bg1"/>
+                </a:solidFill>
+              </a:rPr>
+              <a:t>Zambia</a:t>
+            </a:r>
+          </a:p>
+          <a:p>
+            <a:r>
+              <a:rPr lang="en-US" sz="1200" dirty="0">
+                <a:solidFill>
+                  <a:schemeClr val="bg1"/>
+                </a:solidFill>
+              </a:rPr>
+              <a:t>HS 5.1</a:t>
+            </a:r>
+          </a:p>
+          <a:p>
+            <a:r>
+              <a:rPr lang="en-US" sz="1200" dirty="0">
+                <a:solidFill>
+                  <a:schemeClr val="bg1"/>
+                </a:solidFill>
+              </a:rPr>
+              <a:t>BR 5</a:t>
+            </a:r>
+          </a:p>
+        </p:txBody>
+      </p:sp>
+      <p:sp>
+        <p:nvSpPr>
+          <p:cNvPr id="14" name="TextBox 13">
+            <a:extLst>
+              <a:ext uri="{FF2B5EF4-FFF2-40B4-BE49-F238E27FC236}">
+                <a16:creationId xmlns:a16="http://schemas.microsoft.com/office/drawing/2014/main" id="{6A0FF274-D2B0-4604-B9BC-199CA9E59C90}"/>
+              </a:ext>
+            </a:extLst>
+          </p:cNvPr>
+          <p:cNvSpPr txBox="1"/>
+          <p:nvPr/>
+        </p:nvSpPr>
+        <p:spPr>
+          <a:xfrm>
+            <a:off x="1240301" y="1979607"/>
+            <a:ext cx="1730326" cy="646331"/>
+          </a:xfrm>
+          <a:prstGeom prst="rect">
+            <a:avLst/>
+          </a:prstGeom>
+          <a:noFill/>
+        </p:spPr>
+        <p:txBody>
+          <a:bodyPr wrap="square" rtlCol="0">
+            <a:spAutoFit/>
+          </a:bodyPr>
+          <a:lstStyle/>
+          <a:p>
+            <a:r>
+              <a:rPr lang="en-US" sz="1200" dirty="0">
+                <a:solidFill>
+                  <a:schemeClr val="bg1"/>
+                </a:solidFill>
+              </a:rPr>
+              <a:t>Burundi</a:t>
+            </a:r>
+          </a:p>
+          <a:p>
+            <a:r>
+              <a:rPr lang="en-US" sz="1200" dirty="0">
+                <a:solidFill>
+                  <a:schemeClr val="bg1"/>
+                </a:solidFill>
+              </a:rPr>
+              <a:t>HS 2.9</a:t>
+            </a:r>
+          </a:p>
+          <a:p>
+            <a:r>
+              <a:rPr lang="en-US" sz="1200" dirty="0">
+                <a:solidFill>
+                  <a:schemeClr val="bg1"/>
+                </a:solidFill>
+              </a:rPr>
+              <a:t>BR 5.7</a:t>
             </a:r>
           </a:p>
         </p:txBody>

</xml_diff>